<commit_message>
Update solar wind noise generation scripts and utilities
</commit_message>
<xml_diff>
--- a/solar_wind_noise/Gradiometer Correlation functions.pptx
+++ b/solar_wind_noise/Gradiometer Correlation functions.pptx
@@ -1,22 +1,23 @@
 
 <file path=ppt/presentation.xml><?xml version="1.0" encoding="utf-8"?>
-<p:presentation xmlns:a="http://schemas.openxmlformats.org/drawingml/2006/main" xmlns:r="http://schemas.openxmlformats.org/officeDocument/2006/relationships" xmlns:mc="http://schemas.openxmlformats.org/markup-compatibility/2006" xmlns:mv="urn:schemas-microsoft-com:mac:vml" xmlns:p="http://schemas.openxmlformats.org/presentationml/2006/main" xmlns:c="http://schemas.openxmlformats.org/drawingml/2006/chart" xmlns:dgm="http://schemas.openxmlformats.org/drawingml/2006/diagram" xmlns:o="urn:schemas-microsoft-com:office:office" xmlns:v="urn:schemas-microsoft-com:vml" xmlns:pvml="urn:schemas-microsoft-com:office:powerpoint" xmlns:com="http://schemas.openxmlformats.org/drawingml/2006/compatibility" xmlns:p14="http://schemas.microsoft.com/office/powerpoint/2010/main" xmlns:p15="http://schemas.microsoft.com/office/powerpoint/2012/main" xmlns:ahyp="http://schemas.microsoft.com/office/drawing/2018/hyperlinkcolor" autoCompressPictures="0" strictFirstAndLastChars="0" saveSubsetFonts="1">
+<p:presentation xmlns:a="http://schemas.openxmlformats.org/drawingml/2006/main" xmlns:r="http://schemas.openxmlformats.org/officeDocument/2006/relationships" xmlns:p="http://schemas.openxmlformats.org/presentationml/2006/main" strictFirstAndLastChars="0" saveSubsetFonts="1" autoCompressPictures="0">
   <p:sldMasterIdLst>
-    <p:sldMasterId id="2147483659" r:id="rId4"/>
+    <p:sldMasterId id="2147483659" r:id="rId1"/>
   </p:sldMasterIdLst>
   <p:notesMasterIdLst>
-    <p:notesMasterId r:id="rId5"/>
+    <p:notesMasterId r:id="rId7"/>
   </p:notesMasterIdLst>
   <p:sldIdLst>
-    <p:sldId id="256" r:id="rId6"/>
-    <p:sldId id="257" r:id="rId7"/>
-    <p:sldId id="258" r:id="rId8"/>
-    <p:sldId id="259" r:id="rId9"/>
+    <p:sldId id="256" r:id="rId2"/>
+    <p:sldId id="257" r:id="rId3"/>
+    <p:sldId id="258" r:id="rId4"/>
+    <p:sldId id="259" r:id="rId5"/>
+    <p:sldId id="260" r:id="rId6"/>
   </p:sldIdLst>
-  <p:sldSz cy="5143500" cx="9144000"/>
+  <p:sldSz cx="9144000" cy="5143500" type="screen16x9"/>
   <p:notesSz cx="6858000" cy="9144000"/>
   <p:defaultTextStyle>
-    <a:defPPr lvl="0" marR="0" rtl="0" algn="l">
+    <a:defPPr marR="0" lvl="0" algn="l" rtl="0">
       <a:lnSpc>
         <a:spcPct val="100000"/>
       </a:lnSpc>
@@ -27,7 +28,7 @@
         <a:spcPts val="0"/>
       </a:spcAft>
     </a:defPPr>
-    <a:lvl1pPr lvl="0" marR="0" rtl="0" algn="l">
+    <a:lvl1pPr marR="0" lvl="0" algn="l" rtl="0">
       <a:lnSpc>
         <a:spcPct val="100000"/>
       </a:lnSpc>
@@ -41,7 +42,7 @@
         <a:srgbClr val="000000"/>
       </a:buClr>
       <a:buFont typeface="Arial"/>
-      <a:defRPr b="0" i="0" sz="1400" u="none" cap="none" strike="noStrike">
+      <a:defRPr sz="1400" b="0" i="0" u="none" strike="noStrike" cap="none">
         <a:solidFill>
           <a:srgbClr val="000000"/>
         </a:solidFill>
@@ -51,7 +52,7 @@
         <a:sym typeface="Arial"/>
       </a:defRPr>
     </a:lvl1pPr>
-    <a:lvl2pPr lvl="1" marR="0" rtl="0" algn="l">
+    <a:lvl2pPr marR="0" lvl="1" algn="l" rtl="0">
       <a:lnSpc>
         <a:spcPct val="100000"/>
       </a:lnSpc>
@@ -65,7 +66,7 @@
         <a:srgbClr val="000000"/>
       </a:buClr>
       <a:buFont typeface="Arial"/>
-      <a:defRPr b="0" i="0" sz="1400" u="none" cap="none" strike="noStrike">
+      <a:defRPr sz="1400" b="0" i="0" u="none" strike="noStrike" cap="none">
         <a:solidFill>
           <a:srgbClr val="000000"/>
         </a:solidFill>
@@ -75,7 +76,7 @@
         <a:sym typeface="Arial"/>
       </a:defRPr>
     </a:lvl2pPr>
-    <a:lvl3pPr lvl="2" marR="0" rtl="0" algn="l">
+    <a:lvl3pPr marR="0" lvl="2" algn="l" rtl="0">
       <a:lnSpc>
         <a:spcPct val="100000"/>
       </a:lnSpc>
@@ -89,7 +90,7 @@
         <a:srgbClr val="000000"/>
       </a:buClr>
       <a:buFont typeface="Arial"/>
-      <a:defRPr b="0" i="0" sz="1400" u="none" cap="none" strike="noStrike">
+      <a:defRPr sz="1400" b="0" i="0" u="none" strike="noStrike" cap="none">
         <a:solidFill>
           <a:srgbClr val="000000"/>
         </a:solidFill>
@@ -99,7 +100,7 @@
         <a:sym typeface="Arial"/>
       </a:defRPr>
     </a:lvl3pPr>
-    <a:lvl4pPr lvl="3" marR="0" rtl="0" algn="l">
+    <a:lvl4pPr marR="0" lvl="3" algn="l" rtl="0">
       <a:lnSpc>
         <a:spcPct val="100000"/>
       </a:lnSpc>
@@ -113,7 +114,7 @@
         <a:srgbClr val="000000"/>
       </a:buClr>
       <a:buFont typeface="Arial"/>
-      <a:defRPr b="0" i="0" sz="1400" u="none" cap="none" strike="noStrike">
+      <a:defRPr sz="1400" b="0" i="0" u="none" strike="noStrike" cap="none">
         <a:solidFill>
           <a:srgbClr val="000000"/>
         </a:solidFill>
@@ -123,7 +124,7 @@
         <a:sym typeface="Arial"/>
       </a:defRPr>
     </a:lvl4pPr>
-    <a:lvl5pPr lvl="4" marR="0" rtl="0" algn="l">
+    <a:lvl5pPr marR="0" lvl="4" algn="l" rtl="0">
       <a:lnSpc>
         <a:spcPct val="100000"/>
       </a:lnSpc>
@@ -137,7 +138,7 @@
         <a:srgbClr val="000000"/>
       </a:buClr>
       <a:buFont typeface="Arial"/>
-      <a:defRPr b="0" i="0" sz="1400" u="none" cap="none" strike="noStrike">
+      <a:defRPr sz="1400" b="0" i="0" u="none" strike="noStrike" cap="none">
         <a:solidFill>
           <a:srgbClr val="000000"/>
         </a:solidFill>
@@ -147,7 +148,7 @@
         <a:sym typeface="Arial"/>
       </a:defRPr>
     </a:lvl5pPr>
-    <a:lvl6pPr lvl="5" marR="0" rtl="0" algn="l">
+    <a:lvl6pPr marR="0" lvl="5" algn="l" rtl="0">
       <a:lnSpc>
         <a:spcPct val="100000"/>
       </a:lnSpc>
@@ -161,7 +162,7 @@
         <a:srgbClr val="000000"/>
       </a:buClr>
       <a:buFont typeface="Arial"/>
-      <a:defRPr b="0" i="0" sz="1400" u="none" cap="none" strike="noStrike">
+      <a:defRPr sz="1400" b="0" i="0" u="none" strike="noStrike" cap="none">
         <a:solidFill>
           <a:srgbClr val="000000"/>
         </a:solidFill>
@@ -171,7 +172,7 @@
         <a:sym typeface="Arial"/>
       </a:defRPr>
     </a:lvl6pPr>
-    <a:lvl7pPr lvl="6" marR="0" rtl="0" algn="l">
+    <a:lvl7pPr marR="0" lvl="6" algn="l" rtl="0">
       <a:lnSpc>
         <a:spcPct val="100000"/>
       </a:lnSpc>
@@ -185,7 +186,7 @@
         <a:srgbClr val="000000"/>
       </a:buClr>
       <a:buFont typeface="Arial"/>
-      <a:defRPr b="0" i="0" sz="1400" u="none" cap="none" strike="noStrike">
+      <a:defRPr sz="1400" b="0" i="0" u="none" strike="noStrike" cap="none">
         <a:solidFill>
           <a:srgbClr val="000000"/>
         </a:solidFill>
@@ -195,7 +196,7 @@
         <a:sym typeface="Arial"/>
       </a:defRPr>
     </a:lvl7pPr>
-    <a:lvl8pPr lvl="7" marR="0" rtl="0" algn="l">
+    <a:lvl8pPr marR="0" lvl="7" algn="l" rtl="0">
       <a:lnSpc>
         <a:spcPct val="100000"/>
       </a:lnSpc>
@@ -209,7 +210,7 @@
         <a:srgbClr val="000000"/>
       </a:buClr>
       <a:buFont typeface="Arial"/>
-      <a:defRPr b="0" i="0" sz="1400" u="none" cap="none" strike="noStrike">
+      <a:defRPr sz="1400" b="0" i="0" u="none" strike="noStrike" cap="none">
         <a:solidFill>
           <a:srgbClr val="000000"/>
         </a:solidFill>
@@ -219,7 +220,7 @@
         <a:sym typeface="Arial"/>
       </a:defRPr>
     </a:lvl8pPr>
-    <a:lvl9pPr lvl="8" marR="0" rtl="0" algn="l">
+    <a:lvl9pPr marR="0" lvl="8" algn="l" rtl="0">
       <a:lnSpc>
         <a:spcPct val="100000"/>
       </a:lnSpc>
@@ -233,7 +234,7 @@
         <a:srgbClr val="000000"/>
       </a:buClr>
       <a:buFont typeface="Arial"/>
-      <a:defRPr b="0" i="0" sz="1400" u="none" cap="none" strike="noStrike">
+      <a:defRPr sz="1400" b="0" i="0" u="none" strike="noStrike" cap="none">
         <a:solidFill>
           <a:srgbClr val="000000"/>
         </a:solidFill>
@@ -246,7 +247,7 @@
   </p:defaultTextStyle>
   <p:extLst>
     <p:ext uri="{EFAFB233-063F-42B5-8137-9DF3F51BA10A}">
-      <p15:sldGuideLst>
+      <p15:sldGuideLst xmlns:p15="http://schemas.microsoft.com/office/powerpoint/2012/main">
         <p15:guide id="1" orient="horz" pos="1620">
           <p15:clr>
             <a:srgbClr val="747775"/>
@@ -264,11 +265,16 @@
 </file>
 
 <file path=ppt/notesMasters/notesMaster1.xml><?xml version="1.0" encoding="utf-8"?>
-<p:notesMaster xmlns:a="http://schemas.openxmlformats.org/drawingml/2006/main" xmlns:r="http://schemas.openxmlformats.org/officeDocument/2006/relationships" xmlns:mc="http://schemas.openxmlformats.org/markup-compatibility/2006" xmlns:mv="urn:schemas-microsoft-com:mac:vml" xmlns:p="http://schemas.openxmlformats.org/presentationml/2006/main" xmlns:c="http://schemas.openxmlformats.org/drawingml/2006/chart" xmlns:dgm="http://schemas.openxmlformats.org/drawingml/2006/diagram" xmlns:o="urn:schemas-microsoft-com:office:office" xmlns:v="urn:schemas-microsoft-com:vml" xmlns:pvml="urn:schemas-microsoft-com:office:powerpoint" xmlns:com="http://schemas.openxmlformats.org/drawingml/2006/compatibility" xmlns:p14="http://schemas.microsoft.com/office/powerpoint/2010/main" xmlns:p15="http://schemas.microsoft.com/office/powerpoint/2012/main" xmlns:ahyp="http://schemas.microsoft.com/office/drawing/2018/hyperlinkcolor">
+<p:notesMaster xmlns:a="http://schemas.openxmlformats.org/drawingml/2006/main" xmlns:r="http://schemas.openxmlformats.org/officeDocument/2006/relationships" xmlns:p="http://schemas.openxmlformats.org/presentationml/2006/main">
   <p:cSld>
+    <p:bg>
+      <p:bgRef idx="1001">
+        <a:schemeClr val="bg1"/>
+      </p:bgRef>
+    </p:bg>
     <p:spTree>
       <p:nvGrpSpPr>
-        <p:cNvPr id="2" name="Shape 2"/>
+        <p:cNvPr id="1" name="Shape 2"/>
         <p:cNvGrpSpPr/>
         <p:nvPr/>
       </p:nvGrpSpPr>
@@ -283,9 +289,11 @@
       <p:sp>
         <p:nvSpPr>
           <p:cNvPr id="3" name="Google Shape;3;n"/>
-          <p:cNvSpPr/>
+          <p:cNvSpPr>
+            <a:spLocks noGrp="1" noRot="1" noChangeAspect="1"/>
+          </p:cNvSpPr>
           <p:nvPr>
-            <p:ph idx="2" type="sldImg"/>
+            <p:ph type="sldImg" idx="2"/>
           </p:nvPr>
         </p:nvSpPr>
         <p:spPr>
@@ -294,9 +302,13 @@
             <a:ext cx="6096075" cy="3429000"/>
           </a:xfrm>
           <a:custGeom>
-            <a:rect b="b" l="l" r="r" t="t"/>
+            <a:avLst/>
+            <a:gdLst/>
+            <a:ahLst/>
+            <a:cxnLst/>
+            <a:rect l="l" t="t" r="r" b="b"/>
             <a:pathLst>
-              <a:path extrusionOk="0" h="120000" w="120000">
+              <a:path w="120000" h="120000" extrusionOk="0">
                 <a:moveTo>
                   <a:pt x="0" y="0"/>
                 </a:moveTo>
@@ -314,23 +326,25 @@
             </a:pathLst>
           </a:custGeom>
           <a:noFill/>
-          <a:ln cap="flat" cmpd="sng" w="9525">
+          <a:ln w="9525" cap="flat" cmpd="sng">
             <a:solidFill>
               <a:srgbClr val="000000"/>
             </a:solidFill>
             <a:prstDash val="solid"/>
             <a:round/>
-            <a:headEnd len="sm" w="sm" type="none"/>
-            <a:tailEnd len="sm" w="sm" type="none"/>
+            <a:headEnd type="none" w="sm" len="sm"/>
+            <a:tailEnd type="none" w="sm" len="sm"/>
           </a:ln>
         </p:spPr>
       </p:sp>
       <p:sp>
         <p:nvSpPr>
           <p:cNvPr id="4" name="Google Shape;4;n"/>
-          <p:cNvSpPr txBox="1"/>
+          <p:cNvSpPr txBox="1">
+            <a:spLocks noGrp="1"/>
+          </p:cNvSpPr>
           <p:nvPr>
-            <p:ph idx="1" type="body"/>
+            <p:ph type="body" idx="1"/>
           </p:nvPr>
         </p:nvSpPr>
         <p:spPr>
@@ -347,11 +361,11 @@
           </a:ln>
         </p:spPr>
         <p:txBody>
-          <a:bodyPr anchorCtr="0" anchor="t" bIns="91425" lIns="91425" spcFirstLastPara="1" rIns="91425" wrap="square" tIns="91425">
+          <a:bodyPr spcFirstLastPara="1" wrap="square" lIns="91425" tIns="91425" rIns="91425" bIns="91425" anchor="t" anchorCtr="0">
             <a:noAutofit/>
           </a:bodyPr>
           <a:lstStyle>
-            <a:lvl1pPr indent="-298450" lvl="0" marL="457200">
+            <a:lvl1pPr marL="457200" lvl="0" indent="-298450">
               <a:spcBef>
                 <a:spcPts val="0"/>
               </a:spcBef>
@@ -362,7 +376,7 @@
               <a:buChar char="●"/>
               <a:defRPr sz="1100"/>
             </a:lvl1pPr>
-            <a:lvl2pPr indent="-298450" lvl="1" marL="914400">
+            <a:lvl2pPr marL="914400" lvl="1" indent="-298450">
               <a:spcBef>
                 <a:spcPts val="0"/>
               </a:spcBef>
@@ -373,7 +387,7 @@
               <a:buChar char="○"/>
               <a:defRPr sz="1100"/>
             </a:lvl2pPr>
-            <a:lvl3pPr indent="-298450" lvl="2" marL="1371600">
+            <a:lvl3pPr marL="1371600" lvl="2" indent="-298450">
               <a:spcBef>
                 <a:spcPts val="0"/>
               </a:spcBef>
@@ -384,7 +398,7 @@
               <a:buChar char="■"/>
               <a:defRPr sz="1100"/>
             </a:lvl3pPr>
-            <a:lvl4pPr indent="-298450" lvl="3" marL="1828800">
+            <a:lvl4pPr marL="1828800" lvl="3" indent="-298450">
               <a:spcBef>
                 <a:spcPts val="0"/>
               </a:spcBef>
@@ -395,7 +409,7 @@
               <a:buChar char="●"/>
               <a:defRPr sz="1100"/>
             </a:lvl4pPr>
-            <a:lvl5pPr indent="-298450" lvl="4" marL="2286000">
+            <a:lvl5pPr marL="2286000" lvl="4" indent="-298450">
               <a:spcBef>
                 <a:spcPts val="0"/>
               </a:spcBef>
@@ -406,7 +420,7 @@
               <a:buChar char="○"/>
               <a:defRPr sz="1100"/>
             </a:lvl5pPr>
-            <a:lvl6pPr indent="-298450" lvl="5" marL="2743200">
+            <a:lvl6pPr marL="2743200" lvl="5" indent="-298450">
               <a:spcBef>
                 <a:spcPts val="0"/>
               </a:spcBef>
@@ -417,7 +431,7 @@
               <a:buChar char="■"/>
               <a:defRPr sz="1100"/>
             </a:lvl6pPr>
-            <a:lvl7pPr indent="-298450" lvl="6" marL="3200400">
+            <a:lvl7pPr marL="3200400" lvl="6" indent="-298450">
               <a:spcBef>
                 <a:spcPts val="0"/>
               </a:spcBef>
@@ -428,7 +442,7 @@
               <a:buChar char="●"/>
               <a:defRPr sz="1100"/>
             </a:lvl7pPr>
-            <a:lvl8pPr indent="-298450" lvl="7" marL="3657600">
+            <a:lvl8pPr marL="3657600" lvl="7" indent="-298450">
               <a:spcBef>
                 <a:spcPts val="0"/>
               </a:spcBef>
@@ -439,7 +453,7 @@
               <a:buChar char="○"/>
               <a:defRPr sz="1100"/>
             </a:lvl8pPr>
-            <a:lvl9pPr indent="-298450" lvl="8" marL="4114800">
+            <a:lvl9pPr marL="4114800" lvl="8" indent="-298450">
               <a:spcBef>
                 <a:spcPts val="0"/>
               </a:spcBef>
@@ -451,14 +465,16 @@
               <a:defRPr sz="1100"/>
             </a:lvl9pPr>
           </a:lstStyle>
-          <a:p/>
+          <a:p>
+            <a:endParaRPr/>
+          </a:p>
         </p:txBody>
       </p:sp>
     </p:spTree>
   </p:cSld>
-  <p:clrMap accent1="accent1" accent2="accent2" accent3="accent3" accent4="accent4" accent5="accent5" accent6="accent6" bg1="lt1" bg2="dk2" tx1="dk1" tx2="lt2" folHlink="folHlink" hlink="hlink"/>
+  <p:clrMap bg1="lt1" tx1="dk1" bg2="dk2" tx2="lt2" accent1="accent1" accent2="accent2" accent3="accent3" accent4="accent4" accent5="accent5" accent6="accent6" hlink="hlink" folHlink="folHlink"/>
   <p:notesStyle>
-    <a:defPPr lvl="0" marR="0" rtl="0" algn="l">
+    <a:defPPr marR="0" lvl="0" algn="l" rtl="0">
       <a:lnSpc>
         <a:spcPct val="100000"/>
       </a:lnSpc>
@@ -469,7 +485,7 @@
         <a:spcPts val="0"/>
       </a:spcAft>
     </a:defPPr>
-    <a:lvl1pPr lvl="0" marR="0" rtl="0" algn="l">
+    <a:lvl1pPr marR="0" lvl="0" algn="l" rtl="0">
       <a:lnSpc>
         <a:spcPct val="100000"/>
       </a:lnSpc>
@@ -483,7 +499,7 @@
         <a:srgbClr val="000000"/>
       </a:buClr>
       <a:buFont typeface="Arial"/>
-      <a:defRPr b="0" i="0" sz="1400" u="none" cap="none" strike="noStrike">
+      <a:defRPr sz="1400" b="0" i="0" u="none" strike="noStrike" cap="none">
         <a:solidFill>
           <a:srgbClr val="000000"/>
         </a:solidFill>
@@ -493,7 +509,7 @@
         <a:sym typeface="Arial"/>
       </a:defRPr>
     </a:lvl1pPr>
-    <a:lvl2pPr lvl="1" marR="0" rtl="0" algn="l">
+    <a:lvl2pPr marR="0" lvl="1" algn="l" rtl="0">
       <a:lnSpc>
         <a:spcPct val="100000"/>
       </a:lnSpc>
@@ -507,7 +523,7 @@
         <a:srgbClr val="000000"/>
       </a:buClr>
       <a:buFont typeface="Arial"/>
-      <a:defRPr b="0" i="0" sz="1400" u="none" cap="none" strike="noStrike">
+      <a:defRPr sz="1400" b="0" i="0" u="none" strike="noStrike" cap="none">
         <a:solidFill>
           <a:srgbClr val="000000"/>
         </a:solidFill>
@@ -517,7 +533,7 @@
         <a:sym typeface="Arial"/>
       </a:defRPr>
     </a:lvl2pPr>
-    <a:lvl3pPr lvl="2" marR="0" rtl="0" algn="l">
+    <a:lvl3pPr marR="0" lvl="2" algn="l" rtl="0">
       <a:lnSpc>
         <a:spcPct val="100000"/>
       </a:lnSpc>
@@ -531,7 +547,7 @@
         <a:srgbClr val="000000"/>
       </a:buClr>
       <a:buFont typeface="Arial"/>
-      <a:defRPr b="0" i="0" sz="1400" u="none" cap="none" strike="noStrike">
+      <a:defRPr sz="1400" b="0" i="0" u="none" strike="noStrike" cap="none">
         <a:solidFill>
           <a:srgbClr val="000000"/>
         </a:solidFill>
@@ -541,7 +557,7 @@
         <a:sym typeface="Arial"/>
       </a:defRPr>
     </a:lvl3pPr>
-    <a:lvl4pPr lvl="3" marR="0" rtl="0" algn="l">
+    <a:lvl4pPr marR="0" lvl="3" algn="l" rtl="0">
       <a:lnSpc>
         <a:spcPct val="100000"/>
       </a:lnSpc>
@@ -555,7 +571,7 @@
         <a:srgbClr val="000000"/>
       </a:buClr>
       <a:buFont typeface="Arial"/>
-      <a:defRPr b="0" i="0" sz="1400" u="none" cap="none" strike="noStrike">
+      <a:defRPr sz="1400" b="0" i="0" u="none" strike="noStrike" cap="none">
         <a:solidFill>
           <a:srgbClr val="000000"/>
         </a:solidFill>
@@ -565,7 +581,7 @@
         <a:sym typeface="Arial"/>
       </a:defRPr>
     </a:lvl4pPr>
-    <a:lvl5pPr lvl="4" marR="0" rtl="0" algn="l">
+    <a:lvl5pPr marR="0" lvl="4" algn="l" rtl="0">
       <a:lnSpc>
         <a:spcPct val="100000"/>
       </a:lnSpc>
@@ -579,7 +595,7 @@
         <a:srgbClr val="000000"/>
       </a:buClr>
       <a:buFont typeface="Arial"/>
-      <a:defRPr b="0" i="0" sz="1400" u="none" cap="none" strike="noStrike">
+      <a:defRPr sz="1400" b="0" i="0" u="none" strike="noStrike" cap="none">
         <a:solidFill>
           <a:srgbClr val="000000"/>
         </a:solidFill>
@@ -589,7 +605,7 @@
         <a:sym typeface="Arial"/>
       </a:defRPr>
     </a:lvl5pPr>
-    <a:lvl6pPr lvl="5" marR="0" rtl="0" algn="l">
+    <a:lvl6pPr marR="0" lvl="5" algn="l" rtl="0">
       <a:lnSpc>
         <a:spcPct val="100000"/>
       </a:lnSpc>
@@ -603,7 +619,7 @@
         <a:srgbClr val="000000"/>
       </a:buClr>
       <a:buFont typeface="Arial"/>
-      <a:defRPr b="0" i="0" sz="1400" u="none" cap="none" strike="noStrike">
+      <a:defRPr sz="1400" b="0" i="0" u="none" strike="noStrike" cap="none">
         <a:solidFill>
           <a:srgbClr val="000000"/>
         </a:solidFill>
@@ -613,7 +629,7 @@
         <a:sym typeface="Arial"/>
       </a:defRPr>
     </a:lvl6pPr>
-    <a:lvl7pPr lvl="6" marR="0" rtl="0" algn="l">
+    <a:lvl7pPr marR="0" lvl="6" algn="l" rtl="0">
       <a:lnSpc>
         <a:spcPct val="100000"/>
       </a:lnSpc>
@@ -627,7 +643,7 @@
         <a:srgbClr val="000000"/>
       </a:buClr>
       <a:buFont typeface="Arial"/>
-      <a:defRPr b="0" i="0" sz="1400" u="none" cap="none" strike="noStrike">
+      <a:defRPr sz="1400" b="0" i="0" u="none" strike="noStrike" cap="none">
         <a:solidFill>
           <a:srgbClr val="000000"/>
         </a:solidFill>
@@ -637,7 +653,7 @@
         <a:sym typeface="Arial"/>
       </a:defRPr>
     </a:lvl7pPr>
-    <a:lvl8pPr lvl="7" marR="0" rtl="0" algn="l">
+    <a:lvl8pPr marR="0" lvl="7" algn="l" rtl="0">
       <a:lnSpc>
         <a:spcPct val="100000"/>
       </a:lnSpc>
@@ -651,7 +667,7 @@
         <a:srgbClr val="000000"/>
       </a:buClr>
       <a:buFont typeface="Arial"/>
-      <a:defRPr b="0" i="0" sz="1400" u="none" cap="none" strike="noStrike">
+      <a:defRPr sz="1400" b="0" i="0" u="none" strike="noStrike" cap="none">
         <a:solidFill>
           <a:srgbClr val="000000"/>
         </a:solidFill>
@@ -661,7 +677,7 @@
         <a:sym typeface="Arial"/>
       </a:defRPr>
     </a:lvl8pPr>
-    <a:lvl9pPr lvl="8" marR="0" rtl="0" algn="l">
+    <a:lvl9pPr marR="0" lvl="8" algn="l" rtl="0">
       <a:lnSpc>
         <a:spcPct val="100000"/>
       </a:lnSpc>
@@ -675,7 +691,7 @@
         <a:srgbClr val="000000"/>
       </a:buClr>
       <a:buFont typeface="Arial"/>
-      <a:defRPr b="0" i="0" sz="1400" u="none" cap="none" strike="noStrike">
+      <a:defRPr sz="1400" b="0" i="0" u="none" strike="noStrike" cap="none">
         <a:solidFill>
           <a:srgbClr val="000000"/>
         </a:solidFill>
@@ -690,11 +706,11 @@
 </file>
 
 <file path=ppt/notesSlides/notesSlide1.xml><?xml version="1.0" encoding="utf-8"?>
-<p:notes xmlns:a="http://schemas.openxmlformats.org/drawingml/2006/main" xmlns:r="http://schemas.openxmlformats.org/officeDocument/2006/relationships" xmlns:mc="http://schemas.openxmlformats.org/markup-compatibility/2006" xmlns:mv="urn:schemas-microsoft-com:mac:vml" xmlns:p="http://schemas.openxmlformats.org/presentationml/2006/main" xmlns:c="http://schemas.openxmlformats.org/drawingml/2006/chart" xmlns:dgm="http://schemas.openxmlformats.org/drawingml/2006/diagram" xmlns:o="urn:schemas-microsoft-com:office:office" xmlns:v="urn:schemas-microsoft-com:vml" xmlns:pvml="urn:schemas-microsoft-com:office:powerpoint" xmlns:com="http://schemas.openxmlformats.org/drawingml/2006/compatibility" xmlns:p14="http://schemas.microsoft.com/office/powerpoint/2010/main" xmlns:p15="http://schemas.microsoft.com/office/powerpoint/2012/main" xmlns:ahyp="http://schemas.microsoft.com/office/drawing/2018/hyperlinkcolor" showMasterPhAnim="0" showMasterSp="0">
+<p:notes xmlns:a="http://schemas.openxmlformats.org/drawingml/2006/main" xmlns:r="http://schemas.openxmlformats.org/officeDocument/2006/relationships" xmlns:p="http://schemas.openxmlformats.org/presentationml/2006/main" showMasterSp="0" showMasterPhAnim="0">
   <p:cSld>
     <p:spTree>
       <p:nvGrpSpPr>
-        <p:cNvPr id="50" name="Shape 50"/>
+        <p:cNvPr id="1" name="Shape 50"/>
         <p:cNvGrpSpPr/>
         <p:nvPr/>
       </p:nvGrpSpPr>
@@ -709,9 +725,11 @@
       <p:sp>
         <p:nvSpPr>
           <p:cNvPr id="51" name="Google Shape;51;p:notes"/>
-          <p:cNvSpPr/>
+          <p:cNvSpPr>
+            <a:spLocks noGrp="1" noRot="1" noChangeAspect="1"/>
+          </p:cNvSpPr>
           <p:nvPr>
-            <p:ph idx="2" type="sldImg"/>
+            <p:ph type="sldImg" idx="2"/>
           </p:nvPr>
         </p:nvSpPr>
         <p:spPr>
@@ -720,9 +738,13 @@
             <a:ext cx="6096075" cy="3429000"/>
           </a:xfrm>
           <a:custGeom>
-            <a:rect b="b" l="l" r="r" t="t"/>
+            <a:avLst/>
+            <a:gdLst/>
+            <a:ahLst/>
+            <a:cxnLst/>
+            <a:rect l="l" t="t" r="r" b="b"/>
             <a:pathLst>
-              <a:path extrusionOk="0" h="120000" w="120000">
+              <a:path w="120000" h="120000" extrusionOk="0">
                 <a:moveTo>
                   <a:pt x="0" y="0"/>
                 </a:moveTo>
@@ -744,9 +766,11 @@
       <p:sp>
         <p:nvSpPr>
           <p:cNvPr id="52" name="Google Shape;52;p:notes"/>
-          <p:cNvSpPr txBox="1"/>
+          <p:cNvSpPr txBox="1">
+            <a:spLocks noGrp="1"/>
+          </p:cNvSpPr>
           <p:nvPr>
-            <p:ph idx="1" type="body"/>
+            <p:ph type="body" idx="1"/>
           </p:nvPr>
         </p:nvSpPr>
         <p:spPr>
@@ -759,12 +783,12 @@
           </a:prstGeom>
         </p:spPr>
         <p:txBody>
-          <a:bodyPr anchorCtr="0" anchor="t" bIns="91425" lIns="91425" spcFirstLastPara="1" rIns="91425" wrap="square" tIns="91425">
+          <a:bodyPr spcFirstLastPara="1" wrap="square" lIns="91425" tIns="91425" rIns="91425" bIns="91425" anchor="t" anchorCtr="0">
             <a:noAutofit/>
           </a:bodyPr>
           <a:lstStyle/>
           <a:p>
-            <a:pPr indent="0" lvl="0" marL="0" rtl="0" algn="l">
+            <a:pPr marL="0" lvl="0" indent="0" algn="l" rtl="0">
               <a:spcBef>
                 <a:spcPts val="0"/>
               </a:spcBef>
@@ -773,9 +797,6 @@
               </a:spcAft>
               <a:buNone/>
             </a:pPr>
-            <a:r>
-              <a:t/>
-            </a:r>
             <a:endParaRPr/>
           </a:p>
         </p:txBody>
@@ -789,11 +810,11 @@
 </file>
 
 <file path=ppt/notesSlides/notesSlide2.xml><?xml version="1.0" encoding="utf-8"?>
-<p:notes xmlns:a="http://schemas.openxmlformats.org/drawingml/2006/main" xmlns:r="http://schemas.openxmlformats.org/officeDocument/2006/relationships" xmlns:mc="http://schemas.openxmlformats.org/markup-compatibility/2006" xmlns:mv="urn:schemas-microsoft-com:mac:vml" xmlns:p="http://schemas.openxmlformats.org/presentationml/2006/main" xmlns:c="http://schemas.openxmlformats.org/drawingml/2006/chart" xmlns:dgm="http://schemas.openxmlformats.org/drawingml/2006/diagram" xmlns:o="urn:schemas-microsoft-com:office:office" xmlns:v="urn:schemas-microsoft-com:vml" xmlns:pvml="urn:schemas-microsoft-com:office:powerpoint" xmlns:com="http://schemas.openxmlformats.org/drawingml/2006/compatibility" xmlns:p14="http://schemas.microsoft.com/office/powerpoint/2010/main" xmlns:p15="http://schemas.microsoft.com/office/powerpoint/2012/main" xmlns:ahyp="http://schemas.microsoft.com/office/drawing/2018/hyperlinkcolor" showMasterPhAnim="0" showMasterSp="0">
+<p:notes xmlns:a="http://schemas.openxmlformats.org/drawingml/2006/main" xmlns:r="http://schemas.openxmlformats.org/officeDocument/2006/relationships" xmlns:p="http://schemas.openxmlformats.org/presentationml/2006/main" showMasterSp="0" showMasterPhAnim="0">
   <p:cSld>
     <p:spTree>
       <p:nvGrpSpPr>
-        <p:cNvPr id="56" name="Shape 56"/>
+        <p:cNvPr id="1" name="Shape 56"/>
         <p:cNvGrpSpPr/>
         <p:nvPr/>
       </p:nvGrpSpPr>
@@ -808,20 +829,26 @@
       <p:sp>
         <p:nvSpPr>
           <p:cNvPr id="57" name="Google Shape;57;g3bcc5b4c7c9_0_0:notes"/>
-          <p:cNvSpPr/>
+          <p:cNvSpPr>
+            <a:spLocks noGrp="1" noRot="1" noChangeAspect="1"/>
+          </p:cNvSpPr>
           <p:nvPr>
-            <p:ph idx="2" type="sldImg"/>
+            <p:ph type="sldImg" idx="2"/>
           </p:nvPr>
         </p:nvSpPr>
         <p:spPr>
           <a:xfrm>
-            <a:off x="381300" y="685800"/>
+            <a:off x="381000" y="685800"/>
             <a:ext cx="6096000" cy="3429000"/>
           </a:xfrm>
           <a:custGeom>
-            <a:rect b="b" l="l" r="r" t="t"/>
+            <a:avLst/>
+            <a:gdLst/>
+            <a:ahLst/>
+            <a:cxnLst/>
+            <a:rect l="l" t="t" r="r" b="b"/>
             <a:pathLst>
-              <a:path extrusionOk="0" h="120000" w="120000">
+              <a:path w="120000" h="120000" extrusionOk="0">
                 <a:moveTo>
                   <a:pt x="0" y="0"/>
                 </a:moveTo>
@@ -843,9 +870,11 @@
       <p:sp>
         <p:nvSpPr>
           <p:cNvPr id="58" name="Google Shape;58;g3bcc5b4c7c9_0_0:notes"/>
-          <p:cNvSpPr txBox="1"/>
+          <p:cNvSpPr txBox="1">
+            <a:spLocks noGrp="1"/>
+          </p:cNvSpPr>
           <p:nvPr>
-            <p:ph idx="1" type="body"/>
+            <p:ph type="body" idx="1"/>
           </p:nvPr>
         </p:nvSpPr>
         <p:spPr>
@@ -858,12 +887,12 @@
           </a:prstGeom>
         </p:spPr>
         <p:txBody>
-          <a:bodyPr anchorCtr="0" anchor="t" bIns="91425" lIns="91425" spcFirstLastPara="1" rIns="91425" wrap="square" tIns="91425">
+          <a:bodyPr spcFirstLastPara="1" wrap="square" lIns="91425" tIns="91425" rIns="91425" bIns="91425" anchor="t" anchorCtr="0">
             <a:noAutofit/>
           </a:bodyPr>
           <a:lstStyle/>
           <a:p>
-            <a:pPr indent="0" lvl="0" marL="0" rtl="0" algn="l">
+            <a:pPr marL="0" lvl="0" indent="0" algn="l" rtl="0">
               <a:spcBef>
                 <a:spcPts val="0"/>
               </a:spcBef>
@@ -872,9 +901,6 @@
               </a:spcAft>
               <a:buNone/>
             </a:pPr>
-            <a:r>
-              <a:t/>
-            </a:r>
             <a:endParaRPr/>
           </a:p>
         </p:txBody>
@@ -888,11 +914,11 @@
 </file>
 
 <file path=ppt/notesSlides/notesSlide3.xml><?xml version="1.0" encoding="utf-8"?>
-<p:notes xmlns:a="http://schemas.openxmlformats.org/drawingml/2006/main" xmlns:r="http://schemas.openxmlformats.org/officeDocument/2006/relationships" xmlns:mc="http://schemas.openxmlformats.org/markup-compatibility/2006" xmlns:mv="urn:schemas-microsoft-com:mac:vml" xmlns:p="http://schemas.openxmlformats.org/presentationml/2006/main" xmlns:c="http://schemas.openxmlformats.org/drawingml/2006/chart" xmlns:dgm="http://schemas.openxmlformats.org/drawingml/2006/diagram" xmlns:o="urn:schemas-microsoft-com:office:office" xmlns:v="urn:schemas-microsoft-com:vml" xmlns:pvml="urn:schemas-microsoft-com:office:powerpoint" xmlns:com="http://schemas.openxmlformats.org/drawingml/2006/compatibility" xmlns:p14="http://schemas.microsoft.com/office/powerpoint/2010/main" xmlns:p15="http://schemas.microsoft.com/office/powerpoint/2012/main" xmlns:ahyp="http://schemas.microsoft.com/office/drawing/2018/hyperlinkcolor" showMasterPhAnim="0" showMasterSp="0">
+<p:notes xmlns:a="http://schemas.openxmlformats.org/drawingml/2006/main" xmlns:r="http://schemas.openxmlformats.org/officeDocument/2006/relationships" xmlns:p="http://schemas.openxmlformats.org/presentationml/2006/main" showMasterSp="0" showMasterPhAnim="0">
   <p:cSld>
     <p:spTree>
       <p:nvGrpSpPr>
-        <p:cNvPr id="64" name="Shape 64"/>
+        <p:cNvPr id="1" name="Shape 64"/>
         <p:cNvGrpSpPr/>
         <p:nvPr/>
       </p:nvGrpSpPr>
@@ -907,20 +933,26 @@
       <p:sp>
         <p:nvSpPr>
           <p:cNvPr id="65" name="Google Shape;65;g3bcc5b4c7c9_0_6:notes"/>
-          <p:cNvSpPr/>
+          <p:cNvSpPr>
+            <a:spLocks noGrp="1" noRot="1" noChangeAspect="1"/>
+          </p:cNvSpPr>
           <p:nvPr>
-            <p:ph idx="2" type="sldImg"/>
+            <p:ph type="sldImg" idx="2"/>
           </p:nvPr>
         </p:nvSpPr>
         <p:spPr>
           <a:xfrm>
-            <a:off x="381300" y="685800"/>
+            <a:off x="381000" y="685800"/>
             <a:ext cx="6096000" cy="3429000"/>
           </a:xfrm>
           <a:custGeom>
-            <a:rect b="b" l="l" r="r" t="t"/>
+            <a:avLst/>
+            <a:gdLst/>
+            <a:ahLst/>
+            <a:cxnLst/>
+            <a:rect l="l" t="t" r="r" b="b"/>
             <a:pathLst>
-              <a:path extrusionOk="0" h="120000" w="120000">
+              <a:path w="120000" h="120000" extrusionOk="0">
                 <a:moveTo>
                   <a:pt x="0" y="0"/>
                 </a:moveTo>
@@ -942,9 +974,11 @@
       <p:sp>
         <p:nvSpPr>
           <p:cNvPr id="66" name="Google Shape;66;g3bcc5b4c7c9_0_6:notes"/>
-          <p:cNvSpPr txBox="1"/>
+          <p:cNvSpPr txBox="1">
+            <a:spLocks noGrp="1"/>
+          </p:cNvSpPr>
           <p:nvPr>
-            <p:ph idx="1" type="body"/>
+            <p:ph type="body" idx="1"/>
           </p:nvPr>
         </p:nvSpPr>
         <p:spPr>
@@ -957,12 +991,12 @@
           </a:prstGeom>
         </p:spPr>
         <p:txBody>
-          <a:bodyPr anchorCtr="0" anchor="t" bIns="91425" lIns="91425" spcFirstLastPara="1" rIns="91425" wrap="square" tIns="91425">
+          <a:bodyPr spcFirstLastPara="1" wrap="square" lIns="91425" tIns="91425" rIns="91425" bIns="91425" anchor="t" anchorCtr="0">
             <a:noAutofit/>
           </a:bodyPr>
           <a:lstStyle/>
           <a:p>
-            <a:pPr indent="0" lvl="0" marL="0" rtl="0" algn="l">
+            <a:pPr marL="0" lvl="0" indent="0" algn="l" rtl="0">
               <a:spcBef>
                 <a:spcPts val="0"/>
               </a:spcBef>
@@ -971,9 +1005,6 @@
               </a:spcAft>
               <a:buNone/>
             </a:pPr>
-            <a:r>
-              <a:t/>
-            </a:r>
             <a:endParaRPr/>
           </a:p>
         </p:txBody>
@@ -987,11 +1018,11 @@
 </file>
 
 <file path=ppt/notesSlides/notesSlide4.xml><?xml version="1.0" encoding="utf-8"?>
-<p:notes xmlns:a="http://schemas.openxmlformats.org/drawingml/2006/main" xmlns:r="http://schemas.openxmlformats.org/officeDocument/2006/relationships" xmlns:mc="http://schemas.openxmlformats.org/markup-compatibility/2006" xmlns:mv="urn:schemas-microsoft-com:mac:vml" xmlns:p="http://schemas.openxmlformats.org/presentationml/2006/main" xmlns:c="http://schemas.openxmlformats.org/drawingml/2006/chart" xmlns:dgm="http://schemas.openxmlformats.org/drawingml/2006/diagram" xmlns:o="urn:schemas-microsoft-com:office:office" xmlns:v="urn:schemas-microsoft-com:vml" xmlns:pvml="urn:schemas-microsoft-com:office:powerpoint" xmlns:com="http://schemas.openxmlformats.org/drawingml/2006/compatibility" xmlns:p14="http://schemas.microsoft.com/office/powerpoint/2010/main" xmlns:p15="http://schemas.microsoft.com/office/powerpoint/2012/main" xmlns:ahyp="http://schemas.microsoft.com/office/drawing/2018/hyperlinkcolor" showMasterPhAnim="0" showMasterSp="0">
+<p:notes xmlns:a="http://schemas.openxmlformats.org/drawingml/2006/main" xmlns:r="http://schemas.openxmlformats.org/officeDocument/2006/relationships" xmlns:p="http://schemas.openxmlformats.org/presentationml/2006/main" showMasterSp="0" showMasterPhAnim="0">
   <p:cSld>
     <p:spTree>
       <p:nvGrpSpPr>
-        <p:cNvPr id="72" name="Shape 72"/>
+        <p:cNvPr id="1" name="Shape 72"/>
         <p:cNvGrpSpPr/>
         <p:nvPr/>
       </p:nvGrpSpPr>
@@ -1006,9 +1037,11 @@
       <p:sp>
         <p:nvSpPr>
           <p:cNvPr id="73" name="Google Shape;73;g3bcc5b4c7c9_2_0:notes"/>
-          <p:cNvSpPr/>
+          <p:cNvSpPr>
+            <a:spLocks noGrp="1" noRot="1" noChangeAspect="1"/>
+          </p:cNvSpPr>
           <p:nvPr>
-            <p:ph idx="2" type="sldImg"/>
+            <p:ph type="sldImg" idx="2"/>
           </p:nvPr>
         </p:nvSpPr>
         <p:spPr>
@@ -1017,9 +1050,13 @@
             <a:ext cx="6096000" cy="3429000"/>
           </a:xfrm>
           <a:custGeom>
-            <a:rect b="b" l="l" r="r" t="t"/>
+            <a:avLst/>
+            <a:gdLst/>
+            <a:ahLst/>
+            <a:cxnLst/>
+            <a:rect l="l" t="t" r="r" b="b"/>
             <a:pathLst>
-              <a:path extrusionOk="0" h="120000" w="120000">
+              <a:path w="120000" h="120000" extrusionOk="0">
                 <a:moveTo>
                   <a:pt x="0" y="0"/>
                 </a:moveTo>
@@ -1041,9 +1078,11 @@
       <p:sp>
         <p:nvSpPr>
           <p:cNvPr id="74" name="Google Shape;74;g3bcc5b4c7c9_2_0:notes"/>
-          <p:cNvSpPr txBox="1"/>
+          <p:cNvSpPr txBox="1">
+            <a:spLocks noGrp="1"/>
+          </p:cNvSpPr>
           <p:nvPr>
-            <p:ph idx="1" type="body"/>
+            <p:ph type="body" idx="1"/>
           </p:nvPr>
         </p:nvSpPr>
         <p:spPr>
@@ -1056,12 +1095,12 @@
           </a:prstGeom>
         </p:spPr>
         <p:txBody>
-          <a:bodyPr anchorCtr="0" anchor="t" bIns="91425" lIns="91425" spcFirstLastPara="1" rIns="91425" wrap="square" tIns="91425">
+          <a:bodyPr spcFirstLastPara="1" wrap="square" lIns="91425" tIns="91425" rIns="91425" bIns="91425" anchor="t" anchorCtr="0">
             <a:noAutofit/>
           </a:bodyPr>
           <a:lstStyle/>
           <a:p>
-            <a:pPr indent="0" lvl="0" marL="0" rtl="0" algn="l">
+            <a:pPr marL="0" lvl="0" indent="0" algn="l" rtl="0">
               <a:spcBef>
                 <a:spcPts val="0"/>
               </a:spcBef>
@@ -1070,9 +1109,6 @@
               </a:spcAft>
               <a:buNone/>
             </a:pPr>
-            <a:r>
-              <a:t/>
-            </a:r>
             <a:endParaRPr/>
           </a:p>
         </p:txBody>
@@ -1086,11 +1122,11 @@
 </file>
 
 <file path=ppt/slideLayouts/slideLayout1.xml><?xml version="1.0" encoding="utf-8"?>
-<p:sldLayout xmlns:a="http://schemas.openxmlformats.org/drawingml/2006/main" xmlns:r="http://schemas.openxmlformats.org/officeDocument/2006/relationships" xmlns:mc="http://schemas.openxmlformats.org/markup-compatibility/2006" xmlns:mv="urn:schemas-microsoft-com:mac:vml" xmlns:p="http://schemas.openxmlformats.org/presentationml/2006/main" xmlns:c="http://schemas.openxmlformats.org/drawingml/2006/chart" xmlns:dgm="http://schemas.openxmlformats.org/drawingml/2006/diagram" xmlns:o="urn:schemas-microsoft-com:office:office" xmlns:v="urn:schemas-microsoft-com:vml" xmlns:pvml="urn:schemas-microsoft-com:office:powerpoint" xmlns:com="http://schemas.openxmlformats.org/drawingml/2006/compatibility" xmlns:p14="http://schemas.microsoft.com/office/powerpoint/2010/main" xmlns:p15="http://schemas.microsoft.com/office/powerpoint/2012/main" xmlns:ahyp="http://schemas.microsoft.com/office/drawing/2018/hyperlinkcolor" matchingName="Title slide" type="title">
+<p:sldLayout xmlns:a="http://schemas.openxmlformats.org/drawingml/2006/main" xmlns:r="http://schemas.openxmlformats.org/officeDocument/2006/relationships" xmlns:p="http://schemas.openxmlformats.org/presentationml/2006/main" matchingName="Title slide" type="title">
   <p:cSld name="TITLE">
     <p:spTree>
       <p:nvGrpSpPr>
-        <p:cNvPr id="9" name="Shape 9"/>
+        <p:cNvPr id="1" name="Shape 9"/>
         <p:cNvGrpSpPr/>
         <p:nvPr/>
       </p:nvGrpSpPr>
@@ -1105,7 +1141,9 @@
       <p:sp>
         <p:nvSpPr>
           <p:cNvPr id="10" name="Google Shape;10;p2"/>
-          <p:cNvSpPr txBox="1"/>
+          <p:cNvSpPr txBox="1">
+            <a:spLocks noGrp="1"/>
+          </p:cNvSpPr>
           <p:nvPr>
             <p:ph type="ctrTitle"/>
           </p:nvPr>
@@ -1120,7 +1158,7 @@
           </a:prstGeom>
         </p:spPr>
         <p:txBody>
-          <a:bodyPr anchorCtr="0" anchor="b" bIns="91425" lIns="91425" spcFirstLastPara="1" rIns="91425" wrap="square" tIns="91425">
+          <a:bodyPr spcFirstLastPara="1" wrap="square" lIns="91425" tIns="91425" rIns="91425" bIns="91425" anchor="b" anchorCtr="0">
             <a:normAutofit/>
           </a:bodyPr>
           <a:lstStyle>
@@ -1224,15 +1262,19 @@
               <a:defRPr sz="5200"/>
             </a:lvl9pPr>
           </a:lstStyle>
-          <a:p/>
+          <a:p>
+            <a:endParaRPr/>
+          </a:p>
         </p:txBody>
       </p:sp>
       <p:sp>
         <p:nvSpPr>
           <p:cNvPr id="11" name="Google Shape;11;p2"/>
-          <p:cNvSpPr txBox="1"/>
+          <p:cNvSpPr txBox="1">
+            <a:spLocks noGrp="1"/>
+          </p:cNvSpPr>
           <p:nvPr>
-            <p:ph idx="1" type="subTitle"/>
+            <p:ph type="subTitle" idx="1"/>
           </p:nvPr>
         </p:nvSpPr>
         <p:spPr>
@@ -1245,7 +1287,7 @@
           </a:prstGeom>
         </p:spPr>
         <p:txBody>
-          <a:bodyPr anchorCtr="0" anchor="t" bIns="91425" lIns="91425" spcFirstLastPara="1" rIns="91425" wrap="square" tIns="91425">
+          <a:bodyPr spcFirstLastPara="1" wrap="square" lIns="91425" tIns="91425" rIns="91425" bIns="91425" anchor="t" anchorCtr="0">
             <a:normAutofit/>
           </a:bodyPr>
           <a:lstStyle>
@@ -1376,15 +1418,19 @@
               <a:defRPr sz="2800"/>
             </a:lvl9pPr>
           </a:lstStyle>
-          <a:p/>
+          <a:p>
+            <a:endParaRPr/>
+          </a:p>
         </p:txBody>
       </p:sp>
       <p:sp>
         <p:nvSpPr>
           <p:cNvPr id="12" name="Google Shape;12;p2"/>
-          <p:cNvSpPr txBox="1"/>
+          <p:cNvSpPr txBox="1">
+            <a:spLocks noGrp="1"/>
+          </p:cNvSpPr>
           <p:nvPr>
-            <p:ph idx="12" type="sldNum"/>
+            <p:ph type="sldNum" idx="12"/>
           </p:nvPr>
         </p:nvSpPr>
         <p:spPr>
@@ -1397,7 +1443,7 @@
           </a:prstGeom>
         </p:spPr>
         <p:txBody>
-          <a:bodyPr anchorCtr="0" anchor="ctr" bIns="91425" lIns="91425" spcFirstLastPara="1" rIns="91425" wrap="square" tIns="91425">
+          <a:bodyPr spcFirstLastPara="1" wrap="square" lIns="91425" tIns="91425" rIns="91425" bIns="91425" anchor="ctr" anchorCtr="0">
             <a:normAutofit/>
           </a:bodyPr>
           <a:lstStyle>
@@ -1439,7 +1485,7 @@
             </a:lvl9pPr>
           </a:lstStyle>
           <a:p>
-            <a:pPr indent="0" lvl="0" marL="0" rtl="0" algn="r">
+            <a:pPr marL="0" lvl="0" indent="0" algn="r" rtl="0">
               <a:spcBef>
                 <a:spcPts val="0"/>
               </a:spcBef>
@@ -1465,11 +1511,11 @@
 </file>
 
 <file path=ppt/slideLayouts/slideLayout10.xml><?xml version="1.0" encoding="utf-8"?>
-<p:sldLayout xmlns:a="http://schemas.openxmlformats.org/drawingml/2006/main" xmlns:r="http://schemas.openxmlformats.org/officeDocument/2006/relationships" xmlns:mc="http://schemas.openxmlformats.org/markup-compatibility/2006" xmlns:mv="urn:schemas-microsoft-com:mac:vml" xmlns:p="http://schemas.openxmlformats.org/presentationml/2006/main" xmlns:c="http://schemas.openxmlformats.org/drawingml/2006/chart" xmlns:dgm="http://schemas.openxmlformats.org/drawingml/2006/diagram" xmlns:o="urn:schemas-microsoft-com:office:office" xmlns:v="urn:schemas-microsoft-com:vml" xmlns:pvml="urn:schemas-microsoft-com:office:powerpoint" xmlns:com="http://schemas.openxmlformats.org/drawingml/2006/compatibility" xmlns:p14="http://schemas.microsoft.com/office/powerpoint/2010/main" xmlns:p15="http://schemas.microsoft.com/office/powerpoint/2012/main" xmlns:ahyp="http://schemas.microsoft.com/office/drawing/2018/hyperlinkcolor" matchingName="Big number">
+<p:sldLayout xmlns:a="http://schemas.openxmlformats.org/drawingml/2006/main" xmlns:r="http://schemas.openxmlformats.org/officeDocument/2006/relationships" xmlns:p="http://schemas.openxmlformats.org/presentationml/2006/main" matchingName="Big number">
   <p:cSld name="BIG_NUMBER">
     <p:spTree>
       <p:nvGrpSpPr>
-        <p:cNvPr id="44" name="Shape 44"/>
+        <p:cNvPr id="1" name="Shape 44"/>
         <p:cNvGrpSpPr/>
         <p:nvPr/>
       </p:nvGrpSpPr>
@@ -1484,9 +1530,11 @@
       <p:sp>
         <p:nvSpPr>
           <p:cNvPr id="45" name="Google Shape;45;p11"/>
-          <p:cNvSpPr txBox="1"/>
+          <p:cNvSpPr txBox="1">
+            <a:spLocks noGrp="1"/>
+          </p:cNvSpPr>
           <p:nvPr>
-            <p:ph hasCustomPrompt="1" type="title"/>
+            <p:ph type="title" hasCustomPrompt="1"/>
           </p:nvPr>
         </p:nvSpPr>
         <p:spPr>
@@ -1499,7 +1547,7 @@
           </a:prstGeom>
         </p:spPr>
         <p:txBody>
-          <a:bodyPr anchorCtr="0" anchor="b" bIns="91425" lIns="91425" spcFirstLastPara="1" rIns="91425" wrap="square" tIns="91425">
+          <a:bodyPr spcFirstLastPara="1" wrap="square" lIns="91425" tIns="91425" rIns="91425" bIns="91425" anchor="b" anchorCtr="0">
             <a:normAutofit/>
           </a:bodyPr>
           <a:lstStyle>
@@ -1613,9 +1661,11 @@
       <p:sp>
         <p:nvSpPr>
           <p:cNvPr id="46" name="Google Shape;46;p11"/>
-          <p:cNvSpPr txBox="1"/>
+          <p:cNvSpPr txBox="1">
+            <a:spLocks noGrp="1"/>
+          </p:cNvSpPr>
           <p:nvPr>
-            <p:ph idx="1" type="body"/>
+            <p:ph type="body" idx="1"/>
           </p:nvPr>
         </p:nvSpPr>
         <p:spPr>
@@ -1628,11 +1678,11 @@
           </a:prstGeom>
         </p:spPr>
         <p:txBody>
-          <a:bodyPr anchorCtr="0" anchor="t" bIns="91425" lIns="91425" spcFirstLastPara="1" rIns="91425" wrap="square" tIns="91425">
+          <a:bodyPr spcFirstLastPara="1" wrap="square" lIns="91425" tIns="91425" rIns="91425" bIns="91425" anchor="t" anchorCtr="0">
             <a:normAutofit/>
           </a:bodyPr>
           <a:lstStyle>
-            <a:lvl1pPr indent="-342900" lvl="0" marL="457200" algn="ctr">
+            <a:lvl1pPr marL="457200" lvl="0" indent="-342900" algn="ctr">
               <a:spcBef>
                 <a:spcPts val="0"/>
               </a:spcBef>
@@ -1643,7 +1693,7 @@
               <a:buChar char="●"/>
               <a:defRPr/>
             </a:lvl1pPr>
-            <a:lvl2pPr indent="-317500" lvl="1" marL="914400" algn="ctr">
+            <a:lvl2pPr marL="914400" lvl="1" indent="-317500" algn="ctr">
               <a:spcBef>
                 <a:spcPts val="0"/>
               </a:spcBef>
@@ -1654,7 +1704,7 @@
               <a:buChar char="○"/>
               <a:defRPr/>
             </a:lvl2pPr>
-            <a:lvl3pPr indent="-317500" lvl="2" marL="1371600" algn="ctr">
+            <a:lvl3pPr marL="1371600" lvl="2" indent="-317500" algn="ctr">
               <a:spcBef>
                 <a:spcPts val="0"/>
               </a:spcBef>
@@ -1665,7 +1715,7 @@
               <a:buChar char="■"/>
               <a:defRPr/>
             </a:lvl3pPr>
-            <a:lvl4pPr indent="-317500" lvl="3" marL="1828800" algn="ctr">
+            <a:lvl4pPr marL="1828800" lvl="3" indent="-317500" algn="ctr">
               <a:spcBef>
                 <a:spcPts val="0"/>
               </a:spcBef>
@@ -1676,7 +1726,7 @@
               <a:buChar char="●"/>
               <a:defRPr/>
             </a:lvl4pPr>
-            <a:lvl5pPr indent="-317500" lvl="4" marL="2286000" algn="ctr">
+            <a:lvl5pPr marL="2286000" lvl="4" indent="-317500" algn="ctr">
               <a:spcBef>
                 <a:spcPts val="0"/>
               </a:spcBef>
@@ -1687,7 +1737,7 @@
               <a:buChar char="○"/>
               <a:defRPr/>
             </a:lvl5pPr>
-            <a:lvl6pPr indent="-317500" lvl="5" marL="2743200" algn="ctr">
+            <a:lvl6pPr marL="2743200" lvl="5" indent="-317500" algn="ctr">
               <a:spcBef>
                 <a:spcPts val="0"/>
               </a:spcBef>
@@ -1698,7 +1748,7 @@
               <a:buChar char="■"/>
               <a:defRPr/>
             </a:lvl6pPr>
-            <a:lvl7pPr indent="-317500" lvl="6" marL="3200400" algn="ctr">
+            <a:lvl7pPr marL="3200400" lvl="6" indent="-317500" algn="ctr">
               <a:spcBef>
                 <a:spcPts val="0"/>
               </a:spcBef>
@@ -1709,7 +1759,7 @@
               <a:buChar char="●"/>
               <a:defRPr/>
             </a:lvl7pPr>
-            <a:lvl8pPr indent="-317500" lvl="7" marL="3657600" algn="ctr">
+            <a:lvl8pPr marL="3657600" lvl="7" indent="-317500" algn="ctr">
               <a:spcBef>
                 <a:spcPts val="0"/>
               </a:spcBef>
@@ -1720,7 +1770,7 @@
               <a:buChar char="○"/>
               <a:defRPr/>
             </a:lvl8pPr>
-            <a:lvl9pPr indent="-317500" lvl="8" marL="4114800" algn="ctr">
+            <a:lvl9pPr marL="4114800" lvl="8" indent="-317500" algn="ctr">
               <a:spcBef>
                 <a:spcPts val="0"/>
               </a:spcBef>
@@ -1732,15 +1782,19 @@
               <a:defRPr/>
             </a:lvl9pPr>
           </a:lstStyle>
-          <a:p/>
+          <a:p>
+            <a:endParaRPr/>
+          </a:p>
         </p:txBody>
       </p:sp>
       <p:sp>
         <p:nvSpPr>
           <p:cNvPr id="47" name="Google Shape;47;p11"/>
-          <p:cNvSpPr txBox="1"/>
+          <p:cNvSpPr txBox="1">
+            <a:spLocks noGrp="1"/>
+          </p:cNvSpPr>
           <p:nvPr>
-            <p:ph idx="12" type="sldNum"/>
+            <p:ph type="sldNum" idx="12"/>
           </p:nvPr>
         </p:nvSpPr>
         <p:spPr>
@@ -1753,7 +1807,7 @@
           </a:prstGeom>
         </p:spPr>
         <p:txBody>
-          <a:bodyPr anchorCtr="0" anchor="ctr" bIns="91425" lIns="91425" spcFirstLastPara="1" rIns="91425" wrap="square" tIns="91425">
+          <a:bodyPr spcFirstLastPara="1" wrap="square" lIns="91425" tIns="91425" rIns="91425" bIns="91425" anchor="ctr" anchorCtr="0">
             <a:normAutofit/>
           </a:bodyPr>
           <a:lstStyle>
@@ -1795,7 +1849,7 @@
             </a:lvl9pPr>
           </a:lstStyle>
           <a:p>
-            <a:pPr indent="0" lvl="0" marL="0" rtl="0" algn="r">
+            <a:pPr marL="0" lvl="0" indent="0" algn="r" rtl="0">
               <a:spcBef>
                 <a:spcPts val="0"/>
               </a:spcBef>
@@ -1821,11 +1875,11 @@
 </file>
 
 <file path=ppt/slideLayouts/slideLayout11.xml><?xml version="1.0" encoding="utf-8"?>
-<p:sldLayout xmlns:a="http://schemas.openxmlformats.org/drawingml/2006/main" xmlns:r="http://schemas.openxmlformats.org/officeDocument/2006/relationships" xmlns:mc="http://schemas.openxmlformats.org/markup-compatibility/2006" xmlns:mv="urn:schemas-microsoft-com:mac:vml" xmlns:p="http://schemas.openxmlformats.org/presentationml/2006/main" xmlns:c="http://schemas.openxmlformats.org/drawingml/2006/chart" xmlns:dgm="http://schemas.openxmlformats.org/drawingml/2006/diagram" xmlns:o="urn:schemas-microsoft-com:office:office" xmlns:v="urn:schemas-microsoft-com:vml" xmlns:pvml="urn:schemas-microsoft-com:office:powerpoint" xmlns:com="http://schemas.openxmlformats.org/drawingml/2006/compatibility" xmlns:p14="http://schemas.microsoft.com/office/powerpoint/2010/main" xmlns:p15="http://schemas.microsoft.com/office/powerpoint/2012/main" xmlns:ahyp="http://schemas.microsoft.com/office/drawing/2018/hyperlinkcolor" matchingName="Blank" type="blank">
+<p:sldLayout xmlns:a="http://schemas.openxmlformats.org/drawingml/2006/main" xmlns:r="http://schemas.openxmlformats.org/officeDocument/2006/relationships" xmlns:p="http://schemas.openxmlformats.org/presentationml/2006/main" matchingName="Blank" type="blank">
   <p:cSld name="BLANK">
     <p:spTree>
       <p:nvGrpSpPr>
-        <p:cNvPr id="48" name="Shape 48"/>
+        <p:cNvPr id="1" name="Shape 48"/>
         <p:cNvGrpSpPr/>
         <p:nvPr/>
       </p:nvGrpSpPr>
@@ -1840,9 +1894,11 @@
       <p:sp>
         <p:nvSpPr>
           <p:cNvPr id="49" name="Google Shape;49;p12"/>
-          <p:cNvSpPr txBox="1"/>
+          <p:cNvSpPr txBox="1">
+            <a:spLocks noGrp="1"/>
+          </p:cNvSpPr>
           <p:nvPr>
-            <p:ph idx="12" type="sldNum"/>
+            <p:ph type="sldNum" idx="12"/>
           </p:nvPr>
         </p:nvSpPr>
         <p:spPr>
@@ -1855,7 +1911,7 @@
           </a:prstGeom>
         </p:spPr>
         <p:txBody>
-          <a:bodyPr anchorCtr="0" anchor="ctr" bIns="91425" lIns="91425" spcFirstLastPara="1" rIns="91425" wrap="square" tIns="91425">
+          <a:bodyPr spcFirstLastPara="1" wrap="square" lIns="91425" tIns="91425" rIns="91425" bIns="91425" anchor="ctr" anchorCtr="0">
             <a:normAutofit/>
           </a:bodyPr>
           <a:lstStyle>
@@ -1897,7 +1953,7 @@
             </a:lvl9pPr>
           </a:lstStyle>
           <a:p>
-            <a:pPr indent="0" lvl="0" marL="0" rtl="0" algn="r">
+            <a:pPr marL="0" lvl="0" indent="0" algn="r" rtl="0">
               <a:spcBef>
                 <a:spcPts val="0"/>
               </a:spcBef>
@@ -1923,11 +1979,11 @@
 </file>
 
 <file path=ppt/slideLayouts/slideLayout2.xml><?xml version="1.0" encoding="utf-8"?>
-<p:sldLayout xmlns:a="http://schemas.openxmlformats.org/drawingml/2006/main" xmlns:r="http://schemas.openxmlformats.org/officeDocument/2006/relationships" xmlns:mc="http://schemas.openxmlformats.org/markup-compatibility/2006" xmlns:mv="urn:schemas-microsoft-com:mac:vml" xmlns:p="http://schemas.openxmlformats.org/presentationml/2006/main" xmlns:c="http://schemas.openxmlformats.org/drawingml/2006/chart" xmlns:dgm="http://schemas.openxmlformats.org/drawingml/2006/diagram" xmlns:o="urn:schemas-microsoft-com:office:office" xmlns:v="urn:schemas-microsoft-com:vml" xmlns:pvml="urn:schemas-microsoft-com:office:powerpoint" xmlns:com="http://schemas.openxmlformats.org/drawingml/2006/compatibility" xmlns:p14="http://schemas.microsoft.com/office/powerpoint/2010/main" xmlns:p15="http://schemas.microsoft.com/office/powerpoint/2012/main" xmlns:ahyp="http://schemas.microsoft.com/office/drawing/2018/hyperlinkcolor" matchingName="Section header" type="secHead">
+<p:sldLayout xmlns:a="http://schemas.openxmlformats.org/drawingml/2006/main" xmlns:r="http://schemas.openxmlformats.org/officeDocument/2006/relationships" xmlns:p="http://schemas.openxmlformats.org/presentationml/2006/main" matchingName="Section header" type="secHead">
   <p:cSld name="SECTION_HEADER">
     <p:spTree>
       <p:nvGrpSpPr>
-        <p:cNvPr id="13" name="Shape 13"/>
+        <p:cNvPr id="1" name="Shape 13"/>
         <p:cNvGrpSpPr/>
         <p:nvPr/>
       </p:nvGrpSpPr>
@@ -1942,7 +1998,9 @@
       <p:sp>
         <p:nvSpPr>
           <p:cNvPr id="14" name="Google Shape;14;p3"/>
-          <p:cNvSpPr txBox="1"/>
+          <p:cNvSpPr txBox="1">
+            <a:spLocks noGrp="1"/>
+          </p:cNvSpPr>
           <p:nvPr>
             <p:ph type="title"/>
           </p:nvPr>
@@ -1957,7 +2015,7 @@
           </a:prstGeom>
         </p:spPr>
         <p:txBody>
-          <a:bodyPr anchorCtr="0" anchor="ctr" bIns="91425" lIns="91425" spcFirstLastPara="1" rIns="91425" wrap="square" tIns="91425">
+          <a:bodyPr spcFirstLastPara="1" wrap="square" lIns="91425" tIns="91425" rIns="91425" bIns="91425" anchor="ctr" anchorCtr="0">
             <a:normAutofit/>
           </a:bodyPr>
           <a:lstStyle>
@@ -2061,15 +2119,19 @@
               <a:defRPr sz="3600"/>
             </a:lvl9pPr>
           </a:lstStyle>
-          <a:p/>
+          <a:p>
+            <a:endParaRPr/>
+          </a:p>
         </p:txBody>
       </p:sp>
       <p:sp>
         <p:nvSpPr>
           <p:cNvPr id="15" name="Google Shape;15;p3"/>
-          <p:cNvSpPr txBox="1"/>
+          <p:cNvSpPr txBox="1">
+            <a:spLocks noGrp="1"/>
+          </p:cNvSpPr>
           <p:nvPr>
-            <p:ph idx="12" type="sldNum"/>
+            <p:ph type="sldNum" idx="12"/>
           </p:nvPr>
         </p:nvSpPr>
         <p:spPr>
@@ -2082,7 +2144,7 @@
           </a:prstGeom>
         </p:spPr>
         <p:txBody>
-          <a:bodyPr anchorCtr="0" anchor="ctr" bIns="91425" lIns="91425" spcFirstLastPara="1" rIns="91425" wrap="square" tIns="91425">
+          <a:bodyPr spcFirstLastPara="1" wrap="square" lIns="91425" tIns="91425" rIns="91425" bIns="91425" anchor="ctr" anchorCtr="0">
             <a:normAutofit/>
           </a:bodyPr>
           <a:lstStyle>
@@ -2124,7 +2186,7 @@
             </a:lvl9pPr>
           </a:lstStyle>
           <a:p>
-            <a:pPr indent="0" lvl="0" marL="0" rtl="0" algn="r">
+            <a:pPr marL="0" lvl="0" indent="0" algn="r" rtl="0">
               <a:spcBef>
                 <a:spcPts val="0"/>
               </a:spcBef>
@@ -2150,11 +2212,11 @@
 </file>
 
 <file path=ppt/slideLayouts/slideLayout3.xml><?xml version="1.0" encoding="utf-8"?>
-<p:sldLayout xmlns:a="http://schemas.openxmlformats.org/drawingml/2006/main" xmlns:r="http://schemas.openxmlformats.org/officeDocument/2006/relationships" xmlns:mc="http://schemas.openxmlformats.org/markup-compatibility/2006" xmlns:mv="urn:schemas-microsoft-com:mac:vml" xmlns:p="http://schemas.openxmlformats.org/presentationml/2006/main" xmlns:c="http://schemas.openxmlformats.org/drawingml/2006/chart" xmlns:dgm="http://schemas.openxmlformats.org/drawingml/2006/diagram" xmlns:o="urn:schemas-microsoft-com:office:office" xmlns:v="urn:schemas-microsoft-com:vml" xmlns:pvml="urn:schemas-microsoft-com:office:powerpoint" xmlns:com="http://schemas.openxmlformats.org/drawingml/2006/compatibility" xmlns:p14="http://schemas.microsoft.com/office/powerpoint/2010/main" xmlns:p15="http://schemas.microsoft.com/office/powerpoint/2012/main" xmlns:ahyp="http://schemas.microsoft.com/office/drawing/2018/hyperlinkcolor" matchingName="Title and body" type="tx">
+<p:sldLayout xmlns:a="http://schemas.openxmlformats.org/drawingml/2006/main" xmlns:r="http://schemas.openxmlformats.org/officeDocument/2006/relationships" xmlns:p="http://schemas.openxmlformats.org/presentationml/2006/main" matchingName="Title and body" type="tx">
   <p:cSld name="TITLE_AND_BODY">
     <p:spTree>
       <p:nvGrpSpPr>
-        <p:cNvPr id="16" name="Shape 16"/>
+        <p:cNvPr id="1" name="Shape 16"/>
         <p:cNvGrpSpPr/>
         <p:nvPr/>
       </p:nvGrpSpPr>
@@ -2169,7 +2231,9 @@
       <p:sp>
         <p:nvSpPr>
           <p:cNvPr id="17" name="Google Shape;17;p4"/>
-          <p:cNvSpPr txBox="1"/>
+          <p:cNvSpPr txBox="1">
+            <a:spLocks noGrp="1"/>
+          </p:cNvSpPr>
           <p:nvPr>
             <p:ph type="title"/>
           </p:nvPr>
@@ -2184,7 +2248,7 @@
           </a:prstGeom>
         </p:spPr>
         <p:txBody>
-          <a:bodyPr anchorCtr="0" anchor="t" bIns="91425" lIns="91425" spcFirstLastPara="1" rIns="91425" wrap="square" tIns="91425">
+          <a:bodyPr spcFirstLastPara="1" wrap="square" lIns="91425" tIns="91425" rIns="91425" bIns="91425" anchor="t" anchorCtr="0">
             <a:normAutofit/>
           </a:bodyPr>
           <a:lstStyle>
@@ -2288,15 +2352,19 @@
               <a:defRPr/>
             </a:lvl9pPr>
           </a:lstStyle>
-          <a:p/>
+          <a:p>
+            <a:endParaRPr/>
+          </a:p>
         </p:txBody>
       </p:sp>
       <p:sp>
         <p:nvSpPr>
           <p:cNvPr id="18" name="Google Shape;18;p4"/>
-          <p:cNvSpPr txBox="1"/>
+          <p:cNvSpPr txBox="1">
+            <a:spLocks noGrp="1"/>
+          </p:cNvSpPr>
           <p:nvPr>
-            <p:ph idx="1" type="body"/>
+            <p:ph type="body" idx="1"/>
           </p:nvPr>
         </p:nvSpPr>
         <p:spPr>
@@ -2309,11 +2377,11 @@
           </a:prstGeom>
         </p:spPr>
         <p:txBody>
-          <a:bodyPr anchorCtr="0" anchor="t" bIns="91425" lIns="91425" spcFirstLastPara="1" rIns="91425" wrap="square" tIns="91425">
+          <a:bodyPr spcFirstLastPara="1" wrap="square" lIns="91425" tIns="91425" rIns="91425" bIns="91425" anchor="t" anchorCtr="0">
             <a:normAutofit/>
           </a:bodyPr>
           <a:lstStyle>
-            <a:lvl1pPr indent="-342900" lvl="0" marL="457200">
+            <a:lvl1pPr marL="457200" lvl="0" indent="-342900">
               <a:spcBef>
                 <a:spcPts val="0"/>
               </a:spcBef>
@@ -2324,7 +2392,7 @@
               <a:buChar char="●"/>
               <a:defRPr/>
             </a:lvl1pPr>
-            <a:lvl2pPr indent="-317500" lvl="1" marL="914400">
+            <a:lvl2pPr marL="914400" lvl="1" indent="-317500">
               <a:spcBef>
                 <a:spcPts val="0"/>
               </a:spcBef>
@@ -2335,7 +2403,7 @@
               <a:buChar char="○"/>
               <a:defRPr/>
             </a:lvl2pPr>
-            <a:lvl3pPr indent="-317500" lvl="2" marL="1371600">
+            <a:lvl3pPr marL="1371600" lvl="2" indent="-317500">
               <a:spcBef>
                 <a:spcPts val="0"/>
               </a:spcBef>
@@ -2346,7 +2414,7 @@
               <a:buChar char="■"/>
               <a:defRPr/>
             </a:lvl3pPr>
-            <a:lvl4pPr indent="-317500" lvl="3" marL="1828800">
+            <a:lvl4pPr marL="1828800" lvl="3" indent="-317500">
               <a:spcBef>
                 <a:spcPts val="0"/>
               </a:spcBef>
@@ -2357,7 +2425,7 @@
               <a:buChar char="●"/>
               <a:defRPr/>
             </a:lvl4pPr>
-            <a:lvl5pPr indent="-317500" lvl="4" marL="2286000">
+            <a:lvl5pPr marL="2286000" lvl="4" indent="-317500">
               <a:spcBef>
                 <a:spcPts val="0"/>
               </a:spcBef>
@@ -2368,7 +2436,7 @@
               <a:buChar char="○"/>
               <a:defRPr/>
             </a:lvl5pPr>
-            <a:lvl6pPr indent="-317500" lvl="5" marL="2743200">
+            <a:lvl6pPr marL="2743200" lvl="5" indent="-317500">
               <a:spcBef>
                 <a:spcPts val="0"/>
               </a:spcBef>
@@ -2379,7 +2447,7 @@
               <a:buChar char="■"/>
               <a:defRPr/>
             </a:lvl6pPr>
-            <a:lvl7pPr indent="-317500" lvl="6" marL="3200400">
+            <a:lvl7pPr marL="3200400" lvl="6" indent="-317500">
               <a:spcBef>
                 <a:spcPts val="0"/>
               </a:spcBef>
@@ -2390,7 +2458,7 @@
               <a:buChar char="●"/>
               <a:defRPr/>
             </a:lvl7pPr>
-            <a:lvl8pPr indent="-317500" lvl="7" marL="3657600">
+            <a:lvl8pPr marL="3657600" lvl="7" indent="-317500">
               <a:spcBef>
                 <a:spcPts val="0"/>
               </a:spcBef>
@@ -2401,7 +2469,7 @@
               <a:buChar char="○"/>
               <a:defRPr/>
             </a:lvl8pPr>
-            <a:lvl9pPr indent="-317500" lvl="8" marL="4114800">
+            <a:lvl9pPr marL="4114800" lvl="8" indent="-317500">
               <a:spcBef>
                 <a:spcPts val="0"/>
               </a:spcBef>
@@ -2413,15 +2481,19 @@
               <a:defRPr/>
             </a:lvl9pPr>
           </a:lstStyle>
-          <a:p/>
+          <a:p>
+            <a:endParaRPr/>
+          </a:p>
         </p:txBody>
       </p:sp>
       <p:sp>
         <p:nvSpPr>
           <p:cNvPr id="19" name="Google Shape;19;p4"/>
-          <p:cNvSpPr txBox="1"/>
+          <p:cNvSpPr txBox="1">
+            <a:spLocks noGrp="1"/>
+          </p:cNvSpPr>
           <p:nvPr>
-            <p:ph idx="12" type="sldNum"/>
+            <p:ph type="sldNum" idx="12"/>
           </p:nvPr>
         </p:nvSpPr>
         <p:spPr>
@@ -2434,7 +2506,7 @@
           </a:prstGeom>
         </p:spPr>
         <p:txBody>
-          <a:bodyPr anchorCtr="0" anchor="ctr" bIns="91425" lIns="91425" spcFirstLastPara="1" rIns="91425" wrap="square" tIns="91425">
+          <a:bodyPr spcFirstLastPara="1" wrap="square" lIns="91425" tIns="91425" rIns="91425" bIns="91425" anchor="ctr" anchorCtr="0">
             <a:normAutofit/>
           </a:bodyPr>
           <a:lstStyle>
@@ -2476,7 +2548,7 @@
             </a:lvl9pPr>
           </a:lstStyle>
           <a:p>
-            <a:pPr indent="0" lvl="0" marL="0" rtl="0" algn="r">
+            <a:pPr marL="0" lvl="0" indent="0" algn="r" rtl="0">
               <a:spcBef>
                 <a:spcPts val="0"/>
               </a:spcBef>
@@ -2502,11 +2574,11 @@
 </file>
 
 <file path=ppt/slideLayouts/slideLayout4.xml><?xml version="1.0" encoding="utf-8"?>
-<p:sldLayout xmlns:a="http://schemas.openxmlformats.org/drawingml/2006/main" xmlns:r="http://schemas.openxmlformats.org/officeDocument/2006/relationships" xmlns:mc="http://schemas.openxmlformats.org/markup-compatibility/2006" xmlns:mv="urn:schemas-microsoft-com:mac:vml" xmlns:p="http://schemas.openxmlformats.org/presentationml/2006/main" xmlns:c="http://schemas.openxmlformats.org/drawingml/2006/chart" xmlns:dgm="http://schemas.openxmlformats.org/drawingml/2006/diagram" xmlns:o="urn:schemas-microsoft-com:office:office" xmlns:v="urn:schemas-microsoft-com:vml" xmlns:pvml="urn:schemas-microsoft-com:office:powerpoint" xmlns:com="http://schemas.openxmlformats.org/drawingml/2006/compatibility" xmlns:p14="http://schemas.microsoft.com/office/powerpoint/2010/main" xmlns:p15="http://schemas.microsoft.com/office/powerpoint/2012/main" xmlns:ahyp="http://schemas.microsoft.com/office/drawing/2018/hyperlinkcolor" matchingName="Title and two columns" type="twoColTx">
+<p:sldLayout xmlns:a="http://schemas.openxmlformats.org/drawingml/2006/main" xmlns:r="http://schemas.openxmlformats.org/officeDocument/2006/relationships" xmlns:p="http://schemas.openxmlformats.org/presentationml/2006/main" matchingName="Title and two columns" type="twoColTx">
   <p:cSld name="TITLE_AND_TWO_COLUMNS">
     <p:spTree>
       <p:nvGrpSpPr>
-        <p:cNvPr id="20" name="Shape 20"/>
+        <p:cNvPr id="1" name="Shape 20"/>
         <p:cNvGrpSpPr/>
         <p:nvPr/>
       </p:nvGrpSpPr>
@@ -2521,7 +2593,9 @@
       <p:sp>
         <p:nvSpPr>
           <p:cNvPr id="21" name="Google Shape;21;p5"/>
-          <p:cNvSpPr txBox="1"/>
+          <p:cNvSpPr txBox="1">
+            <a:spLocks noGrp="1"/>
+          </p:cNvSpPr>
           <p:nvPr>
             <p:ph type="title"/>
           </p:nvPr>
@@ -2536,7 +2610,7 @@
           </a:prstGeom>
         </p:spPr>
         <p:txBody>
-          <a:bodyPr anchorCtr="0" anchor="t" bIns="91425" lIns="91425" spcFirstLastPara="1" rIns="91425" wrap="square" tIns="91425">
+          <a:bodyPr spcFirstLastPara="1" wrap="square" lIns="91425" tIns="91425" rIns="91425" bIns="91425" anchor="t" anchorCtr="0">
             <a:normAutofit/>
           </a:bodyPr>
           <a:lstStyle>
@@ -2640,15 +2714,19 @@
               <a:defRPr/>
             </a:lvl9pPr>
           </a:lstStyle>
-          <a:p/>
+          <a:p>
+            <a:endParaRPr/>
+          </a:p>
         </p:txBody>
       </p:sp>
       <p:sp>
         <p:nvSpPr>
           <p:cNvPr id="22" name="Google Shape;22;p5"/>
-          <p:cNvSpPr txBox="1"/>
+          <p:cNvSpPr txBox="1">
+            <a:spLocks noGrp="1"/>
+          </p:cNvSpPr>
           <p:nvPr>
-            <p:ph idx="1" type="body"/>
+            <p:ph type="body" idx="1"/>
           </p:nvPr>
         </p:nvSpPr>
         <p:spPr>
@@ -2661,11 +2739,11 @@
           </a:prstGeom>
         </p:spPr>
         <p:txBody>
-          <a:bodyPr anchorCtr="0" anchor="t" bIns="91425" lIns="91425" spcFirstLastPara="1" rIns="91425" wrap="square" tIns="91425">
+          <a:bodyPr spcFirstLastPara="1" wrap="square" lIns="91425" tIns="91425" rIns="91425" bIns="91425" anchor="t" anchorCtr="0">
             <a:normAutofit/>
           </a:bodyPr>
           <a:lstStyle>
-            <a:lvl1pPr indent="-317500" lvl="0" marL="457200">
+            <a:lvl1pPr marL="457200" lvl="0" indent="-317500">
               <a:spcBef>
                 <a:spcPts val="0"/>
               </a:spcBef>
@@ -2676,7 +2754,7 @@
               <a:buChar char="●"/>
               <a:defRPr sz="1400"/>
             </a:lvl1pPr>
-            <a:lvl2pPr indent="-304800" lvl="1" marL="914400">
+            <a:lvl2pPr marL="914400" lvl="1" indent="-304800">
               <a:spcBef>
                 <a:spcPts val="0"/>
               </a:spcBef>
@@ -2687,7 +2765,7 @@
               <a:buChar char="○"/>
               <a:defRPr sz="1200"/>
             </a:lvl2pPr>
-            <a:lvl3pPr indent="-304800" lvl="2" marL="1371600">
+            <a:lvl3pPr marL="1371600" lvl="2" indent="-304800">
               <a:spcBef>
                 <a:spcPts val="0"/>
               </a:spcBef>
@@ -2698,7 +2776,7 @@
               <a:buChar char="■"/>
               <a:defRPr sz="1200"/>
             </a:lvl3pPr>
-            <a:lvl4pPr indent="-304800" lvl="3" marL="1828800">
+            <a:lvl4pPr marL="1828800" lvl="3" indent="-304800">
               <a:spcBef>
                 <a:spcPts val="0"/>
               </a:spcBef>
@@ -2709,7 +2787,7 @@
               <a:buChar char="●"/>
               <a:defRPr sz="1200"/>
             </a:lvl4pPr>
-            <a:lvl5pPr indent="-304800" lvl="4" marL="2286000">
+            <a:lvl5pPr marL="2286000" lvl="4" indent="-304800">
               <a:spcBef>
                 <a:spcPts val="0"/>
               </a:spcBef>
@@ -2720,7 +2798,7 @@
               <a:buChar char="○"/>
               <a:defRPr sz="1200"/>
             </a:lvl5pPr>
-            <a:lvl6pPr indent="-304800" lvl="5" marL="2743200">
+            <a:lvl6pPr marL="2743200" lvl="5" indent="-304800">
               <a:spcBef>
                 <a:spcPts val="0"/>
               </a:spcBef>
@@ -2731,7 +2809,7 @@
               <a:buChar char="■"/>
               <a:defRPr sz="1200"/>
             </a:lvl6pPr>
-            <a:lvl7pPr indent="-304800" lvl="6" marL="3200400">
+            <a:lvl7pPr marL="3200400" lvl="6" indent="-304800">
               <a:spcBef>
                 <a:spcPts val="0"/>
               </a:spcBef>
@@ -2742,7 +2820,7 @@
               <a:buChar char="●"/>
               <a:defRPr sz="1200"/>
             </a:lvl7pPr>
-            <a:lvl8pPr indent="-304800" lvl="7" marL="3657600">
+            <a:lvl8pPr marL="3657600" lvl="7" indent="-304800">
               <a:spcBef>
                 <a:spcPts val="0"/>
               </a:spcBef>
@@ -2753,7 +2831,7 @@
               <a:buChar char="○"/>
               <a:defRPr sz="1200"/>
             </a:lvl8pPr>
-            <a:lvl9pPr indent="-304800" lvl="8" marL="4114800">
+            <a:lvl9pPr marL="4114800" lvl="8" indent="-304800">
               <a:spcBef>
                 <a:spcPts val="0"/>
               </a:spcBef>
@@ -2765,15 +2843,19 @@
               <a:defRPr sz="1200"/>
             </a:lvl9pPr>
           </a:lstStyle>
-          <a:p/>
+          <a:p>
+            <a:endParaRPr/>
+          </a:p>
         </p:txBody>
       </p:sp>
       <p:sp>
         <p:nvSpPr>
           <p:cNvPr id="23" name="Google Shape;23;p5"/>
-          <p:cNvSpPr txBox="1"/>
+          <p:cNvSpPr txBox="1">
+            <a:spLocks noGrp="1"/>
+          </p:cNvSpPr>
           <p:nvPr>
-            <p:ph idx="2" type="body"/>
+            <p:ph type="body" idx="2"/>
           </p:nvPr>
         </p:nvSpPr>
         <p:spPr>
@@ -2786,11 +2868,11 @@
           </a:prstGeom>
         </p:spPr>
         <p:txBody>
-          <a:bodyPr anchorCtr="0" anchor="t" bIns="91425" lIns="91425" spcFirstLastPara="1" rIns="91425" wrap="square" tIns="91425">
+          <a:bodyPr spcFirstLastPara="1" wrap="square" lIns="91425" tIns="91425" rIns="91425" bIns="91425" anchor="t" anchorCtr="0">
             <a:normAutofit/>
           </a:bodyPr>
           <a:lstStyle>
-            <a:lvl1pPr indent="-317500" lvl="0" marL="457200">
+            <a:lvl1pPr marL="457200" lvl="0" indent="-317500">
               <a:spcBef>
                 <a:spcPts val="0"/>
               </a:spcBef>
@@ -2801,7 +2883,7 @@
               <a:buChar char="●"/>
               <a:defRPr sz="1400"/>
             </a:lvl1pPr>
-            <a:lvl2pPr indent="-304800" lvl="1" marL="914400">
+            <a:lvl2pPr marL="914400" lvl="1" indent="-304800">
               <a:spcBef>
                 <a:spcPts val="0"/>
               </a:spcBef>
@@ -2812,7 +2894,7 @@
               <a:buChar char="○"/>
               <a:defRPr sz="1200"/>
             </a:lvl2pPr>
-            <a:lvl3pPr indent="-304800" lvl="2" marL="1371600">
+            <a:lvl3pPr marL="1371600" lvl="2" indent="-304800">
               <a:spcBef>
                 <a:spcPts val="0"/>
               </a:spcBef>
@@ -2823,7 +2905,7 @@
               <a:buChar char="■"/>
               <a:defRPr sz="1200"/>
             </a:lvl3pPr>
-            <a:lvl4pPr indent="-304800" lvl="3" marL="1828800">
+            <a:lvl4pPr marL="1828800" lvl="3" indent="-304800">
               <a:spcBef>
                 <a:spcPts val="0"/>
               </a:spcBef>
@@ -2834,7 +2916,7 @@
               <a:buChar char="●"/>
               <a:defRPr sz="1200"/>
             </a:lvl4pPr>
-            <a:lvl5pPr indent="-304800" lvl="4" marL="2286000">
+            <a:lvl5pPr marL="2286000" lvl="4" indent="-304800">
               <a:spcBef>
                 <a:spcPts val="0"/>
               </a:spcBef>
@@ -2845,7 +2927,7 @@
               <a:buChar char="○"/>
               <a:defRPr sz="1200"/>
             </a:lvl5pPr>
-            <a:lvl6pPr indent="-304800" lvl="5" marL="2743200">
+            <a:lvl6pPr marL="2743200" lvl="5" indent="-304800">
               <a:spcBef>
                 <a:spcPts val="0"/>
               </a:spcBef>
@@ -2856,7 +2938,7 @@
               <a:buChar char="■"/>
               <a:defRPr sz="1200"/>
             </a:lvl6pPr>
-            <a:lvl7pPr indent="-304800" lvl="6" marL="3200400">
+            <a:lvl7pPr marL="3200400" lvl="6" indent="-304800">
               <a:spcBef>
                 <a:spcPts val="0"/>
               </a:spcBef>
@@ -2867,7 +2949,7 @@
               <a:buChar char="●"/>
               <a:defRPr sz="1200"/>
             </a:lvl7pPr>
-            <a:lvl8pPr indent="-304800" lvl="7" marL="3657600">
+            <a:lvl8pPr marL="3657600" lvl="7" indent="-304800">
               <a:spcBef>
                 <a:spcPts val="0"/>
               </a:spcBef>
@@ -2878,7 +2960,7 @@
               <a:buChar char="○"/>
               <a:defRPr sz="1200"/>
             </a:lvl8pPr>
-            <a:lvl9pPr indent="-304800" lvl="8" marL="4114800">
+            <a:lvl9pPr marL="4114800" lvl="8" indent="-304800">
               <a:spcBef>
                 <a:spcPts val="0"/>
               </a:spcBef>
@@ -2890,15 +2972,19 @@
               <a:defRPr sz="1200"/>
             </a:lvl9pPr>
           </a:lstStyle>
-          <a:p/>
+          <a:p>
+            <a:endParaRPr/>
+          </a:p>
         </p:txBody>
       </p:sp>
       <p:sp>
         <p:nvSpPr>
           <p:cNvPr id="24" name="Google Shape;24;p5"/>
-          <p:cNvSpPr txBox="1"/>
+          <p:cNvSpPr txBox="1">
+            <a:spLocks noGrp="1"/>
+          </p:cNvSpPr>
           <p:nvPr>
-            <p:ph idx="12" type="sldNum"/>
+            <p:ph type="sldNum" idx="12"/>
           </p:nvPr>
         </p:nvSpPr>
         <p:spPr>
@@ -2911,7 +2997,7 @@
           </a:prstGeom>
         </p:spPr>
         <p:txBody>
-          <a:bodyPr anchorCtr="0" anchor="ctr" bIns="91425" lIns="91425" spcFirstLastPara="1" rIns="91425" wrap="square" tIns="91425">
+          <a:bodyPr spcFirstLastPara="1" wrap="square" lIns="91425" tIns="91425" rIns="91425" bIns="91425" anchor="ctr" anchorCtr="0">
             <a:normAutofit/>
           </a:bodyPr>
           <a:lstStyle>
@@ -2953,7 +3039,7 @@
             </a:lvl9pPr>
           </a:lstStyle>
           <a:p>
-            <a:pPr indent="0" lvl="0" marL="0" rtl="0" algn="r">
+            <a:pPr marL="0" lvl="0" indent="0" algn="r" rtl="0">
               <a:spcBef>
                 <a:spcPts val="0"/>
               </a:spcBef>
@@ -2979,11 +3065,11 @@
 </file>
 
 <file path=ppt/slideLayouts/slideLayout5.xml><?xml version="1.0" encoding="utf-8"?>
-<p:sldLayout xmlns:a="http://schemas.openxmlformats.org/drawingml/2006/main" xmlns:r="http://schemas.openxmlformats.org/officeDocument/2006/relationships" xmlns:mc="http://schemas.openxmlformats.org/markup-compatibility/2006" xmlns:mv="urn:schemas-microsoft-com:mac:vml" xmlns:p="http://schemas.openxmlformats.org/presentationml/2006/main" xmlns:c="http://schemas.openxmlformats.org/drawingml/2006/chart" xmlns:dgm="http://schemas.openxmlformats.org/drawingml/2006/diagram" xmlns:o="urn:schemas-microsoft-com:office:office" xmlns:v="urn:schemas-microsoft-com:vml" xmlns:pvml="urn:schemas-microsoft-com:office:powerpoint" xmlns:com="http://schemas.openxmlformats.org/drawingml/2006/compatibility" xmlns:p14="http://schemas.microsoft.com/office/powerpoint/2010/main" xmlns:p15="http://schemas.microsoft.com/office/powerpoint/2012/main" xmlns:ahyp="http://schemas.microsoft.com/office/drawing/2018/hyperlinkcolor" matchingName="Title only" type="titleOnly">
+<p:sldLayout xmlns:a="http://schemas.openxmlformats.org/drawingml/2006/main" xmlns:r="http://schemas.openxmlformats.org/officeDocument/2006/relationships" xmlns:p="http://schemas.openxmlformats.org/presentationml/2006/main" matchingName="Title only" type="titleOnly">
   <p:cSld name="TITLE_ONLY">
     <p:spTree>
       <p:nvGrpSpPr>
-        <p:cNvPr id="25" name="Shape 25"/>
+        <p:cNvPr id="1" name="Shape 25"/>
         <p:cNvGrpSpPr/>
         <p:nvPr/>
       </p:nvGrpSpPr>
@@ -2998,7 +3084,9 @@
       <p:sp>
         <p:nvSpPr>
           <p:cNvPr id="26" name="Google Shape;26;p6"/>
-          <p:cNvSpPr txBox="1"/>
+          <p:cNvSpPr txBox="1">
+            <a:spLocks noGrp="1"/>
+          </p:cNvSpPr>
           <p:nvPr>
             <p:ph type="title"/>
           </p:nvPr>
@@ -3013,7 +3101,7 @@
           </a:prstGeom>
         </p:spPr>
         <p:txBody>
-          <a:bodyPr anchorCtr="0" anchor="t" bIns="91425" lIns="91425" spcFirstLastPara="1" rIns="91425" wrap="square" tIns="91425">
+          <a:bodyPr spcFirstLastPara="1" wrap="square" lIns="91425" tIns="91425" rIns="91425" bIns="91425" anchor="t" anchorCtr="0">
             <a:normAutofit/>
           </a:bodyPr>
           <a:lstStyle>
@@ -3117,15 +3205,19 @@
               <a:defRPr/>
             </a:lvl9pPr>
           </a:lstStyle>
-          <a:p/>
+          <a:p>
+            <a:endParaRPr/>
+          </a:p>
         </p:txBody>
       </p:sp>
       <p:sp>
         <p:nvSpPr>
           <p:cNvPr id="27" name="Google Shape;27;p6"/>
-          <p:cNvSpPr txBox="1"/>
+          <p:cNvSpPr txBox="1">
+            <a:spLocks noGrp="1"/>
+          </p:cNvSpPr>
           <p:nvPr>
-            <p:ph idx="12" type="sldNum"/>
+            <p:ph type="sldNum" idx="12"/>
           </p:nvPr>
         </p:nvSpPr>
         <p:spPr>
@@ -3138,7 +3230,7 @@
           </a:prstGeom>
         </p:spPr>
         <p:txBody>
-          <a:bodyPr anchorCtr="0" anchor="ctr" bIns="91425" lIns="91425" spcFirstLastPara="1" rIns="91425" wrap="square" tIns="91425">
+          <a:bodyPr spcFirstLastPara="1" wrap="square" lIns="91425" tIns="91425" rIns="91425" bIns="91425" anchor="ctr" anchorCtr="0">
             <a:normAutofit/>
           </a:bodyPr>
           <a:lstStyle>
@@ -3180,7 +3272,7 @@
             </a:lvl9pPr>
           </a:lstStyle>
           <a:p>
-            <a:pPr indent="0" lvl="0" marL="0" rtl="0" algn="r">
+            <a:pPr marL="0" lvl="0" indent="0" algn="r" rtl="0">
               <a:spcBef>
                 <a:spcPts val="0"/>
               </a:spcBef>
@@ -3206,11 +3298,11 @@
 </file>
 
 <file path=ppt/slideLayouts/slideLayout6.xml><?xml version="1.0" encoding="utf-8"?>
-<p:sldLayout xmlns:a="http://schemas.openxmlformats.org/drawingml/2006/main" xmlns:r="http://schemas.openxmlformats.org/officeDocument/2006/relationships" xmlns:mc="http://schemas.openxmlformats.org/markup-compatibility/2006" xmlns:mv="urn:schemas-microsoft-com:mac:vml" xmlns:p="http://schemas.openxmlformats.org/presentationml/2006/main" xmlns:c="http://schemas.openxmlformats.org/drawingml/2006/chart" xmlns:dgm="http://schemas.openxmlformats.org/drawingml/2006/diagram" xmlns:o="urn:schemas-microsoft-com:office:office" xmlns:v="urn:schemas-microsoft-com:vml" xmlns:pvml="urn:schemas-microsoft-com:office:powerpoint" xmlns:com="http://schemas.openxmlformats.org/drawingml/2006/compatibility" xmlns:p14="http://schemas.microsoft.com/office/powerpoint/2010/main" xmlns:p15="http://schemas.microsoft.com/office/powerpoint/2012/main" xmlns:ahyp="http://schemas.microsoft.com/office/drawing/2018/hyperlinkcolor" matchingName="One column text">
+<p:sldLayout xmlns:a="http://schemas.openxmlformats.org/drawingml/2006/main" xmlns:r="http://schemas.openxmlformats.org/officeDocument/2006/relationships" xmlns:p="http://schemas.openxmlformats.org/presentationml/2006/main" matchingName="One column text">
   <p:cSld name="ONE_COLUMN_TEXT">
     <p:spTree>
       <p:nvGrpSpPr>
-        <p:cNvPr id="28" name="Shape 28"/>
+        <p:cNvPr id="1" name="Shape 28"/>
         <p:cNvGrpSpPr/>
         <p:nvPr/>
       </p:nvGrpSpPr>
@@ -3225,7 +3317,9 @@
       <p:sp>
         <p:nvSpPr>
           <p:cNvPr id="29" name="Google Shape;29;p7"/>
-          <p:cNvSpPr txBox="1"/>
+          <p:cNvSpPr txBox="1">
+            <a:spLocks noGrp="1"/>
+          </p:cNvSpPr>
           <p:nvPr>
             <p:ph type="title"/>
           </p:nvPr>
@@ -3240,7 +3334,7 @@
           </a:prstGeom>
         </p:spPr>
         <p:txBody>
-          <a:bodyPr anchorCtr="0" anchor="b" bIns="91425" lIns="91425" spcFirstLastPara="1" rIns="91425" wrap="square" tIns="91425">
+          <a:bodyPr spcFirstLastPara="1" wrap="square" lIns="91425" tIns="91425" rIns="91425" bIns="91425" anchor="b" anchorCtr="0">
             <a:normAutofit/>
           </a:bodyPr>
           <a:lstStyle>
@@ -3344,15 +3438,19 @@
               <a:defRPr sz="2400"/>
             </a:lvl9pPr>
           </a:lstStyle>
-          <a:p/>
+          <a:p>
+            <a:endParaRPr/>
+          </a:p>
         </p:txBody>
       </p:sp>
       <p:sp>
         <p:nvSpPr>
           <p:cNvPr id="30" name="Google Shape;30;p7"/>
-          <p:cNvSpPr txBox="1"/>
+          <p:cNvSpPr txBox="1">
+            <a:spLocks noGrp="1"/>
+          </p:cNvSpPr>
           <p:nvPr>
-            <p:ph idx="1" type="body"/>
+            <p:ph type="body" idx="1"/>
           </p:nvPr>
         </p:nvSpPr>
         <p:spPr>
@@ -3365,11 +3463,11 @@
           </a:prstGeom>
         </p:spPr>
         <p:txBody>
-          <a:bodyPr anchorCtr="0" anchor="t" bIns="91425" lIns="91425" spcFirstLastPara="1" rIns="91425" wrap="square" tIns="91425">
+          <a:bodyPr spcFirstLastPara="1" wrap="square" lIns="91425" tIns="91425" rIns="91425" bIns="91425" anchor="t" anchorCtr="0">
             <a:normAutofit/>
           </a:bodyPr>
           <a:lstStyle>
-            <a:lvl1pPr indent="-304800" lvl="0" marL="457200">
+            <a:lvl1pPr marL="457200" lvl="0" indent="-304800">
               <a:spcBef>
                 <a:spcPts val="0"/>
               </a:spcBef>
@@ -3380,7 +3478,7 @@
               <a:buChar char="●"/>
               <a:defRPr sz="1200"/>
             </a:lvl1pPr>
-            <a:lvl2pPr indent="-304800" lvl="1" marL="914400">
+            <a:lvl2pPr marL="914400" lvl="1" indent="-304800">
               <a:spcBef>
                 <a:spcPts val="0"/>
               </a:spcBef>
@@ -3391,7 +3489,7 @@
               <a:buChar char="○"/>
               <a:defRPr sz="1200"/>
             </a:lvl2pPr>
-            <a:lvl3pPr indent="-304800" lvl="2" marL="1371600">
+            <a:lvl3pPr marL="1371600" lvl="2" indent="-304800">
               <a:spcBef>
                 <a:spcPts val="0"/>
               </a:spcBef>
@@ -3402,7 +3500,7 @@
               <a:buChar char="■"/>
               <a:defRPr sz="1200"/>
             </a:lvl3pPr>
-            <a:lvl4pPr indent="-304800" lvl="3" marL="1828800">
+            <a:lvl4pPr marL="1828800" lvl="3" indent="-304800">
               <a:spcBef>
                 <a:spcPts val="0"/>
               </a:spcBef>
@@ -3413,7 +3511,7 @@
               <a:buChar char="●"/>
               <a:defRPr sz="1200"/>
             </a:lvl4pPr>
-            <a:lvl5pPr indent="-304800" lvl="4" marL="2286000">
+            <a:lvl5pPr marL="2286000" lvl="4" indent="-304800">
               <a:spcBef>
                 <a:spcPts val="0"/>
               </a:spcBef>
@@ -3424,7 +3522,7 @@
               <a:buChar char="○"/>
               <a:defRPr sz="1200"/>
             </a:lvl5pPr>
-            <a:lvl6pPr indent="-304800" lvl="5" marL="2743200">
+            <a:lvl6pPr marL="2743200" lvl="5" indent="-304800">
               <a:spcBef>
                 <a:spcPts val="0"/>
               </a:spcBef>
@@ -3435,7 +3533,7 @@
               <a:buChar char="■"/>
               <a:defRPr sz="1200"/>
             </a:lvl6pPr>
-            <a:lvl7pPr indent="-304800" lvl="6" marL="3200400">
+            <a:lvl7pPr marL="3200400" lvl="6" indent="-304800">
               <a:spcBef>
                 <a:spcPts val="0"/>
               </a:spcBef>
@@ -3446,7 +3544,7 @@
               <a:buChar char="●"/>
               <a:defRPr sz="1200"/>
             </a:lvl7pPr>
-            <a:lvl8pPr indent="-304800" lvl="7" marL="3657600">
+            <a:lvl8pPr marL="3657600" lvl="7" indent="-304800">
               <a:spcBef>
                 <a:spcPts val="0"/>
               </a:spcBef>
@@ -3457,7 +3555,7 @@
               <a:buChar char="○"/>
               <a:defRPr sz="1200"/>
             </a:lvl8pPr>
-            <a:lvl9pPr indent="-304800" lvl="8" marL="4114800">
+            <a:lvl9pPr marL="4114800" lvl="8" indent="-304800">
               <a:spcBef>
                 <a:spcPts val="0"/>
               </a:spcBef>
@@ -3469,15 +3567,19 @@
               <a:defRPr sz="1200"/>
             </a:lvl9pPr>
           </a:lstStyle>
-          <a:p/>
+          <a:p>
+            <a:endParaRPr/>
+          </a:p>
         </p:txBody>
       </p:sp>
       <p:sp>
         <p:nvSpPr>
           <p:cNvPr id="31" name="Google Shape;31;p7"/>
-          <p:cNvSpPr txBox="1"/>
+          <p:cNvSpPr txBox="1">
+            <a:spLocks noGrp="1"/>
+          </p:cNvSpPr>
           <p:nvPr>
-            <p:ph idx="12" type="sldNum"/>
+            <p:ph type="sldNum" idx="12"/>
           </p:nvPr>
         </p:nvSpPr>
         <p:spPr>
@@ -3490,7 +3592,7 @@
           </a:prstGeom>
         </p:spPr>
         <p:txBody>
-          <a:bodyPr anchorCtr="0" anchor="ctr" bIns="91425" lIns="91425" spcFirstLastPara="1" rIns="91425" wrap="square" tIns="91425">
+          <a:bodyPr spcFirstLastPara="1" wrap="square" lIns="91425" tIns="91425" rIns="91425" bIns="91425" anchor="ctr" anchorCtr="0">
             <a:normAutofit/>
           </a:bodyPr>
           <a:lstStyle>
@@ -3532,7 +3634,7 @@
             </a:lvl9pPr>
           </a:lstStyle>
           <a:p>
-            <a:pPr indent="0" lvl="0" marL="0" rtl="0" algn="r">
+            <a:pPr marL="0" lvl="0" indent="0" algn="r" rtl="0">
               <a:spcBef>
                 <a:spcPts val="0"/>
               </a:spcBef>
@@ -3558,11 +3660,11 @@
 </file>
 
 <file path=ppt/slideLayouts/slideLayout7.xml><?xml version="1.0" encoding="utf-8"?>
-<p:sldLayout xmlns:a="http://schemas.openxmlformats.org/drawingml/2006/main" xmlns:r="http://schemas.openxmlformats.org/officeDocument/2006/relationships" xmlns:mc="http://schemas.openxmlformats.org/markup-compatibility/2006" xmlns:mv="urn:schemas-microsoft-com:mac:vml" xmlns:p="http://schemas.openxmlformats.org/presentationml/2006/main" xmlns:c="http://schemas.openxmlformats.org/drawingml/2006/chart" xmlns:dgm="http://schemas.openxmlformats.org/drawingml/2006/diagram" xmlns:o="urn:schemas-microsoft-com:office:office" xmlns:v="urn:schemas-microsoft-com:vml" xmlns:pvml="urn:schemas-microsoft-com:office:powerpoint" xmlns:com="http://schemas.openxmlformats.org/drawingml/2006/compatibility" xmlns:p14="http://schemas.microsoft.com/office/powerpoint/2010/main" xmlns:p15="http://schemas.microsoft.com/office/powerpoint/2012/main" xmlns:ahyp="http://schemas.microsoft.com/office/drawing/2018/hyperlinkcolor" matchingName="Main point">
+<p:sldLayout xmlns:a="http://schemas.openxmlformats.org/drawingml/2006/main" xmlns:r="http://schemas.openxmlformats.org/officeDocument/2006/relationships" xmlns:p="http://schemas.openxmlformats.org/presentationml/2006/main" matchingName="Main point">
   <p:cSld name="MAIN_POINT">
     <p:spTree>
       <p:nvGrpSpPr>
-        <p:cNvPr id="32" name="Shape 32"/>
+        <p:cNvPr id="1" name="Shape 32"/>
         <p:cNvGrpSpPr/>
         <p:nvPr/>
       </p:nvGrpSpPr>
@@ -3577,7 +3679,9 @@
       <p:sp>
         <p:nvSpPr>
           <p:cNvPr id="33" name="Google Shape;33;p8"/>
-          <p:cNvSpPr txBox="1"/>
+          <p:cNvSpPr txBox="1">
+            <a:spLocks noGrp="1"/>
+          </p:cNvSpPr>
           <p:nvPr>
             <p:ph type="title"/>
           </p:nvPr>
@@ -3592,7 +3696,7 @@
           </a:prstGeom>
         </p:spPr>
         <p:txBody>
-          <a:bodyPr anchorCtr="0" anchor="ctr" bIns="91425" lIns="91425" spcFirstLastPara="1" rIns="91425" wrap="square" tIns="91425">
+          <a:bodyPr spcFirstLastPara="1" wrap="square" lIns="91425" tIns="91425" rIns="91425" bIns="91425" anchor="ctr" anchorCtr="0">
             <a:normAutofit/>
           </a:bodyPr>
           <a:lstStyle>
@@ -3696,15 +3800,19 @@
               <a:defRPr sz="4800"/>
             </a:lvl9pPr>
           </a:lstStyle>
-          <a:p/>
+          <a:p>
+            <a:endParaRPr/>
+          </a:p>
         </p:txBody>
       </p:sp>
       <p:sp>
         <p:nvSpPr>
           <p:cNvPr id="34" name="Google Shape;34;p8"/>
-          <p:cNvSpPr txBox="1"/>
+          <p:cNvSpPr txBox="1">
+            <a:spLocks noGrp="1"/>
+          </p:cNvSpPr>
           <p:nvPr>
-            <p:ph idx="12" type="sldNum"/>
+            <p:ph type="sldNum" idx="12"/>
           </p:nvPr>
         </p:nvSpPr>
         <p:spPr>
@@ -3717,7 +3825,7 @@
           </a:prstGeom>
         </p:spPr>
         <p:txBody>
-          <a:bodyPr anchorCtr="0" anchor="ctr" bIns="91425" lIns="91425" spcFirstLastPara="1" rIns="91425" wrap="square" tIns="91425">
+          <a:bodyPr spcFirstLastPara="1" wrap="square" lIns="91425" tIns="91425" rIns="91425" bIns="91425" anchor="ctr" anchorCtr="0">
             <a:normAutofit/>
           </a:bodyPr>
           <a:lstStyle>
@@ -3759,7 +3867,7 @@
             </a:lvl9pPr>
           </a:lstStyle>
           <a:p>
-            <a:pPr indent="0" lvl="0" marL="0" rtl="0" algn="r">
+            <a:pPr marL="0" lvl="0" indent="0" algn="r" rtl="0">
               <a:spcBef>
                 <a:spcPts val="0"/>
               </a:spcBef>
@@ -3785,11 +3893,11 @@
 </file>
 
 <file path=ppt/slideLayouts/slideLayout8.xml><?xml version="1.0" encoding="utf-8"?>
-<p:sldLayout xmlns:a="http://schemas.openxmlformats.org/drawingml/2006/main" xmlns:r="http://schemas.openxmlformats.org/officeDocument/2006/relationships" xmlns:mc="http://schemas.openxmlformats.org/markup-compatibility/2006" xmlns:mv="urn:schemas-microsoft-com:mac:vml" xmlns:p="http://schemas.openxmlformats.org/presentationml/2006/main" xmlns:c="http://schemas.openxmlformats.org/drawingml/2006/chart" xmlns:dgm="http://schemas.openxmlformats.org/drawingml/2006/diagram" xmlns:o="urn:schemas-microsoft-com:office:office" xmlns:v="urn:schemas-microsoft-com:vml" xmlns:pvml="urn:schemas-microsoft-com:office:powerpoint" xmlns:com="http://schemas.openxmlformats.org/drawingml/2006/compatibility" xmlns:p14="http://schemas.microsoft.com/office/powerpoint/2010/main" xmlns:p15="http://schemas.microsoft.com/office/powerpoint/2012/main" xmlns:ahyp="http://schemas.microsoft.com/office/drawing/2018/hyperlinkcolor" matchingName="Section title and description">
+<p:sldLayout xmlns:a="http://schemas.openxmlformats.org/drawingml/2006/main" xmlns:r="http://schemas.openxmlformats.org/officeDocument/2006/relationships" xmlns:p="http://schemas.openxmlformats.org/presentationml/2006/main" matchingName="Section title and description">
   <p:cSld name="SECTION_TITLE_AND_DESCRIPTION">
     <p:spTree>
       <p:nvGrpSpPr>
-        <p:cNvPr id="35" name="Shape 35"/>
+        <p:cNvPr id="1" name="Shape 35"/>
         <p:cNvGrpSpPr/>
         <p:nvPr/>
       </p:nvGrpSpPr>
@@ -3823,12 +3931,12 @@
           </a:ln>
         </p:spPr>
         <p:txBody>
-          <a:bodyPr anchorCtr="0" anchor="ctr" bIns="91425" lIns="91425" spcFirstLastPara="1" rIns="91425" wrap="square" tIns="91425">
+          <a:bodyPr spcFirstLastPara="1" wrap="square" lIns="91425" tIns="91425" rIns="91425" bIns="91425" anchor="ctr" anchorCtr="0">
             <a:noAutofit/>
           </a:bodyPr>
           <a:lstStyle/>
           <a:p>
-            <a:pPr indent="0" lvl="0" marL="0" rtl="0" algn="l">
+            <a:pPr marL="0" lvl="0" indent="0" algn="l" rtl="0">
               <a:spcBef>
                 <a:spcPts val="0"/>
               </a:spcBef>
@@ -3837,9 +3945,6 @@
               </a:spcAft>
               <a:buNone/>
             </a:pPr>
-            <a:r>
-              <a:t/>
-            </a:r>
             <a:endParaRPr/>
           </a:p>
         </p:txBody>
@@ -3847,7 +3952,9 @@
       <p:sp>
         <p:nvSpPr>
           <p:cNvPr id="37" name="Google Shape;37;p9"/>
-          <p:cNvSpPr txBox="1"/>
+          <p:cNvSpPr txBox="1">
+            <a:spLocks noGrp="1"/>
+          </p:cNvSpPr>
           <p:nvPr>
             <p:ph type="title"/>
           </p:nvPr>
@@ -3862,7 +3969,7 @@
           </a:prstGeom>
         </p:spPr>
         <p:txBody>
-          <a:bodyPr anchorCtr="0" anchor="b" bIns="91425" lIns="91425" spcFirstLastPara="1" rIns="91425" wrap="square" tIns="91425">
+          <a:bodyPr spcFirstLastPara="1" wrap="square" lIns="91425" tIns="91425" rIns="91425" bIns="91425" anchor="b" anchorCtr="0">
             <a:normAutofit/>
           </a:bodyPr>
           <a:lstStyle>
@@ -3966,15 +4073,19 @@
               <a:defRPr sz="4200"/>
             </a:lvl9pPr>
           </a:lstStyle>
-          <a:p/>
+          <a:p>
+            <a:endParaRPr/>
+          </a:p>
         </p:txBody>
       </p:sp>
       <p:sp>
         <p:nvSpPr>
           <p:cNvPr id="38" name="Google Shape;38;p9"/>
-          <p:cNvSpPr txBox="1"/>
+          <p:cNvSpPr txBox="1">
+            <a:spLocks noGrp="1"/>
+          </p:cNvSpPr>
           <p:nvPr>
-            <p:ph idx="1" type="subTitle"/>
+            <p:ph type="subTitle" idx="1"/>
           </p:nvPr>
         </p:nvSpPr>
         <p:spPr>
@@ -3987,7 +4098,7 @@
           </a:prstGeom>
         </p:spPr>
         <p:txBody>
-          <a:bodyPr anchorCtr="0" anchor="t" bIns="91425" lIns="91425" spcFirstLastPara="1" rIns="91425" wrap="square" tIns="91425">
+          <a:bodyPr spcFirstLastPara="1" wrap="square" lIns="91425" tIns="91425" rIns="91425" bIns="91425" anchor="t" anchorCtr="0">
             <a:normAutofit/>
           </a:bodyPr>
           <a:lstStyle>
@@ -4118,15 +4229,19 @@
               <a:defRPr sz="2100"/>
             </a:lvl9pPr>
           </a:lstStyle>
-          <a:p/>
+          <a:p>
+            <a:endParaRPr/>
+          </a:p>
         </p:txBody>
       </p:sp>
       <p:sp>
         <p:nvSpPr>
           <p:cNvPr id="39" name="Google Shape;39;p9"/>
-          <p:cNvSpPr txBox="1"/>
+          <p:cNvSpPr txBox="1">
+            <a:spLocks noGrp="1"/>
+          </p:cNvSpPr>
           <p:nvPr>
-            <p:ph idx="2" type="body"/>
+            <p:ph type="body" idx="2"/>
           </p:nvPr>
         </p:nvSpPr>
         <p:spPr>
@@ -4139,11 +4254,11 @@
           </a:prstGeom>
         </p:spPr>
         <p:txBody>
-          <a:bodyPr anchorCtr="0" anchor="ctr" bIns="91425" lIns="91425" spcFirstLastPara="1" rIns="91425" wrap="square" tIns="91425">
+          <a:bodyPr spcFirstLastPara="1" wrap="square" lIns="91425" tIns="91425" rIns="91425" bIns="91425" anchor="ctr" anchorCtr="0">
             <a:normAutofit/>
           </a:bodyPr>
           <a:lstStyle>
-            <a:lvl1pPr indent="-342900" lvl="0" marL="457200">
+            <a:lvl1pPr marL="457200" lvl="0" indent="-342900">
               <a:spcBef>
                 <a:spcPts val="0"/>
               </a:spcBef>
@@ -4154,7 +4269,7 @@
               <a:buChar char="●"/>
               <a:defRPr/>
             </a:lvl1pPr>
-            <a:lvl2pPr indent="-317500" lvl="1" marL="914400">
+            <a:lvl2pPr marL="914400" lvl="1" indent="-317500">
               <a:spcBef>
                 <a:spcPts val="0"/>
               </a:spcBef>
@@ -4165,7 +4280,7 @@
               <a:buChar char="○"/>
               <a:defRPr/>
             </a:lvl2pPr>
-            <a:lvl3pPr indent="-317500" lvl="2" marL="1371600">
+            <a:lvl3pPr marL="1371600" lvl="2" indent="-317500">
               <a:spcBef>
                 <a:spcPts val="0"/>
               </a:spcBef>
@@ -4176,7 +4291,7 @@
               <a:buChar char="■"/>
               <a:defRPr/>
             </a:lvl3pPr>
-            <a:lvl4pPr indent="-317500" lvl="3" marL="1828800">
+            <a:lvl4pPr marL="1828800" lvl="3" indent="-317500">
               <a:spcBef>
                 <a:spcPts val="0"/>
               </a:spcBef>
@@ -4187,7 +4302,7 @@
               <a:buChar char="●"/>
               <a:defRPr/>
             </a:lvl4pPr>
-            <a:lvl5pPr indent="-317500" lvl="4" marL="2286000">
+            <a:lvl5pPr marL="2286000" lvl="4" indent="-317500">
               <a:spcBef>
                 <a:spcPts val="0"/>
               </a:spcBef>
@@ -4198,7 +4313,7 @@
               <a:buChar char="○"/>
               <a:defRPr/>
             </a:lvl5pPr>
-            <a:lvl6pPr indent="-317500" lvl="5" marL="2743200">
+            <a:lvl6pPr marL="2743200" lvl="5" indent="-317500">
               <a:spcBef>
                 <a:spcPts val="0"/>
               </a:spcBef>
@@ -4209,7 +4324,7 @@
               <a:buChar char="■"/>
               <a:defRPr/>
             </a:lvl6pPr>
-            <a:lvl7pPr indent="-317500" lvl="6" marL="3200400">
+            <a:lvl7pPr marL="3200400" lvl="6" indent="-317500">
               <a:spcBef>
                 <a:spcPts val="0"/>
               </a:spcBef>
@@ -4220,7 +4335,7 @@
               <a:buChar char="●"/>
               <a:defRPr/>
             </a:lvl7pPr>
-            <a:lvl8pPr indent="-317500" lvl="7" marL="3657600">
+            <a:lvl8pPr marL="3657600" lvl="7" indent="-317500">
               <a:spcBef>
                 <a:spcPts val="0"/>
               </a:spcBef>
@@ -4231,7 +4346,7 @@
               <a:buChar char="○"/>
               <a:defRPr/>
             </a:lvl8pPr>
-            <a:lvl9pPr indent="-317500" lvl="8" marL="4114800">
+            <a:lvl9pPr marL="4114800" lvl="8" indent="-317500">
               <a:spcBef>
                 <a:spcPts val="0"/>
               </a:spcBef>
@@ -4243,15 +4358,19 @@
               <a:defRPr/>
             </a:lvl9pPr>
           </a:lstStyle>
-          <a:p/>
+          <a:p>
+            <a:endParaRPr/>
+          </a:p>
         </p:txBody>
       </p:sp>
       <p:sp>
         <p:nvSpPr>
           <p:cNvPr id="40" name="Google Shape;40;p9"/>
-          <p:cNvSpPr txBox="1"/>
+          <p:cNvSpPr txBox="1">
+            <a:spLocks noGrp="1"/>
+          </p:cNvSpPr>
           <p:nvPr>
-            <p:ph idx="12" type="sldNum"/>
+            <p:ph type="sldNum" idx="12"/>
           </p:nvPr>
         </p:nvSpPr>
         <p:spPr>
@@ -4264,7 +4383,7 @@
           </a:prstGeom>
         </p:spPr>
         <p:txBody>
-          <a:bodyPr anchorCtr="0" anchor="ctr" bIns="91425" lIns="91425" spcFirstLastPara="1" rIns="91425" wrap="square" tIns="91425">
+          <a:bodyPr spcFirstLastPara="1" wrap="square" lIns="91425" tIns="91425" rIns="91425" bIns="91425" anchor="ctr" anchorCtr="0">
             <a:normAutofit/>
           </a:bodyPr>
           <a:lstStyle>
@@ -4306,7 +4425,7 @@
             </a:lvl9pPr>
           </a:lstStyle>
           <a:p>
-            <a:pPr indent="0" lvl="0" marL="0" rtl="0" algn="r">
+            <a:pPr marL="0" lvl="0" indent="0" algn="r" rtl="0">
               <a:spcBef>
                 <a:spcPts val="0"/>
               </a:spcBef>
@@ -4332,11 +4451,11 @@
 </file>
 
 <file path=ppt/slideLayouts/slideLayout9.xml><?xml version="1.0" encoding="utf-8"?>
-<p:sldLayout xmlns:a="http://schemas.openxmlformats.org/drawingml/2006/main" xmlns:r="http://schemas.openxmlformats.org/officeDocument/2006/relationships" xmlns:mc="http://schemas.openxmlformats.org/markup-compatibility/2006" xmlns:mv="urn:schemas-microsoft-com:mac:vml" xmlns:p="http://schemas.openxmlformats.org/presentationml/2006/main" xmlns:c="http://schemas.openxmlformats.org/drawingml/2006/chart" xmlns:dgm="http://schemas.openxmlformats.org/drawingml/2006/diagram" xmlns:o="urn:schemas-microsoft-com:office:office" xmlns:v="urn:schemas-microsoft-com:vml" xmlns:pvml="urn:schemas-microsoft-com:office:powerpoint" xmlns:com="http://schemas.openxmlformats.org/drawingml/2006/compatibility" xmlns:p14="http://schemas.microsoft.com/office/powerpoint/2010/main" xmlns:p15="http://schemas.microsoft.com/office/powerpoint/2012/main" xmlns:ahyp="http://schemas.microsoft.com/office/drawing/2018/hyperlinkcolor" matchingName="Caption">
+<p:sldLayout xmlns:a="http://schemas.openxmlformats.org/drawingml/2006/main" xmlns:r="http://schemas.openxmlformats.org/officeDocument/2006/relationships" xmlns:p="http://schemas.openxmlformats.org/presentationml/2006/main" matchingName="Caption">
   <p:cSld name="CAPTION_ONLY">
     <p:spTree>
       <p:nvGrpSpPr>
-        <p:cNvPr id="41" name="Shape 41"/>
+        <p:cNvPr id="1" name="Shape 41"/>
         <p:cNvGrpSpPr/>
         <p:nvPr/>
       </p:nvGrpSpPr>
@@ -4351,9 +4470,11 @@
       <p:sp>
         <p:nvSpPr>
           <p:cNvPr id="42" name="Google Shape;42;p10"/>
-          <p:cNvSpPr txBox="1"/>
+          <p:cNvSpPr txBox="1">
+            <a:spLocks noGrp="1"/>
+          </p:cNvSpPr>
           <p:nvPr>
-            <p:ph idx="1" type="body"/>
+            <p:ph type="body" idx="1"/>
           </p:nvPr>
         </p:nvSpPr>
         <p:spPr>
@@ -4366,11 +4487,11 @@
           </a:prstGeom>
         </p:spPr>
         <p:txBody>
-          <a:bodyPr anchorCtr="0" anchor="ctr" bIns="91425" lIns="91425" spcFirstLastPara="1" rIns="91425" wrap="square" tIns="91425">
+          <a:bodyPr spcFirstLastPara="1" wrap="square" lIns="91425" tIns="91425" rIns="91425" bIns="91425" anchor="ctr" anchorCtr="0">
             <a:normAutofit/>
           </a:bodyPr>
           <a:lstStyle>
-            <a:lvl1pPr indent="-228600" lvl="0" marL="457200">
+            <a:lvl1pPr marL="457200" lvl="0" indent="-228600">
               <a:lnSpc>
                 <a:spcPct val="100000"/>
               </a:lnSpc>
@@ -4385,15 +4506,19 @@
               <a:defRPr/>
             </a:lvl1pPr>
           </a:lstStyle>
-          <a:p/>
+          <a:p>
+            <a:endParaRPr/>
+          </a:p>
         </p:txBody>
       </p:sp>
       <p:sp>
         <p:nvSpPr>
           <p:cNvPr id="43" name="Google Shape;43;p10"/>
-          <p:cNvSpPr txBox="1"/>
+          <p:cNvSpPr txBox="1">
+            <a:spLocks noGrp="1"/>
+          </p:cNvSpPr>
           <p:nvPr>
-            <p:ph idx="12" type="sldNum"/>
+            <p:ph type="sldNum" idx="12"/>
           </p:nvPr>
         </p:nvSpPr>
         <p:spPr>
@@ -4406,7 +4531,7 @@
           </a:prstGeom>
         </p:spPr>
         <p:txBody>
-          <a:bodyPr anchorCtr="0" anchor="ctr" bIns="91425" lIns="91425" spcFirstLastPara="1" rIns="91425" wrap="square" tIns="91425">
+          <a:bodyPr spcFirstLastPara="1" wrap="square" lIns="91425" tIns="91425" rIns="91425" bIns="91425" anchor="ctr" anchorCtr="0">
             <a:normAutofit/>
           </a:bodyPr>
           <a:lstStyle>
@@ -4448,7 +4573,7 @@
             </a:lvl9pPr>
           </a:lstStyle>
           <a:p>
-            <a:pPr indent="0" lvl="0" marL="0" rtl="0" algn="r">
+            <a:pPr marL="0" lvl="0" indent="0" algn="r" rtl="0">
               <a:spcBef>
                 <a:spcPts val="0"/>
               </a:spcBef>
@@ -4474,18 +4599,19 @@
 </file>
 
 <file path=ppt/slideMasters/slideMaster1.xml><?xml version="1.0" encoding="utf-8"?>
-<p:sldMaster xmlns:a="http://schemas.openxmlformats.org/drawingml/2006/main" xmlns:r="http://schemas.openxmlformats.org/officeDocument/2006/relationships" xmlns:mc="http://schemas.openxmlformats.org/markup-compatibility/2006" xmlns:mv="urn:schemas-microsoft-com:mac:vml" xmlns:p="http://schemas.openxmlformats.org/presentationml/2006/main" xmlns:c="http://schemas.openxmlformats.org/drawingml/2006/chart" xmlns:dgm="http://schemas.openxmlformats.org/drawingml/2006/diagram" xmlns:o="urn:schemas-microsoft-com:office:office" xmlns:v="urn:schemas-microsoft-com:vml" xmlns:pvml="urn:schemas-microsoft-com:office:powerpoint" xmlns:com="http://schemas.openxmlformats.org/drawingml/2006/compatibility" xmlns:p14="http://schemas.microsoft.com/office/powerpoint/2010/main" xmlns:p15="http://schemas.microsoft.com/office/powerpoint/2012/main" xmlns:ahyp="http://schemas.microsoft.com/office/drawing/2018/hyperlinkcolor">
+<p:sldMaster xmlns:a="http://schemas.openxmlformats.org/drawingml/2006/main" xmlns:r="http://schemas.openxmlformats.org/officeDocument/2006/relationships" xmlns:p="http://schemas.openxmlformats.org/presentationml/2006/main">
   <p:cSld name="simple-light-2">
     <p:bg>
       <p:bgPr>
         <a:solidFill>
           <a:schemeClr val="lt1"/>
         </a:solidFill>
+        <a:effectLst/>
       </p:bgPr>
     </p:bg>
     <p:spTree>
       <p:nvGrpSpPr>
-        <p:cNvPr id="5" name="Shape 5"/>
+        <p:cNvPr id="1" name="Shape 5"/>
         <p:cNvGrpSpPr/>
         <p:nvPr/>
       </p:nvGrpSpPr>
@@ -4500,7 +4626,9 @@
       <p:sp>
         <p:nvSpPr>
           <p:cNvPr id="6" name="Google Shape;6;p1"/>
-          <p:cNvSpPr txBox="1"/>
+          <p:cNvSpPr txBox="1">
+            <a:spLocks noGrp="1"/>
+          </p:cNvSpPr>
           <p:nvPr>
             <p:ph type="title"/>
           </p:nvPr>
@@ -4519,7 +4647,7 @@
           </a:ln>
         </p:spPr>
         <p:txBody>
-          <a:bodyPr anchorCtr="0" anchor="t" bIns="91425" lIns="91425" spcFirstLastPara="1" rIns="91425" wrap="square" tIns="91425">
+          <a:bodyPr spcFirstLastPara="1" wrap="square" lIns="91425" tIns="91425" rIns="91425" bIns="91425" anchor="t" anchorCtr="0">
             <a:normAutofit/>
           </a:bodyPr>
           <a:lstStyle>
@@ -4686,15 +4814,19 @@
               </a:defRPr>
             </a:lvl9pPr>
           </a:lstStyle>
-          <a:p/>
+          <a:p>
+            <a:endParaRPr/>
+          </a:p>
         </p:txBody>
       </p:sp>
       <p:sp>
         <p:nvSpPr>
           <p:cNvPr id="7" name="Google Shape;7;p1"/>
-          <p:cNvSpPr txBox="1"/>
+          <p:cNvSpPr txBox="1">
+            <a:spLocks noGrp="1"/>
+          </p:cNvSpPr>
           <p:nvPr>
-            <p:ph idx="1" type="body"/>
+            <p:ph type="body" idx="1"/>
           </p:nvPr>
         </p:nvSpPr>
         <p:spPr>
@@ -4711,11 +4843,11 @@
           </a:ln>
         </p:spPr>
         <p:txBody>
-          <a:bodyPr anchorCtr="0" anchor="t" bIns="91425" lIns="91425" spcFirstLastPara="1" rIns="91425" wrap="square" tIns="91425">
+          <a:bodyPr spcFirstLastPara="1" wrap="square" lIns="91425" tIns="91425" rIns="91425" bIns="91425" anchor="t" anchorCtr="0">
             <a:normAutofit/>
           </a:bodyPr>
           <a:lstStyle>
-            <a:lvl1pPr indent="-342900" lvl="0" marL="457200">
+            <a:lvl1pPr marL="457200" lvl="0" indent="-342900">
               <a:lnSpc>
                 <a:spcPct val="115000"/>
               </a:lnSpc>
@@ -4736,7 +4868,7 @@
                 </a:solidFill>
               </a:defRPr>
             </a:lvl1pPr>
-            <a:lvl2pPr indent="-317500" lvl="1" marL="914400">
+            <a:lvl2pPr marL="914400" lvl="1" indent="-317500">
               <a:lnSpc>
                 <a:spcPct val="115000"/>
               </a:lnSpc>
@@ -4757,7 +4889,7 @@
                 </a:solidFill>
               </a:defRPr>
             </a:lvl2pPr>
-            <a:lvl3pPr indent="-317500" lvl="2" marL="1371600">
+            <a:lvl3pPr marL="1371600" lvl="2" indent="-317500">
               <a:lnSpc>
                 <a:spcPct val="115000"/>
               </a:lnSpc>
@@ -4778,7 +4910,7 @@
                 </a:solidFill>
               </a:defRPr>
             </a:lvl3pPr>
-            <a:lvl4pPr indent="-317500" lvl="3" marL="1828800">
+            <a:lvl4pPr marL="1828800" lvl="3" indent="-317500">
               <a:lnSpc>
                 <a:spcPct val="115000"/>
               </a:lnSpc>
@@ -4799,7 +4931,7 @@
                 </a:solidFill>
               </a:defRPr>
             </a:lvl4pPr>
-            <a:lvl5pPr indent="-317500" lvl="4" marL="2286000">
+            <a:lvl5pPr marL="2286000" lvl="4" indent="-317500">
               <a:lnSpc>
                 <a:spcPct val="115000"/>
               </a:lnSpc>
@@ -4820,7 +4952,7 @@
                 </a:solidFill>
               </a:defRPr>
             </a:lvl5pPr>
-            <a:lvl6pPr indent="-317500" lvl="5" marL="2743200">
+            <a:lvl6pPr marL="2743200" lvl="5" indent="-317500">
               <a:lnSpc>
                 <a:spcPct val="115000"/>
               </a:lnSpc>
@@ -4841,7 +4973,7 @@
                 </a:solidFill>
               </a:defRPr>
             </a:lvl6pPr>
-            <a:lvl7pPr indent="-317500" lvl="6" marL="3200400">
+            <a:lvl7pPr marL="3200400" lvl="6" indent="-317500">
               <a:lnSpc>
                 <a:spcPct val="115000"/>
               </a:lnSpc>
@@ -4862,7 +4994,7 @@
                 </a:solidFill>
               </a:defRPr>
             </a:lvl7pPr>
-            <a:lvl8pPr indent="-317500" lvl="7" marL="3657600">
+            <a:lvl8pPr marL="3657600" lvl="7" indent="-317500">
               <a:lnSpc>
                 <a:spcPct val="115000"/>
               </a:lnSpc>
@@ -4883,7 +5015,7 @@
                 </a:solidFill>
               </a:defRPr>
             </a:lvl8pPr>
-            <a:lvl9pPr indent="-317500" lvl="8" marL="4114800">
+            <a:lvl9pPr marL="4114800" lvl="8" indent="-317500">
               <a:lnSpc>
                 <a:spcPct val="115000"/>
               </a:lnSpc>
@@ -4905,15 +5037,19 @@
               </a:defRPr>
             </a:lvl9pPr>
           </a:lstStyle>
-          <a:p/>
+          <a:p>
+            <a:endParaRPr/>
+          </a:p>
         </p:txBody>
       </p:sp>
       <p:sp>
         <p:nvSpPr>
           <p:cNvPr id="8" name="Google Shape;8;p1"/>
-          <p:cNvSpPr txBox="1"/>
+          <p:cNvSpPr txBox="1">
+            <a:spLocks noGrp="1"/>
+          </p:cNvSpPr>
           <p:nvPr>
-            <p:ph idx="12" type="sldNum"/>
+            <p:ph type="sldNum" idx="12"/>
           </p:nvPr>
         </p:nvSpPr>
         <p:spPr>
@@ -4930,7 +5066,7 @@
           </a:ln>
         </p:spPr>
         <p:txBody>
-          <a:bodyPr anchorCtr="0" anchor="ctr" bIns="91425" lIns="91425" spcFirstLastPara="1" rIns="91425" wrap="square" tIns="91425">
+          <a:bodyPr spcFirstLastPara="1" wrap="square" lIns="91425" tIns="91425" rIns="91425" bIns="91425" anchor="ctr" anchorCtr="0">
             <a:normAutofit/>
           </a:bodyPr>
           <a:lstStyle>
@@ -5008,7 +5144,7 @@
             </a:lvl9pPr>
           </a:lstStyle>
           <a:p>
-            <a:pPr indent="0" lvl="0" marL="0" rtl="0" algn="r">
+            <a:pPr marL="0" lvl="0" indent="0" algn="r" rtl="0">
               <a:spcBef>
                 <a:spcPts val="0"/>
               </a:spcBef>
@@ -5027,7 +5163,7 @@
       </p:sp>
     </p:spTree>
   </p:cSld>
-  <p:clrMap accent1="accent1" accent2="accent2" accent3="accent3" accent4="accent4" accent5="accent5" accent6="accent6" bg1="lt1" bg2="dk2" tx1="dk1" tx2="lt2" folHlink="folHlink" hlink="hlink"/>
+  <p:clrMap bg1="lt1" tx1="dk1" bg2="dk2" tx2="lt2" accent1="accent1" accent2="accent2" accent3="accent3" accent4="accent4" accent5="accent5" accent6="accent6" hlink="hlink" folHlink="folHlink"/>
   <p:sldLayoutIdLst>
     <p:sldLayoutId id="2147483648" r:id="rId1"/>
     <p:sldLayoutId id="2147483649" r:id="rId2"/>
@@ -5041,10 +5177,10 @@
     <p:sldLayoutId id="2147483657" r:id="rId10"/>
     <p:sldLayoutId id="2147483658" r:id="rId11"/>
   </p:sldLayoutIdLst>
-  <p:hf dt="0" ftr="0" hdr="0" sldNum="0"/>
+  <p:hf sldNum="0" hdr="0" ftr="0" dt="0"/>
   <p:txStyles>
     <p:titleStyle>
-      <a:defPPr lvl="0" marR="0" rtl="0" algn="l">
+      <a:defPPr marR="0" lvl="0" algn="l" rtl="0">
         <a:lnSpc>
           <a:spcPct val="100000"/>
         </a:lnSpc>
@@ -5055,7 +5191,7 @@
           <a:spcPts val="0"/>
         </a:spcAft>
       </a:defPPr>
-      <a:lvl1pPr lvl="0" marR="0" rtl="0" algn="l">
+      <a:lvl1pPr marR="0" lvl="0" algn="l" rtl="0">
         <a:lnSpc>
           <a:spcPct val="100000"/>
         </a:lnSpc>
@@ -5069,7 +5205,7 @@
           <a:srgbClr val="000000"/>
         </a:buClr>
         <a:buFont typeface="Arial"/>
-        <a:defRPr b="0" i="0" sz="1400" u="none" cap="none" strike="noStrike">
+        <a:defRPr sz="1400" b="0" i="0" u="none" strike="noStrike" cap="none">
           <a:solidFill>
             <a:srgbClr val="000000"/>
           </a:solidFill>
@@ -5079,7 +5215,7 @@
           <a:sym typeface="Arial"/>
         </a:defRPr>
       </a:lvl1pPr>
-      <a:lvl2pPr lvl="1" marR="0" rtl="0" algn="l">
+      <a:lvl2pPr marR="0" lvl="1" algn="l" rtl="0">
         <a:lnSpc>
           <a:spcPct val="100000"/>
         </a:lnSpc>
@@ -5093,7 +5229,7 @@
           <a:srgbClr val="000000"/>
         </a:buClr>
         <a:buFont typeface="Arial"/>
-        <a:defRPr b="0" i="0" sz="1400" u="none" cap="none" strike="noStrike">
+        <a:defRPr sz="1400" b="0" i="0" u="none" strike="noStrike" cap="none">
           <a:solidFill>
             <a:srgbClr val="000000"/>
           </a:solidFill>
@@ -5103,7 +5239,7 @@
           <a:sym typeface="Arial"/>
         </a:defRPr>
       </a:lvl2pPr>
-      <a:lvl3pPr lvl="2" marR="0" rtl="0" algn="l">
+      <a:lvl3pPr marR="0" lvl="2" algn="l" rtl="0">
         <a:lnSpc>
           <a:spcPct val="100000"/>
         </a:lnSpc>
@@ -5117,7 +5253,7 @@
           <a:srgbClr val="000000"/>
         </a:buClr>
         <a:buFont typeface="Arial"/>
-        <a:defRPr b="0" i="0" sz="1400" u="none" cap="none" strike="noStrike">
+        <a:defRPr sz="1400" b="0" i="0" u="none" strike="noStrike" cap="none">
           <a:solidFill>
             <a:srgbClr val="000000"/>
           </a:solidFill>
@@ -5127,7 +5263,7 @@
           <a:sym typeface="Arial"/>
         </a:defRPr>
       </a:lvl3pPr>
-      <a:lvl4pPr lvl="3" marR="0" rtl="0" algn="l">
+      <a:lvl4pPr marR="0" lvl="3" algn="l" rtl="0">
         <a:lnSpc>
           <a:spcPct val="100000"/>
         </a:lnSpc>
@@ -5141,7 +5277,7 @@
           <a:srgbClr val="000000"/>
         </a:buClr>
         <a:buFont typeface="Arial"/>
-        <a:defRPr b="0" i="0" sz="1400" u="none" cap="none" strike="noStrike">
+        <a:defRPr sz="1400" b="0" i="0" u="none" strike="noStrike" cap="none">
           <a:solidFill>
             <a:srgbClr val="000000"/>
           </a:solidFill>
@@ -5151,7 +5287,7 @@
           <a:sym typeface="Arial"/>
         </a:defRPr>
       </a:lvl4pPr>
-      <a:lvl5pPr lvl="4" marR="0" rtl="0" algn="l">
+      <a:lvl5pPr marR="0" lvl="4" algn="l" rtl="0">
         <a:lnSpc>
           <a:spcPct val="100000"/>
         </a:lnSpc>
@@ -5165,7 +5301,7 @@
           <a:srgbClr val="000000"/>
         </a:buClr>
         <a:buFont typeface="Arial"/>
-        <a:defRPr b="0" i="0" sz="1400" u="none" cap="none" strike="noStrike">
+        <a:defRPr sz="1400" b="0" i="0" u="none" strike="noStrike" cap="none">
           <a:solidFill>
             <a:srgbClr val="000000"/>
           </a:solidFill>
@@ -5175,7 +5311,7 @@
           <a:sym typeface="Arial"/>
         </a:defRPr>
       </a:lvl5pPr>
-      <a:lvl6pPr lvl="5" marR="0" rtl="0" algn="l">
+      <a:lvl6pPr marR="0" lvl="5" algn="l" rtl="0">
         <a:lnSpc>
           <a:spcPct val="100000"/>
         </a:lnSpc>
@@ -5189,7 +5325,7 @@
           <a:srgbClr val="000000"/>
         </a:buClr>
         <a:buFont typeface="Arial"/>
-        <a:defRPr b="0" i="0" sz="1400" u="none" cap="none" strike="noStrike">
+        <a:defRPr sz="1400" b="0" i="0" u="none" strike="noStrike" cap="none">
           <a:solidFill>
             <a:srgbClr val="000000"/>
           </a:solidFill>
@@ -5199,7 +5335,7 @@
           <a:sym typeface="Arial"/>
         </a:defRPr>
       </a:lvl6pPr>
-      <a:lvl7pPr lvl="6" marR="0" rtl="0" algn="l">
+      <a:lvl7pPr marR="0" lvl="6" algn="l" rtl="0">
         <a:lnSpc>
           <a:spcPct val="100000"/>
         </a:lnSpc>
@@ -5213,7 +5349,7 @@
           <a:srgbClr val="000000"/>
         </a:buClr>
         <a:buFont typeface="Arial"/>
-        <a:defRPr b="0" i="0" sz="1400" u="none" cap="none" strike="noStrike">
+        <a:defRPr sz="1400" b="0" i="0" u="none" strike="noStrike" cap="none">
           <a:solidFill>
             <a:srgbClr val="000000"/>
           </a:solidFill>
@@ -5223,7 +5359,7 @@
           <a:sym typeface="Arial"/>
         </a:defRPr>
       </a:lvl7pPr>
-      <a:lvl8pPr lvl="7" marR="0" rtl="0" algn="l">
+      <a:lvl8pPr marR="0" lvl="7" algn="l" rtl="0">
         <a:lnSpc>
           <a:spcPct val="100000"/>
         </a:lnSpc>
@@ -5237,7 +5373,7 @@
           <a:srgbClr val="000000"/>
         </a:buClr>
         <a:buFont typeface="Arial"/>
-        <a:defRPr b="0" i="0" sz="1400" u="none" cap="none" strike="noStrike">
+        <a:defRPr sz="1400" b="0" i="0" u="none" strike="noStrike" cap="none">
           <a:solidFill>
             <a:srgbClr val="000000"/>
           </a:solidFill>
@@ -5247,7 +5383,7 @@
           <a:sym typeface="Arial"/>
         </a:defRPr>
       </a:lvl8pPr>
-      <a:lvl9pPr lvl="8" marR="0" rtl="0" algn="l">
+      <a:lvl9pPr marR="0" lvl="8" algn="l" rtl="0">
         <a:lnSpc>
           <a:spcPct val="100000"/>
         </a:lnSpc>
@@ -5261,7 +5397,7 @@
           <a:srgbClr val="000000"/>
         </a:buClr>
         <a:buFont typeface="Arial"/>
-        <a:defRPr b="0" i="0" sz="1400" u="none" cap="none" strike="noStrike">
+        <a:defRPr sz="1400" b="0" i="0" u="none" strike="noStrike" cap="none">
           <a:solidFill>
             <a:srgbClr val="000000"/>
           </a:solidFill>
@@ -5273,7 +5409,7 @@
       </a:lvl9pPr>
     </p:titleStyle>
     <p:bodyStyle>
-      <a:defPPr lvl="0" marR="0" rtl="0" algn="l">
+      <a:defPPr marR="0" lvl="0" algn="l" rtl="0">
         <a:lnSpc>
           <a:spcPct val="100000"/>
         </a:lnSpc>
@@ -5284,7 +5420,7 @@
           <a:spcPts val="0"/>
         </a:spcAft>
       </a:defPPr>
-      <a:lvl1pPr lvl="0" marR="0" rtl="0" algn="l">
+      <a:lvl1pPr marR="0" lvl="0" algn="l" rtl="0">
         <a:lnSpc>
           <a:spcPct val="100000"/>
         </a:lnSpc>
@@ -5298,7 +5434,7 @@
           <a:srgbClr val="000000"/>
         </a:buClr>
         <a:buFont typeface="Arial"/>
-        <a:defRPr b="0" i="0" sz="1400" u="none" cap="none" strike="noStrike">
+        <a:defRPr sz="1400" b="0" i="0" u="none" strike="noStrike" cap="none">
           <a:solidFill>
             <a:srgbClr val="000000"/>
           </a:solidFill>
@@ -5308,7 +5444,7 @@
           <a:sym typeface="Arial"/>
         </a:defRPr>
       </a:lvl1pPr>
-      <a:lvl2pPr lvl="1" marR="0" rtl="0" algn="l">
+      <a:lvl2pPr marR="0" lvl="1" algn="l" rtl="0">
         <a:lnSpc>
           <a:spcPct val="100000"/>
         </a:lnSpc>
@@ -5322,7 +5458,7 @@
           <a:srgbClr val="000000"/>
         </a:buClr>
         <a:buFont typeface="Arial"/>
-        <a:defRPr b="0" i="0" sz="1400" u="none" cap="none" strike="noStrike">
+        <a:defRPr sz="1400" b="0" i="0" u="none" strike="noStrike" cap="none">
           <a:solidFill>
             <a:srgbClr val="000000"/>
           </a:solidFill>
@@ -5332,7 +5468,7 @@
           <a:sym typeface="Arial"/>
         </a:defRPr>
       </a:lvl2pPr>
-      <a:lvl3pPr lvl="2" marR="0" rtl="0" algn="l">
+      <a:lvl3pPr marR="0" lvl="2" algn="l" rtl="0">
         <a:lnSpc>
           <a:spcPct val="100000"/>
         </a:lnSpc>
@@ -5346,7 +5482,7 @@
           <a:srgbClr val="000000"/>
         </a:buClr>
         <a:buFont typeface="Arial"/>
-        <a:defRPr b="0" i="0" sz="1400" u="none" cap="none" strike="noStrike">
+        <a:defRPr sz="1400" b="0" i="0" u="none" strike="noStrike" cap="none">
           <a:solidFill>
             <a:srgbClr val="000000"/>
           </a:solidFill>
@@ -5356,7 +5492,7 @@
           <a:sym typeface="Arial"/>
         </a:defRPr>
       </a:lvl3pPr>
-      <a:lvl4pPr lvl="3" marR="0" rtl="0" algn="l">
+      <a:lvl4pPr marR="0" lvl="3" algn="l" rtl="0">
         <a:lnSpc>
           <a:spcPct val="100000"/>
         </a:lnSpc>
@@ -5370,7 +5506,7 @@
           <a:srgbClr val="000000"/>
         </a:buClr>
         <a:buFont typeface="Arial"/>
-        <a:defRPr b="0" i="0" sz="1400" u="none" cap="none" strike="noStrike">
+        <a:defRPr sz="1400" b="0" i="0" u="none" strike="noStrike" cap="none">
           <a:solidFill>
             <a:srgbClr val="000000"/>
           </a:solidFill>
@@ -5380,7 +5516,7 @@
           <a:sym typeface="Arial"/>
         </a:defRPr>
       </a:lvl4pPr>
-      <a:lvl5pPr lvl="4" marR="0" rtl="0" algn="l">
+      <a:lvl5pPr marR="0" lvl="4" algn="l" rtl="0">
         <a:lnSpc>
           <a:spcPct val="100000"/>
         </a:lnSpc>
@@ -5394,7 +5530,7 @@
           <a:srgbClr val="000000"/>
         </a:buClr>
         <a:buFont typeface="Arial"/>
-        <a:defRPr b="0" i="0" sz="1400" u="none" cap="none" strike="noStrike">
+        <a:defRPr sz="1400" b="0" i="0" u="none" strike="noStrike" cap="none">
           <a:solidFill>
             <a:srgbClr val="000000"/>
           </a:solidFill>
@@ -5404,7 +5540,7 @@
           <a:sym typeface="Arial"/>
         </a:defRPr>
       </a:lvl5pPr>
-      <a:lvl6pPr lvl="5" marR="0" rtl="0" algn="l">
+      <a:lvl6pPr marR="0" lvl="5" algn="l" rtl="0">
         <a:lnSpc>
           <a:spcPct val="100000"/>
         </a:lnSpc>
@@ -5418,7 +5554,7 @@
           <a:srgbClr val="000000"/>
         </a:buClr>
         <a:buFont typeface="Arial"/>
-        <a:defRPr b="0" i="0" sz="1400" u="none" cap="none" strike="noStrike">
+        <a:defRPr sz="1400" b="0" i="0" u="none" strike="noStrike" cap="none">
           <a:solidFill>
             <a:srgbClr val="000000"/>
           </a:solidFill>
@@ -5428,7 +5564,7 @@
           <a:sym typeface="Arial"/>
         </a:defRPr>
       </a:lvl6pPr>
-      <a:lvl7pPr lvl="6" marR="0" rtl="0" algn="l">
+      <a:lvl7pPr marR="0" lvl="6" algn="l" rtl="0">
         <a:lnSpc>
           <a:spcPct val="100000"/>
         </a:lnSpc>
@@ -5442,7 +5578,7 @@
           <a:srgbClr val="000000"/>
         </a:buClr>
         <a:buFont typeface="Arial"/>
-        <a:defRPr b="0" i="0" sz="1400" u="none" cap="none" strike="noStrike">
+        <a:defRPr sz="1400" b="0" i="0" u="none" strike="noStrike" cap="none">
           <a:solidFill>
             <a:srgbClr val="000000"/>
           </a:solidFill>
@@ -5452,7 +5588,7 @@
           <a:sym typeface="Arial"/>
         </a:defRPr>
       </a:lvl7pPr>
-      <a:lvl8pPr lvl="7" marR="0" rtl="0" algn="l">
+      <a:lvl8pPr marR="0" lvl="7" algn="l" rtl="0">
         <a:lnSpc>
           <a:spcPct val="100000"/>
         </a:lnSpc>
@@ -5466,7 +5602,7 @@
           <a:srgbClr val="000000"/>
         </a:buClr>
         <a:buFont typeface="Arial"/>
-        <a:defRPr b="0" i="0" sz="1400" u="none" cap="none" strike="noStrike">
+        <a:defRPr sz="1400" b="0" i="0" u="none" strike="noStrike" cap="none">
           <a:solidFill>
             <a:srgbClr val="000000"/>
           </a:solidFill>
@@ -5476,7 +5612,7 @@
           <a:sym typeface="Arial"/>
         </a:defRPr>
       </a:lvl8pPr>
-      <a:lvl9pPr lvl="8" marR="0" rtl="0" algn="l">
+      <a:lvl9pPr marR="0" lvl="8" algn="l" rtl="0">
         <a:lnSpc>
           <a:spcPct val="100000"/>
         </a:lnSpc>
@@ -5490,7 +5626,7 @@
           <a:srgbClr val="000000"/>
         </a:buClr>
         <a:buFont typeface="Arial"/>
-        <a:defRPr b="0" i="0" sz="1400" u="none" cap="none" strike="noStrike">
+        <a:defRPr sz="1400" b="0" i="0" u="none" strike="noStrike" cap="none">
           <a:solidFill>
             <a:srgbClr val="000000"/>
           </a:solidFill>
@@ -5502,7 +5638,7 @@
       </a:lvl9pPr>
     </p:bodyStyle>
     <p:otherStyle>
-      <a:defPPr lvl="0" marR="0" rtl="0" algn="l">
+      <a:defPPr marR="0" lvl="0" algn="l" rtl="0">
         <a:lnSpc>
           <a:spcPct val="100000"/>
         </a:lnSpc>
@@ -5513,7 +5649,7 @@
           <a:spcPts val="0"/>
         </a:spcAft>
       </a:defPPr>
-      <a:lvl1pPr lvl="0" marR="0" rtl="0" algn="l">
+      <a:lvl1pPr marR="0" lvl="0" algn="l" rtl="0">
         <a:lnSpc>
           <a:spcPct val="100000"/>
         </a:lnSpc>
@@ -5527,7 +5663,7 @@
           <a:srgbClr val="000000"/>
         </a:buClr>
         <a:buFont typeface="Arial"/>
-        <a:defRPr b="0" i="0" sz="1400" u="none" cap="none" strike="noStrike">
+        <a:defRPr sz="1400" b="0" i="0" u="none" strike="noStrike" cap="none">
           <a:solidFill>
             <a:srgbClr val="000000"/>
           </a:solidFill>
@@ -5537,7 +5673,7 @@
           <a:sym typeface="Arial"/>
         </a:defRPr>
       </a:lvl1pPr>
-      <a:lvl2pPr lvl="1" marR="0" rtl="0" algn="l">
+      <a:lvl2pPr marR="0" lvl="1" algn="l" rtl="0">
         <a:lnSpc>
           <a:spcPct val="100000"/>
         </a:lnSpc>
@@ -5551,7 +5687,7 @@
           <a:srgbClr val="000000"/>
         </a:buClr>
         <a:buFont typeface="Arial"/>
-        <a:defRPr b="0" i="0" sz="1400" u="none" cap="none" strike="noStrike">
+        <a:defRPr sz="1400" b="0" i="0" u="none" strike="noStrike" cap="none">
           <a:solidFill>
             <a:srgbClr val="000000"/>
           </a:solidFill>
@@ -5561,7 +5697,7 @@
           <a:sym typeface="Arial"/>
         </a:defRPr>
       </a:lvl2pPr>
-      <a:lvl3pPr lvl="2" marR="0" rtl="0" algn="l">
+      <a:lvl3pPr marR="0" lvl="2" algn="l" rtl="0">
         <a:lnSpc>
           <a:spcPct val="100000"/>
         </a:lnSpc>
@@ -5575,7 +5711,7 @@
           <a:srgbClr val="000000"/>
         </a:buClr>
         <a:buFont typeface="Arial"/>
-        <a:defRPr b="0" i="0" sz="1400" u="none" cap="none" strike="noStrike">
+        <a:defRPr sz="1400" b="0" i="0" u="none" strike="noStrike" cap="none">
           <a:solidFill>
             <a:srgbClr val="000000"/>
           </a:solidFill>
@@ -5585,7 +5721,7 @@
           <a:sym typeface="Arial"/>
         </a:defRPr>
       </a:lvl3pPr>
-      <a:lvl4pPr lvl="3" marR="0" rtl="0" algn="l">
+      <a:lvl4pPr marR="0" lvl="3" algn="l" rtl="0">
         <a:lnSpc>
           <a:spcPct val="100000"/>
         </a:lnSpc>
@@ -5599,7 +5735,7 @@
           <a:srgbClr val="000000"/>
         </a:buClr>
         <a:buFont typeface="Arial"/>
-        <a:defRPr b="0" i="0" sz="1400" u="none" cap="none" strike="noStrike">
+        <a:defRPr sz="1400" b="0" i="0" u="none" strike="noStrike" cap="none">
           <a:solidFill>
             <a:srgbClr val="000000"/>
           </a:solidFill>
@@ -5609,7 +5745,7 @@
           <a:sym typeface="Arial"/>
         </a:defRPr>
       </a:lvl4pPr>
-      <a:lvl5pPr lvl="4" marR="0" rtl="0" algn="l">
+      <a:lvl5pPr marR="0" lvl="4" algn="l" rtl="0">
         <a:lnSpc>
           <a:spcPct val="100000"/>
         </a:lnSpc>
@@ -5623,7 +5759,7 @@
           <a:srgbClr val="000000"/>
         </a:buClr>
         <a:buFont typeface="Arial"/>
-        <a:defRPr b="0" i="0" sz="1400" u="none" cap="none" strike="noStrike">
+        <a:defRPr sz="1400" b="0" i="0" u="none" strike="noStrike" cap="none">
           <a:solidFill>
             <a:srgbClr val="000000"/>
           </a:solidFill>
@@ -5633,7 +5769,7 @@
           <a:sym typeface="Arial"/>
         </a:defRPr>
       </a:lvl5pPr>
-      <a:lvl6pPr lvl="5" marR="0" rtl="0" algn="l">
+      <a:lvl6pPr marR="0" lvl="5" algn="l" rtl="0">
         <a:lnSpc>
           <a:spcPct val="100000"/>
         </a:lnSpc>
@@ -5647,7 +5783,7 @@
           <a:srgbClr val="000000"/>
         </a:buClr>
         <a:buFont typeface="Arial"/>
-        <a:defRPr b="0" i="0" sz="1400" u="none" cap="none" strike="noStrike">
+        <a:defRPr sz="1400" b="0" i="0" u="none" strike="noStrike" cap="none">
           <a:solidFill>
             <a:srgbClr val="000000"/>
           </a:solidFill>
@@ -5657,7 +5793,7 @@
           <a:sym typeface="Arial"/>
         </a:defRPr>
       </a:lvl6pPr>
-      <a:lvl7pPr lvl="6" marR="0" rtl="0" algn="l">
+      <a:lvl7pPr marR="0" lvl="6" algn="l" rtl="0">
         <a:lnSpc>
           <a:spcPct val="100000"/>
         </a:lnSpc>
@@ -5671,7 +5807,7 @@
           <a:srgbClr val="000000"/>
         </a:buClr>
         <a:buFont typeface="Arial"/>
-        <a:defRPr b="0" i="0" sz="1400" u="none" cap="none" strike="noStrike">
+        <a:defRPr sz="1400" b="0" i="0" u="none" strike="noStrike" cap="none">
           <a:solidFill>
             <a:srgbClr val="000000"/>
           </a:solidFill>
@@ -5681,7 +5817,7 @@
           <a:sym typeface="Arial"/>
         </a:defRPr>
       </a:lvl7pPr>
-      <a:lvl8pPr lvl="7" marR="0" rtl="0" algn="l">
+      <a:lvl8pPr marR="0" lvl="7" algn="l" rtl="0">
         <a:lnSpc>
           <a:spcPct val="100000"/>
         </a:lnSpc>
@@ -5695,7 +5831,7 @@
           <a:srgbClr val="000000"/>
         </a:buClr>
         <a:buFont typeface="Arial"/>
-        <a:defRPr b="0" i="0" sz="1400" u="none" cap="none" strike="noStrike">
+        <a:defRPr sz="1400" b="0" i="0" u="none" strike="noStrike" cap="none">
           <a:solidFill>
             <a:srgbClr val="000000"/>
           </a:solidFill>
@@ -5705,7 +5841,7 @@
           <a:sym typeface="Arial"/>
         </a:defRPr>
       </a:lvl8pPr>
-      <a:lvl9pPr lvl="8" marR="0" rtl="0" algn="l">
+      <a:lvl9pPr marR="0" lvl="8" algn="l" rtl="0">
         <a:lnSpc>
           <a:spcPct val="100000"/>
         </a:lnSpc>
@@ -5719,7 +5855,7 @@
           <a:srgbClr val="000000"/>
         </a:buClr>
         <a:buFont typeface="Arial"/>
-        <a:defRPr b="0" i="0" sz="1400" u="none" cap="none" strike="noStrike">
+        <a:defRPr sz="1400" b="0" i="0" u="none" strike="noStrike" cap="none">
           <a:solidFill>
             <a:srgbClr val="000000"/>
           </a:solidFill>
@@ -5735,11 +5871,11 @@
 </file>
 
 <file path=ppt/slides/slide1.xml><?xml version="1.0" encoding="utf-8"?>
-<p:sld xmlns:a="http://schemas.openxmlformats.org/drawingml/2006/main" xmlns:r="http://schemas.openxmlformats.org/officeDocument/2006/relationships" xmlns:mc="http://schemas.openxmlformats.org/markup-compatibility/2006" xmlns:mv="urn:schemas-microsoft-com:mac:vml" xmlns:p="http://schemas.openxmlformats.org/presentationml/2006/main" xmlns:c="http://schemas.openxmlformats.org/drawingml/2006/chart" xmlns:dgm="http://schemas.openxmlformats.org/drawingml/2006/diagram" xmlns:o="urn:schemas-microsoft-com:office:office" xmlns:v="urn:schemas-microsoft-com:vml" xmlns:pvml="urn:schemas-microsoft-com:office:powerpoint" xmlns:com="http://schemas.openxmlformats.org/drawingml/2006/compatibility" xmlns:p14="http://schemas.microsoft.com/office/powerpoint/2010/main" xmlns:p15="http://schemas.microsoft.com/office/powerpoint/2012/main" xmlns:ahyp="http://schemas.microsoft.com/office/drawing/2018/hyperlinkcolor">
+<p:sld xmlns:a="http://schemas.openxmlformats.org/drawingml/2006/main" xmlns:r="http://schemas.openxmlformats.org/officeDocument/2006/relationships" xmlns:p="http://schemas.openxmlformats.org/presentationml/2006/main">
   <p:cSld>
     <p:spTree>
       <p:nvGrpSpPr>
-        <p:cNvPr id="53" name="Shape 53"/>
+        <p:cNvPr id="1" name="Shape 53"/>
         <p:cNvGrpSpPr/>
         <p:nvPr/>
       </p:nvGrpSpPr>
@@ -5754,7 +5890,9 @@
       <p:sp>
         <p:nvSpPr>
           <p:cNvPr id="54" name="Google Shape;54;p13"/>
-          <p:cNvSpPr txBox="1"/>
+          <p:cNvSpPr txBox="1">
+            <a:spLocks noGrp="1"/>
+          </p:cNvSpPr>
           <p:nvPr>
             <p:ph type="ctrTitle"/>
           </p:nvPr>
@@ -5769,12 +5907,12 @@
           </a:prstGeom>
         </p:spPr>
         <p:txBody>
-          <a:bodyPr anchorCtr="0" anchor="b" bIns="91425" lIns="91425" spcFirstLastPara="1" rIns="91425" wrap="square" tIns="91425">
+          <a:bodyPr spcFirstLastPara="1" wrap="square" lIns="91425" tIns="91425" rIns="91425" bIns="91425" anchor="b" anchorCtr="0">
             <a:normAutofit/>
           </a:bodyPr>
           <a:lstStyle/>
           <a:p>
-            <a:pPr indent="0" lvl="0" marL="0" rtl="0" algn="ctr">
+            <a:pPr marL="0" lvl="0" indent="0" algn="ctr" rtl="0">
               <a:spcBef>
                 <a:spcPts val="0"/>
               </a:spcBef>
@@ -5794,9 +5932,11 @@
       <p:sp>
         <p:nvSpPr>
           <p:cNvPr id="55" name="Google Shape;55;p13"/>
-          <p:cNvSpPr txBox="1"/>
+          <p:cNvSpPr txBox="1">
+            <a:spLocks noGrp="1"/>
+          </p:cNvSpPr>
           <p:nvPr>
-            <p:ph idx="1" type="subTitle"/>
+            <p:ph type="subTitle" idx="1"/>
           </p:nvPr>
         </p:nvSpPr>
         <p:spPr>
@@ -5809,12 +5949,12 @@
           </a:prstGeom>
         </p:spPr>
         <p:txBody>
-          <a:bodyPr anchorCtr="0" anchor="t" bIns="91425" lIns="91425" spcFirstLastPara="1" rIns="91425" wrap="square" tIns="91425">
+          <a:bodyPr spcFirstLastPara="1" wrap="square" lIns="91425" tIns="91425" rIns="91425" bIns="91425" anchor="t" anchorCtr="0">
             <a:normAutofit/>
           </a:bodyPr>
           <a:lstStyle/>
           <a:p>
-            <a:pPr indent="0" lvl="0" marL="0" rtl="0" algn="ctr">
+            <a:pPr marL="0" lvl="0" indent="0" algn="ctr" rtl="0">
               <a:spcBef>
                 <a:spcPts val="0"/>
               </a:spcBef>
@@ -5823,9 +5963,6 @@
               </a:spcAft>
               <a:buNone/>
             </a:pPr>
-            <a:r>
-              <a:t/>
-            </a:r>
             <a:endParaRPr/>
           </a:p>
         </p:txBody>
@@ -5839,11 +5976,11 @@
 </file>
 
 <file path=ppt/slides/slide2.xml><?xml version="1.0" encoding="utf-8"?>
-<p:sld xmlns:a="http://schemas.openxmlformats.org/drawingml/2006/main" xmlns:r="http://schemas.openxmlformats.org/officeDocument/2006/relationships" xmlns:mc="http://schemas.openxmlformats.org/markup-compatibility/2006" xmlns:mv="urn:schemas-microsoft-com:mac:vml" xmlns:p="http://schemas.openxmlformats.org/presentationml/2006/main" xmlns:c="http://schemas.openxmlformats.org/drawingml/2006/chart" xmlns:dgm="http://schemas.openxmlformats.org/drawingml/2006/diagram" xmlns:o="urn:schemas-microsoft-com:office:office" xmlns:v="urn:schemas-microsoft-com:vml" xmlns:pvml="urn:schemas-microsoft-com:office:powerpoint" xmlns:com="http://schemas.openxmlformats.org/drawingml/2006/compatibility" xmlns:p14="http://schemas.microsoft.com/office/powerpoint/2010/main" xmlns:p15="http://schemas.microsoft.com/office/powerpoint/2012/main" xmlns:ahyp="http://schemas.microsoft.com/office/drawing/2018/hyperlinkcolor">
+<p:sld xmlns:a="http://schemas.openxmlformats.org/drawingml/2006/main" xmlns:r="http://schemas.openxmlformats.org/officeDocument/2006/relationships" xmlns:p="http://schemas.openxmlformats.org/presentationml/2006/main">
   <p:cSld>
     <p:spTree>
       <p:nvGrpSpPr>
-        <p:cNvPr id="59" name="Shape 59"/>
+        <p:cNvPr id="1" name="Shape 59"/>
         <p:cNvGrpSpPr/>
         <p:nvPr/>
       </p:nvGrpSpPr>
@@ -5858,7 +5995,9 @@
       <p:sp>
         <p:nvSpPr>
           <p:cNvPr id="60" name="Google Shape;60;p14"/>
-          <p:cNvSpPr txBox="1"/>
+          <p:cNvSpPr txBox="1">
+            <a:spLocks noGrp="1"/>
+          </p:cNvSpPr>
           <p:nvPr>
             <p:ph type="title"/>
           </p:nvPr>
@@ -5873,12 +6012,12 @@
           </a:prstGeom>
         </p:spPr>
         <p:txBody>
-          <a:bodyPr anchorCtr="0" anchor="t" bIns="91425" lIns="91425" spcFirstLastPara="1" rIns="91425" wrap="square" tIns="91425">
+          <a:bodyPr spcFirstLastPara="1" wrap="square" lIns="91425" tIns="91425" rIns="91425" bIns="91425" anchor="t" anchorCtr="0">
             <a:normAutofit fontScale="90000"/>
           </a:bodyPr>
           <a:lstStyle/>
           <a:p>
-            <a:pPr indent="0" lvl="0" marL="0" rtl="0" algn="l">
+            <a:pPr marL="0" lvl="0" indent="0" algn="l" rtl="0">
               <a:spcBef>
                 <a:spcPts val="0"/>
               </a:spcBef>
@@ -5898,9 +6037,11 @@
       <p:sp>
         <p:nvSpPr>
           <p:cNvPr id="61" name="Google Shape;61;p14"/>
-          <p:cNvSpPr txBox="1"/>
+          <p:cNvSpPr txBox="1">
+            <a:spLocks noGrp="1"/>
+          </p:cNvSpPr>
           <p:nvPr>
-            <p:ph idx="1" type="body"/>
+            <p:ph type="body" idx="1"/>
           </p:nvPr>
         </p:nvSpPr>
         <p:spPr>
@@ -5913,12 +6054,12 @@
           </a:prstGeom>
         </p:spPr>
         <p:txBody>
-          <a:bodyPr anchorCtr="0" anchor="t" bIns="91425" lIns="91425" spcFirstLastPara="1" rIns="91425" wrap="square" tIns="91425">
+          <a:bodyPr spcFirstLastPara="1" wrap="square" lIns="91425" tIns="91425" rIns="91425" bIns="91425" anchor="t" anchorCtr="0">
             <a:normAutofit/>
           </a:bodyPr>
           <a:lstStyle/>
           <a:p>
-            <a:pPr indent="0" lvl="0" marL="0" rtl="0" algn="l">
+            <a:pPr marL="0" lvl="0" indent="0" algn="l" rtl="0">
               <a:spcBef>
                 <a:spcPts val="0"/>
               </a:spcBef>
@@ -5927,9 +6068,6 @@
               </a:spcAft>
               <a:buNone/>
             </a:pPr>
-            <a:r>
-              <a:t/>
-            </a:r>
             <a:endParaRPr/>
           </a:p>
         </p:txBody>
@@ -5964,30 +6102,32 @@
       </p:pic>
       <p:pic>
         <p:nvPicPr>
-          <p:cNvPr id="63" name="Google Shape;63;p14"/>
-          <p:cNvPicPr preferRelativeResize="0"/>
+          <p:cNvPr id="3" name="Picture 2">
+            <a:extLst>
+              <a:ext uri="{FF2B5EF4-FFF2-40B4-BE49-F238E27FC236}">
+                <a16:creationId xmlns:a16="http://schemas.microsoft.com/office/drawing/2014/main" id="{967FE2B2-5E8F-EC3F-413D-AEE97CB96792}"/>
+              </a:ext>
+            </a:extLst>
+          </p:cNvPr>
+          <p:cNvPicPr>
+            <a:picLocks noChangeAspect="1"/>
+          </p:cNvPicPr>
           <p:nvPr/>
         </p:nvPicPr>
         <p:blipFill>
-          <a:blip r:embed="rId4">
-            <a:alphaModFix/>
-          </a:blip>
+          <a:blip r:embed="rId4"/>
           <a:stretch>
             <a:fillRect/>
           </a:stretch>
         </p:blipFill>
         <p:spPr>
           <a:xfrm>
-            <a:off x="3869051" y="146979"/>
-            <a:ext cx="5059951" cy="2342325"/>
+            <a:off x="3965212" y="385043"/>
+            <a:ext cx="4327449" cy="1987715"/>
           </a:xfrm>
           <a:prstGeom prst="rect">
             <a:avLst/>
           </a:prstGeom>
-          <a:noFill/>
-          <a:ln>
-            <a:noFill/>
-          </a:ln>
         </p:spPr>
       </p:pic>
     </p:spTree>
@@ -5999,11 +6139,11 @@
 </file>
 
 <file path=ppt/slides/slide3.xml><?xml version="1.0" encoding="utf-8"?>
-<p:sld xmlns:a="http://schemas.openxmlformats.org/drawingml/2006/main" xmlns:r="http://schemas.openxmlformats.org/officeDocument/2006/relationships" xmlns:mc="http://schemas.openxmlformats.org/markup-compatibility/2006" xmlns:mv="urn:schemas-microsoft-com:mac:vml" xmlns:p="http://schemas.openxmlformats.org/presentationml/2006/main" xmlns:c="http://schemas.openxmlformats.org/drawingml/2006/chart" xmlns:dgm="http://schemas.openxmlformats.org/drawingml/2006/diagram" xmlns:o="urn:schemas-microsoft-com:office:office" xmlns:v="urn:schemas-microsoft-com:vml" xmlns:pvml="urn:schemas-microsoft-com:office:powerpoint" xmlns:com="http://schemas.openxmlformats.org/drawingml/2006/compatibility" xmlns:p14="http://schemas.microsoft.com/office/powerpoint/2010/main" xmlns:p15="http://schemas.microsoft.com/office/powerpoint/2012/main" xmlns:ahyp="http://schemas.microsoft.com/office/drawing/2018/hyperlinkcolor">
+<p:sld xmlns:a="http://schemas.openxmlformats.org/drawingml/2006/main" xmlns:r="http://schemas.openxmlformats.org/officeDocument/2006/relationships" xmlns:p="http://schemas.openxmlformats.org/presentationml/2006/main">
   <p:cSld>
     <p:spTree>
       <p:nvGrpSpPr>
-        <p:cNvPr id="67" name="Shape 67"/>
+        <p:cNvPr id="1" name="Shape 67"/>
         <p:cNvGrpSpPr/>
         <p:nvPr/>
       </p:nvGrpSpPr>
@@ -6018,7 +6158,9 @@
       <p:sp>
         <p:nvSpPr>
           <p:cNvPr id="68" name="Google Shape;68;p15"/>
-          <p:cNvSpPr txBox="1"/>
+          <p:cNvSpPr txBox="1">
+            <a:spLocks noGrp="1"/>
+          </p:cNvSpPr>
           <p:nvPr>
             <p:ph type="title"/>
           </p:nvPr>
@@ -6033,12 +6175,12 @@
           </a:prstGeom>
         </p:spPr>
         <p:txBody>
-          <a:bodyPr anchorCtr="0" anchor="t" bIns="91425" lIns="91425" spcFirstLastPara="1" rIns="91425" wrap="square" tIns="91425">
+          <a:bodyPr spcFirstLastPara="1" wrap="square" lIns="91425" tIns="91425" rIns="91425" bIns="91425" anchor="t" anchorCtr="0">
             <a:normAutofit fontScale="90000"/>
           </a:bodyPr>
           <a:lstStyle/>
           <a:p>
-            <a:pPr indent="0" lvl="0" marL="0" rtl="0" algn="l">
+            <a:pPr marL="0" lvl="0" indent="0" algn="l" rtl="0">
               <a:spcBef>
                 <a:spcPts val="0"/>
               </a:spcBef>
@@ -6058,9 +6200,11 @@
       <p:sp>
         <p:nvSpPr>
           <p:cNvPr id="69" name="Google Shape;69;p15"/>
-          <p:cNvSpPr txBox="1"/>
+          <p:cNvSpPr txBox="1">
+            <a:spLocks noGrp="1"/>
+          </p:cNvSpPr>
           <p:nvPr>
-            <p:ph idx="1" type="body"/>
+            <p:ph type="body" idx="1"/>
           </p:nvPr>
         </p:nvSpPr>
         <p:spPr>
@@ -6073,12 +6217,12 @@
           </a:prstGeom>
         </p:spPr>
         <p:txBody>
-          <a:bodyPr anchorCtr="0" anchor="t" bIns="91425" lIns="91425" spcFirstLastPara="1" rIns="91425" wrap="square" tIns="91425">
+          <a:bodyPr spcFirstLastPara="1" wrap="square" lIns="91425" tIns="91425" rIns="91425" bIns="91425" anchor="t" anchorCtr="0">
             <a:normAutofit/>
           </a:bodyPr>
           <a:lstStyle/>
           <a:p>
-            <a:pPr indent="0" lvl="0" marL="0" rtl="0" algn="l">
+            <a:pPr marL="0" lvl="0" indent="0" algn="l" rtl="0">
               <a:spcBef>
                 <a:spcPts val="0"/>
               </a:spcBef>
@@ -6087,41 +6231,10 @@
               </a:spcAft>
               <a:buNone/>
             </a:pPr>
-            <a:r>
-              <a:t/>
-            </a:r>
             <a:endParaRPr/>
           </a:p>
         </p:txBody>
       </p:sp>
-      <p:pic>
-        <p:nvPicPr>
-          <p:cNvPr id="70" name="Google Shape;70;p15"/>
-          <p:cNvPicPr preferRelativeResize="0"/>
-          <p:nvPr/>
-        </p:nvPicPr>
-        <p:blipFill>
-          <a:blip r:embed="rId3">
-            <a:alphaModFix/>
-          </a:blip>
-          <a:stretch>
-            <a:fillRect/>
-          </a:stretch>
-        </p:blipFill>
-        <p:spPr>
-          <a:xfrm>
-            <a:off x="3776800" y="112025"/>
-            <a:ext cx="5200101" cy="2375549"/>
-          </a:xfrm>
-          <a:prstGeom prst="rect">
-            <a:avLst/>
-          </a:prstGeom>
-          <a:noFill/>
-          <a:ln>
-            <a:noFill/>
-          </a:ln>
-        </p:spPr>
-      </p:pic>
       <p:pic>
         <p:nvPicPr>
           <p:cNvPr id="71" name="Google Shape;71;p15"/>
@@ -6129,7 +6242,7 @@
           <p:nvPr/>
         </p:nvPicPr>
         <p:blipFill>
-          <a:blip r:embed="rId4">
+          <a:blip r:embed="rId3">
             <a:alphaModFix/>
           </a:blip>
           <a:stretch>
@@ -6150,6 +6263,36 @@
           </a:ln>
         </p:spPr>
       </p:pic>
+      <p:pic>
+        <p:nvPicPr>
+          <p:cNvPr id="3" name="Picture 2" descr="Graphical user interface, chart, histogram&#10;&#10;AI-generated content may be incorrect.">
+            <a:extLst>
+              <a:ext uri="{FF2B5EF4-FFF2-40B4-BE49-F238E27FC236}">
+                <a16:creationId xmlns:a16="http://schemas.microsoft.com/office/drawing/2014/main" id="{59D06B3C-72BC-1DEC-EFE3-A86E92112528}"/>
+              </a:ext>
+            </a:extLst>
+          </p:cNvPr>
+          <p:cNvPicPr>
+            <a:picLocks noChangeAspect="1"/>
+          </p:cNvPicPr>
+          <p:nvPr/>
+        </p:nvPicPr>
+        <p:blipFill>
+          <a:blip r:embed="rId4"/>
+          <a:stretch>
+            <a:fillRect/>
+          </a:stretch>
+        </p:blipFill>
+        <p:spPr>
+          <a:xfrm>
+            <a:off x="3560293" y="289431"/>
+            <a:ext cx="4938492" cy="2282319"/>
+          </a:xfrm>
+          <a:prstGeom prst="rect">
+            <a:avLst/>
+          </a:prstGeom>
+        </p:spPr>
+      </p:pic>
     </p:spTree>
   </p:cSld>
   <p:clrMapOvr>
@@ -6159,11 +6302,11 @@
 </file>
 
 <file path=ppt/slides/slide4.xml><?xml version="1.0" encoding="utf-8"?>
-<p:sld xmlns:a="http://schemas.openxmlformats.org/drawingml/2006/main" xmlns:r="http://schemas.openxmlformats.org/officeDocument/2006/relationships" xmlns:mc="http://schemas.openxmlformats.org/markup-compatibility/2006" xmlns:mv="urn:schemas-microsoft-com:mac:vml" xmlns:p="http://schemas.openxmlformats.org/presentationml/2006/main" xmlns:c="http://schemas.openxmlformats.org/drawingml/2006/chart" xmlns:dgm="http://schemas.openxmlformats.org/drawingml/2006/diagram" xmlns:o="urn:schemas-microsoft-com:office:office" xmlns:v="urn:schemas-microsoft-com:vml" xmlns:pvml="urn:schemas-microsoft-com:office:powerpoint" xmlns:com="http://schemas.openxmlformats.org/drawingml/2006/compatibility" xmlns:p14="http://schemas.microsoft.com/office/powerpoint/2010/main" xmlns:p15="http://schemas.microsoft.com/office/powerpoint/2012/main" xmlns:ahyp="http://schemas.microsoft.com/office/drawing/2018/hyperlinkcolor">
+<p:sld xmlns:a="http://schemas.openxmlformats.org/drawingml/2006/main" xmlns:r="http://schemas.openxmlformats.org/officeDocument/2006/relationships" xmlns:p="http://schemas.openxmlformats.org/presentationml/2006/main">
   <p:cSld>
     <p:spTree>
       <p:nvGrpSpPr>
-        <p:cNvPr id="75" name="Shape 75"/>
+        <p:cNvPr id="1" name="Shape 75"/>
         <p:cNvGrpSpPr/>
         <p:nvPr/>
       </p:nvGrpSpPr>
@@ -6178,7 +6321,9 @@
       <p:sp>
         <p:nvSpPr>
           <p:cNvPr id="76" name="Google Shape;76;p16"/>
-          <p:cNvSpPr txBox="1"/>
+          <p:cNvSpPr txBox="1">
+            <a:spLocks noGrp="1"/>
+          </p:cNvSpPr>
           <p:nvPr>
             <p:ph type="title"/>
           </p:nvPr>
@@ -6193,12 +6338,12 @@
           </a:prstGeom>
         </p:spPr>
         <p:txBody>
-          <a:bodyPr anchorCtr="0" anchor="t" bIns="91425" lIns="91425" spcFirstLastPara="1" rIns="91425" wrap="square" tIns="91425">
+          <a:bodyPr spcFirstLastPara="1" wrap="square" lIns="91425" tIns="91425" rIns="91425" bIns="91425" anchor="t" anchorCtr="0">
             <a:normAutofit fontScale="90000"/>
           </a:bodyPr>
           <a:lstStyle/>
           <a:p>
-            <a:pPr indent="0" lvl="0" marL="0" rtl="0" algn="l">
+            <a:pPr marL="0" lvl="0" indent="0" algn="l" rtl="0">
               <a:spcBef>
                 <a:spcPts val="0"/>
               </a:spcBef>
@@ -6218,9 +6363,11 @@
       <p:sp>
         <p:nvSpPr>
           <p:cNvPr id="77" name="Google Shape;77;p16"/>
-          <p:cNvSpPr txBox="1"/>
+          <p:cNvSpPr txBox="1">
+            <a:spLocks noGrp="1"/>
+          </p:cNvSpPr>
           <p:nvPr>
-            <p:ph idx="1" type="body"/>
+            <p:ph type="body" idx="1"/>
           </p:nvPr>
         </p:nvSpPr>
         <p:spPr>
@@ -6233,12 +6380,12 @@
           </a:prstGeom>
         </p:spPr>
         <p:txBody>
-          <a:bodyPr anchorCtr="0" anchor="t" bIns="91425" lIns="91425" spcFirstLastPara="1" rIns="91425" wrap="square" tIns="91425">
+          <a:bodyPr spcFirstLastPara="1" wrap="square" lIns="91425" tIns="91425" rIns="91425" bIns="91425" anchor="t" anchorCtr="0">
             <a:normAutofit/>
           </a:bodyPr>
           <a:lstStyle/>
           <a:p>
-            <a:pPr indent="0" lvl="0" marL="0" rtl="0" algn="l">
+            <a:pPr marL="0" lvl="0" indent="0" algn="l" rtl="0">
               <a:spcBef>
                 <a:spcPts val="0"/>
               </a:spcBef>
@@ -6254,7 +6401,7 @@
             <a:endParaRPr/>
           </a:p>
           <a:p>
-            <a:pPr indent="0" lvl="0" marL="0" rtl="0" algn="l">
+            <a:pPr marL="0" lvl="0" indent="0" algn="l" rtl="0">
               <a:spcBef>
                 <a:spcPts val="1200"/>
               </a:spcBef>
@@ -6270,7 +6417,7 @@
             <a:endParaRPr/>
           </a:p>
           <a:p>
-            <a:pPr indent="0" lvl="0" marL="0" rtl="0" algn="l">
+            <a:pPr marL="0" lvl="0" indent="0" algn="l" rtl="0">
               <a:spcBef>
                 <a:spcPts val="1200"/>
               </a:spcBef>
@@ -6281,31 +6428,7 @@
             </a:pPr>
             <a:r>
               <a:rPr lang="en"/>
-              <a:t>I’m not </a:t>
-            </a:r>
-            <a:r>
-              <a:rPr lang="en"/>
-              <a:t>exactly</a:t>
-            </a:r>
-            <a:r>
-              <a:rPr lang="en"/>
-              <a:t> sure why the two </a:t>
-            </a:r>
-            <a:r>
-              <a:rPr lang="en"/>
-              <a:t>calculations</a:t>
-            </a:r>
-            <a:r>
-              <a:rPr lang="en"/>
-              <a:t> of correlation of the (blue) solar wind only differ so much.  It is likely because correlation is not well defined for a power law so </a:t>
-            </a:r>
-            <a:r>
-              <a:rPr lang="en"/>
-              <a:t>difference</a:t>
-            </a:r>
-            <a:r>
-              <a:rPr lang="en"/>
-              <a:t> in sample window greatly affect the result.</a:t>
+              <a:t>I’m not exactly sure why the two calculations of correlation of the (blue) solar wind only differ so much.  It is likely because correlation is not well defined for a power law so difference in sample window greatly affect the result.</a:t>
             </a:r>
             <a:endParaRPr/>
           </a:p>
@@ -6319,8 +6442,472 @@
 </p:sld>
 </file>
 
+<file path=ppt/slides/slide5.xml><?xml version="1.0" encoding="utf-8"?>
+<p:sld xmlns:a="http://schemas.openxmlformats.org/drawingml/2006/main" xmlns:r="http://schemas.openxmlformats.org/officeDocument/2006/relationships" xmlns:p="http://schemas.openxmlformats.org/presentationml/2006/main">
+  <p:cSld>
+    <p:spTree>
+      <p:nvGrpSpPr>
+        <p:cNvPr id="1" name=""/>
+        <p:cNvGrpSpPr/>
+        <p:nvPr/>
+      </p:nvGrpSpPr>
+      <p:grpSpPr>
+        <a:xfrm>
+          <a:off x="0" y="0"/>
+          <a:ext cx="0" cy="0"/>
+          <a:chOff x="0" y="0"/>
+          <a:chExt cx="0" cy="0"/>
+        </a:xfrm>
+      </p:grpSpPr>
+      <p:sp>
+        <p:nvSpPr>
+          <p:cNvPr id="2" name="Title 1">
+            <a:extLst>
+              <a:ext uri="{FF2B5EF4-FFF2-40B4-BE49-F238E27FC236}">
+                <a16:creationId xmlns:a16="http://schemas.microsoft.com/office/drawing/2014/main" id="{50FB931C-4228-126A-B84C-8CAC765D0988}"/>
+              </a:ext>
+            </a:extLst>
+          </p:cNvPr>
+          <p:cNvSpPr>
+            <a:spLocks noGrp="1"/>
+          </p:cNvSpPr>
+          <p:nvPr>
+            <p:ph type="title"/>
+          </p:nvPr>
+        </p:nvSpPr>
+        <p:spPr/>
+        <p:txBody>
+          <a:bodyPr>
+            <a:normAutofit fontScale="90000"/>
+          </a:bodyPr>
+          <a:lstStyle/>
+          <a:p>
+            <a:endParaRPr lang="en-US"/>
+          </a:p>
+        </p:txBody>
+      </p:sp>
+      <mc:AlternateContent xmlns:mc="http://schemas.openxmlformats.org/markup-compatibility/2006">
+        <mc:Choice xmlns:a14="http://schemas.microsoft.com/office/drawing/2010/main" Requires="a14">
+          <p:sp>
+            <p:nvSpPr>
+              <p:cNvPr id="3" name="Text Placeholder 2">
+                <a:extLst>
+                  <a:ext uri="{FF2B5EF4-FFF2-40B4-BE49-F238E27FC236}">
+                    <a16:creationId xmlns:a16="http://schemas.microsoft.com/office/drawing/2014/main" id="{476994AD-752D-1036-3551-76FD29BA8AFF}"/>
+                  </a:ext>
+                </a:extLst>
+              </p:cNvPr>
+              <p:cNvSpPr>
+                <a:spLocks noGrp="1"/>
+              </p:cNvSpPr>
+              <p:nvPr>
+                <p:ph type="body" idx="1"/>
+              </p:nvPr>
+            </p:nvSpPr>
+            <p:spPr/>
+            <p:txBody>
+              <a:bodyPr>
+                <a:normAutofit fontScale="77500" lnSpcReduction="20000"/>
+              </a:bodyPr>
+              <a:lstStyle/>
+              <a:p>
+                <a:r>
+                  <a:rPr lang="en-US" b="1" dirty="0"/>
+                  <a:t>Why this is true (tight version)</a:t>
+                </a:r>
+              </a:p>
+              <a:p>
+                <a:r>
+                  <a:rPr lang="en-US" dirty="0"/>
+                  <a:t>If the noise PSD is</a:t>
+                </a:r>
+              </a:p>
+              <a:p>
+                <a14:m>
+                  <m:oMath xmlns:m="http://schemas.openxmlformats.org/officeDocument/2006/math">
+                    <m:r>
+                      <a:rPr lang="en-US" i="1"/>
+                      <m:t>𝑆</m:t>
+                    </m:r>
+                    <m:d>
+                      <m:dPr>
+                        <m:ctrlPr>
+                          <a:rPr lang="ar-AE" i="1"/>
+                        </m:ctrlPr>
+                      </m:dPr>
+                      <m:e>
+                        <m:r>
+                          <a:rPr lang="ar-AE" i="1"/>
+                          <m:t>𝑓</m:t>
+                        </m:r>
+                      </m:e>
+                    </m:d>
+                    <m:r>
+                      <a:rPr lang="ar-AE"/>
+                      <m:t>=</m:t>
+                    </m:r>
+                    <m:f>
+                      <m:fPr>
+                        <m:ctrlPr>
+                          <a:rPr lang="ar-AE" i="1"/>
+                        </m:ctrlPr>
+                      </m:fPr>
+                      <m:num>
+                        <m:r>
+                          <a:rPr lang="ar-AE" i="1"/>
+                          <m:t>𝐴</m:t>
+                        </m:r>
+                      </m:num>
+                      <m:den>
+                        <m:r>
+                          <a:rPr lang="ar-AE" i="1"/>
+                          <m:t>𝑓</m:t>
+                        </m:r>
+                      </m:den>
+                    </m:f>
+                    <m:r>
+                      <a:rPr lang="ar-AE"/>
+                      <m:t>,</m:t>
+                    </m:r>
+                  </m:oMath>
+                </a14:m>
+                <a:endParaRPr lang="ar-AE" dirty="0"/>
+              </a:p>
+              <a:p>
+                <a:r>
+                  <a:rPr lang="en-US" dirty="0"/>
+                  <a:t>and your frequency bin scales as</a:t>
+                </a:r>
+              </a:p>
+              <a:p>
+                <a14:m>
+                  <m:oMath xmlns:m="http://schemas.openxmlformats.org/officeDocument/2006/math">
+                    <m:r>
+                      <m:rPr>
+                        <m:sty m:val="p"/>
+                      </m:rPr>
+                      <a:rPr lang="el-GR"/>
+                      <m:t>Δ</m:t>
+                    </m:r>
+                    <m:r>
+                      <a:rPr lang="el-GR" i="1"/>
+                      <m:t>𝑓</m:t>
+                    </m:r>
+                    <m:r>
+                      <a:rPr lang="el-GR"/>
+                      <m:t>∼</m:t>
+                    </m:r>
+                    <m:r>
+                      <a:rPr lang="el-GR" i="1"/>
+                      <m:t>𝑓</m:t>
+                    </m:r>
+                    <m:r>
+                      <a:rPr lang="el-GR"/>
+                      <m:t> </m:t>
+                    </m:r>
+                    <m:d>
+                      <m:dPr>
+                        <m:ctrlPr>
+                          <a:rPr lang="ar-AE" i="1"/>
+                        </m:ctrlPr>
+                      </m:dPr>
+                      <m:e>
+                        <m:r>
+                          <m:rPr>
+                            <m:nor/>
+                          </m:rPr>
+                          <a:rPr lang="en-US" i="1"/>
+                          <m:t>constant</m:t>
+                        </m:r>
+                        <m:r>
+                          <m:rPr>
+                            <m:nor/>
+                          </m:rPr>
+                          <a:rPr lang="en-US" i="1"/>
+                          <m:t> </m:t>
+                        </m:r>
+                        <m:r>
+                          <m:rPr>
+                            <m:nor/>
+                          </m:rPr>
+                          <a:rPr lang="en-US" i="1"/>
+                          <m:t>fractional</m:t>
+                        </m:r>
+                        <m:r>
+                          <m:rPr>
+                            <m:nor/>
+                          </m:rPr>
+                          <a:rPr lang="en-US" i="1"/>
+                          <m:t> </m:t>
+                        </m:r>
+                        <m:r>
+                          <m:rPr>
+                            <m:nor/>
+                          </m:rPr>
+                          <a:rPr lang="en-US" i="1"/>
+                          <m:t>bandwidth</m:t>
+                        </m:r>
+                      </m:e>
+                    </m:d>
+                    <m:r>
+                      <a:rPr lang="ar-AE"/>
+                      <m:t>,</m:t>
+                    </m:r>
+                  </m:oMath>
+                </a14:m>
+                <a:endParaRPr lang="ar-AE" dirty="0"/>
+              </a:p>
+              <a:p>
+                <a:r>
+                  <a:rPr lang="en-US" dirty="0"/>
+                  <a:t>then the noise power in that bin is</a:t>
+                </a:r>
+              </a:p>
+              <a:p>
+                <a14:m>
+                  <m:oMath xmlns:m="http://schemas.openxmlformats.org/officeDocument/2006/math">
+                    <m:sSup>
+                      <m:sSupPr>
+                        <m:ctrlPr>
+                          <a:rPr lang="ar-AE"/>
+                        </m:ctrlPr>
+                      </m:sSupPr>
+                      <m:e>
+                        <m:r>
+                          <a:rPr lang="ar-AE" i="1"/>
+                          <m:t>𝜎</m:t>
+                        </m:r>
+                      </m:e>
+                      <m:sup>
+                        <m:r>
+                          <a:rPr lang="ar-AE"/>
+                          <m:t>2</m:t>
+                        </m:r>
+                      </m:sup>
+                    </m:sSup>
+                    <m:d>
+                      <m:dPr>
+                        <m:ctrlPr>
+                          <a:rPr lang="ar-AE" i="1"/>
+                        </m:ctrlPr>
+                      </m:dPr>
+                      <m:e>
+                        <m:r>
+                          <a:rPr lang="ar-AE" i="1"/>
+                          <m:t>𝑓</m:t>
+                        </m:r>
+                      </m:e>
+                    </m:d>
+                    <m:r>
+                      <a:rPr lang="ar-AE"/>
+                      <m:t>∼</m:t>
+                    </m:r>
+                    <m:r>
+                      <a:rPr lang="ar-AE" i="1"/>
+                      <m:t>𝑆</m:t>
+                    </m:r>
+                    <m:d>
+                      <m:dPr>
+                        <m:ctrlPr>
+                          <a:rPr lang="ar-AE" i="1"/>
+                        </m:ctrlPr>
+                      </m:dPr>
+                      <m:e>
+                        <m:r>
+                          <a:rPr lang="ar-AE" i="1"/>
+                          <m:t>𝑓</m:t>
+                        </m:r>
+                      </m:e>
+                    </m:d>
+                    <m:r>
+                      <m:rPr>
+                        <m:nor/>
+                      </m:rPr>
+                      <a:rPr lang="ar-AE" i="1"/>
+                      <m:t> </m:t>
+                    </m:r>
+                    <m:r>
+                      <m:rPr>
+                        <m:sty m:val="p"/>
+                      </m:rPr>
+                      <a:rPr lang="el-GR"/>
+                      <m:t>Δ</m:t>
+                    </m:r>
+                    <m:r>
+                      <a:rPr lang="el-GR" i="1"/>
+                      <m:t>𝑓</m:t>
+                    </m:r>
+                    <m:r>
+                      <a:rPr lang="el-GR"/>
+                      <m:t>∼</m:t>
+                    </m:r>
+                    <m:f>
+                      <m:fPr>
+                        <m:ctrlPr>
+                          <a:rPr lang="ar-AE" i="1"/>
+                        </m:ctrlPr>
+                      </m:fPr>
+                      <m:num>
+                        <m:r>
+                          <a:rPr lang="ar-AE" i="1"/>
+                          <m:t>𝐴</m:t>
+                        </m:r>
+                      </m:num>
+                      <m:den>
+                        <m:r>
+                          <a:rPr lang="ar-AE" i="1"/>
+                          <m:t>𝑓</m:t>
+                        </m:r>
+                      </m:den>
+                    </m:f>
+                    <m:r>
+                      <m:rPr>
+                        <m:nor/>
+                      </m:rPr>
+                      <a:rPr lang="ar-AE" i="1"/>
+                      <m:t> </m:t>
+                    </m:r>
+                    <m:r>
+                      <a:rPr lang="ar-AE" i="1"/>
+                      <m:t>𝑓</m:t>
+                    </m:r>
+                    <m:r>
+                      <a:rPr lang="ar-AE"/>
+                      <m:t>=</m:t>
+                    </m:r>
+                    <m:r>
+                      <a:rPr lang="ar-AE" i="1"/>
+                      <m:t>𝐴</m:t>
+                    </m:r>
+                    <m:r>
+                      <a:rPr lang="ar-AE"/>
+                      <m:t>.</m:t>
+                    </m:r>
+                  </m:oMath>
+                </a14:m>
+                <a:endParaRPr lang="ar-AE" dirty="0"/>
+              </a:p>
+              <a:p>
+                <a:r>
+                  <a:rPr lang="en-US" dirty="0"/>
+                  <a:t>So:</a:t>
+                </a:r>
+              </a:p>
+              <a:p>
+                <a:r>
+                  <a:rPr lang="en-US" dirty="0"/>
+                  <a:t>Lower frequencies → higher PSD</a:t>
+                </a:r>
+              </a:p>
+              <a:p>
+                <a:r>
+                  <a:rPr lang="en-US" dirty="0"/>
+                  <a:t>But → proportionally narrower bandwidth</a:t>
+                </a:r>
+              </a:p>
+              <a:p>
+                <a:r>
+                  <a:rPr lang="en-US" b="1" dirty="0"/>
+                  <a:t>They cancel</a:t>
+                </a:r>
+                <a:endParaRPr lang="en-US" dirty="0"/>
+              </a:p>
+              <a:p>
+                <a:r>
+                  <a:rPr lang="en-US" dirty="0"/>
+                  <a:t>That’s exactly the reasoning you gave.</a:t>
+                </a:r>
+              </a:p>
+              <a:p>
+                <a:r>
+                  <a:rPr lang="en-US" dirty="0"/>
+                  <a:t>This is why people say:</a:t>
+                </a:r>
+              </a:p>
+              <a:p>
+                <a14:m>
+                  <m:oMath xmlns:m="http://schemas.openxmlformats.org/officeDocument/2006/math">
+                    <m:r>
+                      <a:rPr lang="en-US" b="1" i="1"/>
+                      <m:t>𝟏</m:t>
+                    </m:r>
+                    <m:r>
+                      <a:rPr lang="en-US" b="1"/>
+                      <m:t>/</m:t>
+                    </m:r>
+                    <m:r>
+                      <a:rPr lang="en-US" b="1" i="1"/>
+                      <m:t>𝒇</m:t>
+                    </m:r>
+                  </m:oMath>
+                </a14:m>
+                <a:r>
+                  <a:rPr lang="en-US" b="1" i="1" dirty="0"/>
+                  <a:t>noise has equal power per decade</a:t>
+                </a:r>
+                <a:endParaRPr lang="en-US" b="1" dirty="0"/>
+              </a:p>
+              <a:p>
+                <a:endParaRPr lang="en-US" dirty="0"/>
+              </a:p>
+            </p:txBody>
+          </p:sp>
+        </mc:Choice>
+        <mc:Fallback>
+          <p:sp>
+            <p:nvSpPr>
+              <p:cNvPr id="3" name="Text Placeholder 2">
+                <a:extLst>
+                  <a:ext uri="{FF2B5EF4-FFF2-40B4-BE49-F238E27FC236}">
+                    <a16:creationId xmlns:a16="http://schemas.microsoft.com/office/drawing/2014/main" id="{476994AD-752D-1036-3551-76FD29BA8AFF}"/>
+                  </a:ext>
+                </a:extLst>
+              </p:cNvPr>
+              <p:cNvSpPr>
+                <a:spLocks noGrp="1" noRot="1" noChangeAspect="1" noMove="1" noResize="1" noEditPoints="1" noAdjustHandles="1" noChangeArrowheads="1" noChangeShapeType="1" noTextEdit="1"/>
+              </p:cNvSpPr>
+              <p:nvPr>
+                <p:ph type="body" idx="1"/>
+              </p:nvPr>
+            </p:nvSpPr>
+            <p:spPr>
+              <a:blipFill>
+                <a:blip r:embed="rId2"/>
+                <a:stretch>
+                  <a:fillRect t="-536" b="-1429"/>
+                </a:stretch>
+              </a:blipFill>
+            </p:spPr>
+            <p:txBody>
+              <a:bodyPr/>
+              <a:lstStyle/>
+              <a:p>
+                <a:r>
+                  <a:rPr lang="en-US">
+                    <a:noFill/>
+                  </a:rPr>
+                  <a:t> </a:t>
+                </a:r>
+              </a:p>
+            </p:txBody>
+          </p:sp>
+        </mc:Fallback>
+      </mc:AlternateContent>
+    </p:spTree>
+    <p:extLst>
+      <p:ext uri="{BB962C8B-B14F-4D97-AF65-F5344CB8AC3E}">
+        <p14:creationId xmlns:p14="http://schemas.microsoft.com/office/powerpoint/2010/main" val="2683618824"/>
+      </p:ext>
+    </p:extLst>
+  </p:cSld>
+  <p:clrMapOvr>
+    <a:masterClrMapping/>
+  </p:clrMapOvr>
+</p:sld>
+</file>
+
 <file path=ppt/theme/theme1.xml><?xml version="1.0" encoding="utf-8"?>
-<a:theme xmlns:a="http://schemas.openxmlformats.org/drawingml/2006/main" xmlns:r="http://schemas.openxmlformats.org/officeDocument/2006/relationships" name="Simple Light">
+<a:theme xmlns:a="http://schemas.openxmlformats.org/drawingml/2006/main" name="Simple Light">
   <a:themeElements>
     <a:clrScheme name="Simple Light">
       <a:dk1>
@@ -6595,11 +7182,13 @@
       </a:bgFillStyleLst>
     </a:fmtScheme>
   </a:themeElements>
+  <a:objectDefaults/>
+  <a:extraClrSchemeLst/>
 </a:theme>
 </file>
 
 <file path=ppt/theme/theme2.xml><?xml version="1.0" encoding="utf-8"?>
-<a:theme xmlns:a="http://schemas.openxmlformats.org/drawingml/2006/main" xmlns:r="http://schemas.openxmlformats.org/officeDocument/2006/relationships">
+<a:theme xmlns:a="http://schemas.openxmlformats.org/drawingml/2006/main">
   <a:themeElements>
     <a:clrScheme name="Default">
       <a:dk1>
@@ -6874,5 +7463,7 @@
       </a:bgFillStyleLst>
     </a:fmtScheme>
   </a:themeElements>
+  <a:objectDefaults/>
+  <a:extraClrSchemeLst/>
 </a:theme>
 </file>
</xml_diff>

<commit_message>
Reorganize project modules and workflows
</commit_message>
<xml_diff>
--- a/solar_wind_noise/Gradiometer Correlation functions.pptx
+++ b/solar_wind_noise/Gradiometer Correlation functions.pptx
@@ -5,7 +5,7 @@
     <p:sldMasterId id="2147483659" r:id="rId1"/>
   </p:sldMasterIdLst>
   <p:notesMasterIdLst>
-    <p:notesMasterId r:id="rId7"/>
+    <p:notesMasterId r:id="rId8"/>
   </p:notesMasterIdLst>
   <p:sldIdLst>
     <p:sldId id="256" r:id="rId2"/>
@@ -13,6 +13,7 @@
     <p:sldId id="258" r:id="rId4"/>
     <p:sldId id="259" r:id="rId5"/>
     <p:sldId id="260" r:id="rId6"/>
+    <p:sldId id="261" r:id="rId7"/>
   </p:sldIdLst>
   <p:sldSz cx="9144000" cy="5143500" type="screen16x9"/>
   <p:notesSz cx="6858000" cy="9144000"/>
@@ -734,8 +735,8 @@
         </p:nvSpPr>
         <p:spPr>
           <a:xfrm>
-            <a:off x="381300" y="685800"/>
-            <a:ext cx="6096075" cy="3429000"/>
+            <a:off x="381000" y="685800"/>
+            <a:ext cx="6096000" cy="3429000"/>
           </a:xfrm>
           <a:custGeom>
             <a:avLst/>
@@ -5922,10 +5923,10 @@
               <a:buNone/>
             </a:pPr>
             <a:r>
-              <a:rPr lang="en"/>
-              <a:t>Correlation functions</a:t>
+              <a:rPr lang="en" dirty="0"/>
+              <a:t>Gradometer Notes</a:t>
             </a:r>
-            <a:endParaRPr/>
+            <a:endParaRPr dirty="0"/>
           </a:p>
         </p:txBody>
       </p:sp>
@@ -6486,8 +6487,8 @@
           </a:p>
         </p:txBody>
       </p:sp>
-      <mc:AlternateContent xmlns:mc="http://schemas.openxmlformats.org/markup-compatibility/2006">
-        <mc:Choice xmlns:a14="http://schemas.microsoft.com/office/drawing/2010/main" Requires="a14">
+      <mc:AlternateContent xmlns:mc="http://schemas.openxmlformats.org/markup-compatibility/2006" xmlns:a14="http://schemas.microsoft.com/office/drawing/2010/main">
+        <mc:Choice Requires="a14">
           <p:sp>
             <p:nvSpPr>
               <p:cNvPr id="3" name="Text Placeholder 2">
@@ -6526,47 +6527,63 @@
                 <a14:m>
                   <m:oMath xmlns:m="http://schemas.openxmlformats.org/officeDocument/2006/math">
                     <m:r>
-                      <a:rPr lang="en-US" i="1"/>
+                      <a:rPr lang="en-US" i="1">
+                        <a:latin typeface="Cambria Math" panose="02040503050406030204" pitchFamily="18" charset="0"/>
+                      </a:rPr>
                       <m:t>𝑆</m:t>
                     </m:r>
                     <m:d>
                       <m:dPr>
                         <m:ctrlPr>
-                          <a:rPr lang="ar-AE" i="1"/>
+                          <a:rPr lang="ar-AE" i="1">
+                            <a:latin typeface="Cambria Math" panose="02040503050406030204" pitchFamily="18" charset="0"/>
+                          </a:rPr>
                         </m:ctrlPr>
                       </m:dPr>
                       <m:e>
                         <m:r>
-                          <a:rPr lang="ar-AE" i="1"/>
+                          <a:rPr lang="ar-AE" i="1">
+                            <a:latin typeface="Cambria Math" panose="02040503050406030204" pitchFamily="18" charset="0"/>
+                          </a:rPr>
                           <m:t>𝑓</m:t>
                         </m:r>
                       </m:e>
                     </m:d>
                     <m:r>
-                      <a:rPr lang="ar-AE"/>
+                      <a:rPr lang="ar-AE">
+                        <a:latin typeface="Cambria Math" panose="02040503050406030204" pitchFamily="18" charset="0"/>
+                      </a:rPr>
                       <m:t>=</m:t>
                     </m:r>
                     <m:f>
                       <m:fPr>
                         <m:ctrlPr>
-                          <a:rPr lang="ar-AE" i="1"/>
+                          <a:rPr lang="ar-AE" i="1">
+                            <a:latin typeface="Cambria Math" panose="02040503050406030204" pitchFamily="18" charset="0"/>
+                          </a:rPr>
                         </m:ctrlPr>
                       </m:fPr>
                       <m:num>
                         <m:r>
-                          <a:rPr lang="ar-AE" i="1"/>
+                          <a:rPr lang="ar-AE" i="1">
+                            <a:latin typeface="Cambria Math" panose="02040503050406030204" pitchFamily="18" charset="0"/>
+                          </a:rPr>
                           <m:t>𝐴</m:t>
                         </m:r>
                       </m:num>
                       <m:den>
                         <m:r>
-                          <a:rPr lang="ar-AE" i="1"/>
+                          <a:rPr lang="ar-AE" i="1">
+                            <a:latin typeface="Cambria Math" panose="02040503050406030204" pitchFamily="18" charset="0"/>
+                          </a:rPr>
                           <m:t>𝑓</m:t>
                         </m:r>
                       </m:den>
                     </m:f>
                     <m:r>
-                      <a:rPr lang="ar-AE"/>
+                      <a:rPr lang="ar-AE">
+                        <a:latin typeface="Cambria Math" panose="02040503050406030204" pitchFamily="18" charset="0"/>
+                      </a:rPr>
                       <m:t>,</m:t>
                     </m:r>
                   </m:oMath>
@@ -6586,29 +6603,41 @@
                       <m:rPr>
                         <m:sty m:val="p"/>
                       </m:rPr>
-                      <a:rPr lang="el-GR"/>
+                      <a:rPr lang="el-GR">
+                        <a:latin typeface="Cambria Math" panose="02040503050406030204" pitchFamily="18" charset="0"/>
+                      </a:rPr>
                       <m:t>Δ</m:t>
                     </m:r>
                     <m:r>
-                      <a:rPr lang="el-GR" i="1"/>
+                      <a:rPr lang="el-GR" i="1">
+                        <a:latin typeface="Cambria Math" panose="02040503050406030204" pitchFamily="18" charset="0"/>
+                      </a:rPr>
                       <m:t>𝑓</m:t>
                     </m:r>
                     <m:r>
-                      <a:rPr lang="el-GR"/>
+                      <a:rPr lang="el-GR">
+                        <a:latin typeface="Cambria Math" panose="02040503050406030204" pitchFamily="18" charset="0"/>
+                      </a:rPr>
                       <m:t>∼</m:t>
                     </m:r>
                     <m:r>
-                      <a:rPr lang="el-GR" i="1"/>
+                      <a:rPr lang="el-GR" i="1">
+                        <a:latin typeface="Cambria Math" panose="02040503050406030204" pitchFamily="18" charset="0"/>
+                      </a:rPr>
                       <m:t>𝑓</m:t>
                     </m:r>
                     <m:r>
-                      <a:rPr lang="el-GR"/>
+                      <a:rPr lang="el-GR">
+                        <a:latin typeface="Cambria Math" panose="02040503050406030204" pitchFamily="18" charset="0"/>
+                      </a:rPr>
                       <m:t> </m:t>
                     </m:r>
                     <m:d>
                       <m:dPr>
                         <m:ctrlPr>
-                          <a:rPr lang="ar-AE" i="1"/>
+                          <a:rPr lang="ar-AE" i="1">
+                            <a:latin typeface="Cambria Math" panose="02040503050406030204" pitchFamily="18" charset="0"/>
+                          </a:rPr>
                         </m:ctrlPr>
                       </m:dPr>
                       <m:e>
@@ -6650,7 +6679,9 @@
                       </m:e>
                     </m:d>
                     <m:r>
-                      <a:rPr lang="ar-AE"/>
+                      <a:rPr lang="ar-AE">
+                        <a:latin typeface="Cambria Math" panose="02040503050406030204" pitchFamily="18" charset="0"/>
+                      </a:rPr>
                       <m:t>,</m:t>
                     </m:r>
                   </m:oMath>
@@ -6669,18 +6700,24 @@
                     <m:sSup>
                       <m:sSupPr>
                         <m:ctrlPr>
-                          <a:rPr lang="ar-AE"/>
+                          <a:rPr lang="ar-AE" i="1">
+                            <a:latin typeface="Cambria Math" panose="02040503050406030204" pitchFamily="18" charset="0"/>
+                          </a:rPr>
                         </m:ctrlPr>
                       </m:sSupPr>
                       <m:e>
                         <m:r>
-                          <a:rPr lang="ar-AE" i="1"/>
+                          <a:rPr lang="ar-AE" i="1">
+                            <a:latin typeface="Cambria Math" panose="02040503050406030204" pitchFamily="18" charset="0"/>
+                          </a:rPr>
                           <m:t>𝜎</m:t>
                         </m:r>
                       </m:e>
                       <m:sup>
                         <m:r>
-                          <a:rPr lang="ar-AE"/>
+                          <a:rPr lang="ar-AE">
+                            <a:latin typeface="Cambria Math" panose="02040503050406030204" pitchFamily="18" charset="0"/>
+                          </a:rPr>
                           <m:t>2</m:t>
                         </m:r>
                       </m:sup>
@@ -6688,33 +6725,45 @@
                     <m:d>
                       <m:dPr>
                         <m:ctrlPr>
-                          <a:rPr lang="ar-AE" i="1"/>
+                          <a:rPr lang="ar-AE" i="1">
+                            <a:latin typeface="Cambria Math" panose="02040503050406030204" pitchFamily="18" charset="0"/>
+                          </a:rPr>
                         </m:ctrlPr>
                       </m:dPr>
                       <m:e>
                         <m:r>
-                          <a:rPr lang="ar-AE" i="1"/>
+                          <a:rPr lang="ar-AE" i="1">
+                            <a:latin typeface="Cambria Math" panose="02040503050406030204" pitchFamily="18" charset="0"/>
+                          </a:rPr>
                           <m:t>𝑓</m:t>
                         </m:r>
                       </m:e>
                     </m:d>
                     <m:r>
-                      <a:rPr lang="ar-AE"/>
+                      <a:rPr lang="ar-AE">
+                        <a:latin typeface="Cambria Math" panose="02040503050406030204" pitchFamily="18" charset="0"/>
+                      </a:rPr>
                       <m:t>∼</m:t>
                     </m:r>
                     <m:r>
-                      <a:rPr lang="ar-AE" i="1"/>
+                      <a:rPr lang="ar-AE" i="1">
+                        <a:latin typeface="Cambria Math" panose="02040503050406030204" pitchFamily="18" charset="0"/>
+                      </a:rPr>
                       <m:t>𝑆</m:t>
                     </m:r>
                     <m:d>
                       <m:dPr>
                         <m:ctrlPr>
-                          <a:rPr lang="ar-AE" i="1"/>
+                          <a:rPr lang="ar-AE" i="1">
+                            <a:latin typeface="Cambria Math" panose="02040503050406030204" pitchFamily="18" charset="0"/>
+                          </a:rPr>
                         </m:ctrlPr>
                       </m:dPr>
                       <m:e>
                         <m:r>
-                          <a:rPr lang="ar-AE" i="1"/>
+                          <a:rPr lang="ar-AE" i="1">
+                            <a:latin typeface="Cambria Math" panose="02040503050406030204" pitchFamily="18" charset="0"/>
+                          </a:rPr>
                           <m:t>𝑓</m:t>
                         </m:r>
                       </m:e>
@@ -6730,32 +6779,44 @@
                       <m:rPr>
                         <m:sty m:val="p"/>
                       </m:rPr>
-                      <a:rPr lang="el-GR"/>
+                      <a:rPr lang="el-GR">
+                        <a:latin typeface="Cambria Math" panose="02040503050406030204" pitchFamily="18" charset="0"/>
+                      </a:rPr>
                       <m:t>Δ</m:t>
                     </m:r>
                     <m:r>
-                      <a:rPr lang="el-GR" i="1"/>
+                      <a:rPr lang="el-GR" i="1">
+                        <a:latin typeface="Cambria Math" panose="02040503050406030204" pitchFamily="18" charset="0"/>
+                      </a:rPr>
                       <m:t>𝑓</m:t>
                     </m:r>
                     <m:r>
-                      <a:rPr lang="el-GR"/>
+                      <a:rPr lang="el-GR">
+                        <a:latin typeface="Cambria Math" panose="02040503050406030204" pitchFamily="18" charset="0"/>
+                      </a:rPr>
                       <m:t>∼</m:t>
                     </m:r>
                     <m:f>
                       <m:fPr>
                         <m:ctrlPr>
-                          <a:rPr lang="ar-AE" i="1"/>
+                          <a:rPr lang="ar-AE" i="1">
+                            <a:latin typeface="Cambria Math" panose="02040503050406030204" pitchFamily="18" charset="0"/>
+                          </a:rPr>
                         </m:ctrlPr>
                       </m:fPr>
                       <m:num>
                         <m:r>
-                          <a:rPr lang="ar-AE" i="1"/>
+                          <a:rPr lang="ar-AE" i="1">
+                            <a:latin typeface="Cambria Math" panose="02040503050406030204" pitchFamily="18" charset="0"/>
+                          </a:rPr>
                           <m:t>𝐴</m:t>
                         </m:r>
                       </m:num>
                       <m:den>
                         <m:r>
-                          <a:rPr lang="ar-AE" i="1"/>
+                          <a:rPr lang="ar-AE" i="1">
+                            <a:latin typeface="Cambria Math" panose="02040503050406030204" pitchFamily="18" charset="0"/>
+                          </a:rPr>
                           <m:t>𝑓</m:t>
                         </m:r>
                       </m:den>
@@ -6768,19 +6829,27 @@
                       <m:t> </m:t>
                     </m:r>
                     <m:r>
-                      <a:rPr lang="ar-AE" i="1"/>
+                      <a:rPr lang="ar-AE" i="1">
+                        <a:latin typeface="Cambria Math" panose="02040503050406030204" pitchFamily="18" charset="0"/>
+                      </a:rPr>
                       <m:t>𝑓</m:t>
                     </m:r>
                     <m:r>
-                      <a:rPr lang="ar-AE"/>
+                      <a:rPr lang="ar-AE">
+                        <a:latin typeface="Cambria Math" panose="02040503050406030204" pitchFamily="18" charset="0"/>
+                      </a:rPr>
                       <m:t>=</m:t>
                     </m:r>
                     <m:r>
-                      <a:rPr lang="ar-AE" i="1"/>
+                      <a:rPr lang="ar-AE" i="1">
+                        <a:latin typeface="Cambria Math" panose="02040503050406030204" pitchFamily="18" charset="0"/>
+                      </a:rPr>
                       <m:t>𝐴</m:t>
                     </m:r>
                     <m:r>
-                      <a:rPr lang="ar-AE"/>
+                      <a:rPr lang="ar-AE">
+                        <a:latin typeface="Cambria Math" panose="02040503050406030204" pitchFamily="18" charset="0"/>
+                      </a:rPr>
                       <m:t>.</m:t>
                     </m:r>
                   </m:oMath>
@@ -6828,15 +6897,21 @@
                 <a14:m>
                   <m:oMath xmlns:m="http://schemas.openxmlformats.org/officeDocument/2006/math">
                     <m:r>
-                      <a:rPr lang="en-US" b="1" i="1"/>
+                      <a:rPr lang="en-US" b="1" i="1">
+                        <a:latin typeface="Cambria Math" panose="02040503050406030204" pitchFamily="18" charset="0"/>
+                      </a:rPr>
                       <m:t>𝟏</m:t>
                     </m:r>
                     <m:r>
-                      <a:rPr lang="en-US" b="1"/>
+                      <a:rPr lang="en-US" b="1">
+                        <a:latin typeface="Cambria Math" panose="02040503050406030204" pitchFamily="18" charset="0"/>
+                      </a:rPr>
                       <m:t>/</m:t>
                     </m:r>
                     <m:r>
-                      <a:rPr lang="en-US" b="1" i="1"/>
+                      <a:rPr lang="en-US" b="1" i="1">
+                        <a:latin typeface="Cambria Math" panose="02040503050406030204" pitchFamily="18" charset="0"/>
+                      </a:rPr>
                       <m:t>𝒇</m:t>
                     </m:r>
                   </m:oMath>
@@ -6853,7 +6928,7 @@
             </p:txBody>
           </p:sp>
         </mc:Choice>
-        <mc:Fallback>
+        <mc:Fallback xmlns="">
           <p:sp>
             <p:nvSpPr>
               <p:cNvPr id="3" name="Text Placeholder 2">
@@ -6897,6 +6972,154 @@
     <p:extLst>
       <p:ext uri="{BB962C8B-B14F-4D97-AF65-F5344CB8AC3E}">
         <p14:creationId xmlns:p14="http://schemas.microsoft.com/office/powerpoint/2010/main" val="2683618824"/>
+      </p:ext>
+    </p:extLst>
+  </p:cSld>
+  <p:clrMapOvr>
+    <a:masterClrMapping/>
+  </p:clrMapOvr>
+</p:sld>
+</file>
+
+<file path=ppt/slides/slide6.xml><?xml version="1.0" encoding="utf-8"?>
+<p:sld xmlns:a="http://schemas.openxmlformats.org/drawingml/2006/main" xmlns:r="http://schemas.openxmlformats.org/officeDocument/2006/relationships" xmlns:p="http://schemas.openxmlformats.org/presentationml/2006/main">
+  <p:cSld>
+    <p:spTree>
+      <p:nvGrpSpPr>
+        <p:cNvPr id="1" name=""/>
+        <p:cNvGrpSpPr/>
+        <p:nvPr/>
+      </p:nvGrpSpPr>
+      <p:grpSpPr>
+        <a:xfrm>
+          <a:off x="0" y="0"/>
+          <a:ext cx="0" cy="0"/>
+          <a:chOff x="0" y="0"/>
+          <a:chExt cx="0" cy="0"/>
+        </a:xfrm>
+      </p:grpSpPr>
+      <p:sp>
+        <p:nvSpPr>
+          <p:cNvPr id="2" name="Title 1">
+            <a:extLst>
+              <a:ext uri="{FF2B5EF4-FFF2-40B4-BE49-F238E27FC236}">
+                <a16:creationId xmlns:a16="http://schemas.microsoft.com/office/drawing/2014/main" id="{20E90370-F8FE-371C-8E3D-FCC3B6FCDD90}"/>
+              </a:ext>
+            </a:extLst>
+          </p:cNvPr>
+          <p:cNvSpPr>
+            <a:spLocks noGrp="1"/>
+          </p:cNvSpPr>
+          <p:nvPr>
+            <p:ph type="title"/>
+          </p:nvPr>
+        </p:nvSpPr>
+        <p:spPr/>
+        <p:txBody>
+          <a:bodyPr>
+            <a:normAutofit fontScale="90000"/>
+          </a:bodyPr>
+          <a:lstStyle/>
+          <a:p>
+            <a:r>
+              <a:rPr lang="en-US" dirty="0"/>
+              <a:t>Peak Gradient are about 20 </a:t>
+            </a:r>
+            <a:r>
+              <a:rPr lang="en-US" dirty="0" err="1"/>
+              <a:t>pT</a:t>
+            </a:r>
+            <a:r>
+              <a:rPr lang="en-US" dirty="0"/>
+              <a:t> for large </a:t>
+            </a:r>
+            <a:r>
+              <a:rPr lang="en-US" dirty="0" err="1"/>
+              <a:t>conctivity</a:t>
+            </a:r>
+            <a:r>
+              <a:rPr lang="en-US" dirty="0"/>
+              <a:t> variation</a:t>
+            </a:r>
+          </a:p>
+        </p:txBody>
+      </p:sp>
+      <p:sp>
+        <p:nvSpPr>
+          <p:cNvPr id="3" name="Text Placeholder 2">
+            <a:extLst>
+              <a:ext uri="{FF2B5EF4-FFF2-40B4-BE49-F238E27FC236}">
+                <a16:creationId xmlns:a16="http://schemas.microsoft.com/office/drawing/2014/main" id="{E51CE991-CD6F-732A-936B-75F73D861918}"/>
+              </a:ext>
+            </a:extLst>
+          </p:cNvPr>
+          <p:cNvSpPr>
+            <a:spLocks noGrp="1"/>
+          </p:cNvSpPr>
+          <p:nvPr>
+            <p:ph type="body" idx="1"/>
+          </p:nvPr>
+        </p:nvSpPr>
+        <p:spPr/>
+        <p:txBody>
+          <a:bodyPr/>
+          <a:lstStyle/>
+          <a:p>
+            <a:r>
+              <a:rPr lang="en-US" dirty="0"/>
+              <a:t>RMS conductivity  5%</a:t>
+            </a:r>
+          </a:p>
+          <a:p>
+            <a:r>
+              <a:rPr lang="en-US" dirty="0"/>
+              <a:t>Peak 30 </a:t>
+            </a:r>
+            <a:r>
+              <a:rPr lang="en-US" dirty="0" err="1"/>
+              <a:t>pT</a:t>
+            </a:r>
+            <a:r>
+              <a:rPr lang="en-US" dirty="0"/>
+              <a:t>/m</a:t>
+            </a:r>
+          </a:p>
+        </p:txBody>
+      </p:sp>
+      <p:pic>
+        <p:nvPicPr>
+          <p:cNvPr id="6" name="Picture 5" descr="A picture containing shape&#10;&#10;AI-generated content may be incorrect.">
+            <a:extLst>
+              <a:ext uri="{FF2B5EF4-FFF2-40B4-BE49-F238E27FC236}">
+                <a16:creationId xmlns:a16="http://schemas.microsoft.com/office/drawing/2014/main" id="{8926C9CB-1B22-F823-4294-AF98771F78AC}"/>
+              </a:ext>
+            </a:extLst>
+          </p:cNvPr>
+          <p:cNvPicPr>
+            <a:picLocks noChangeAspect="1"/>
+          </p:cNvPicPr>
+          <p:nvPr/>
+        </p:nvPicPr>
+        <p:blipFill>
+          <a:blip r:embed="rId2"/>
+          <a:stretch>
+            <a:fillRect/>
+          </a:stretch>
+        </p:blipFill>
+        <p:spPr>
+          <a:xfrm>
+            <a:off x="4572000" y="1566996"/>
+            <a:ext cx="3419226" cy="3001879"/>
+          </a:xfrm>
+          <a:prstGeom prst="rect">
+            <a:avLst/>
+          </a:prstGeom>
+        </p:spPr>
+      </p:pic>
+    </p:spTree>
+    <p:extLst>
+      <p:ext uri="{BB962C8B-B14F-4D97-AF65-F5344CB8AC3E}">
+        <p14:creationId xmlns:p14="http://schemas.microsoft.com/office/powerpoint/2010/main" val="2954761330"/>
       </p:ext>
     </p:extLst>
   </p:cSld>

</xml_diff>